<commit_message>
Deleted slide about identifying pulling/relxing from status column
</commit_message>
<xml_diff>
--- a/Summer school 2024/Analysis of protein stretching experiments.pptx
+++ b/Summer school 2024/Analysis of protein stretching experiments.pptx
@@ -15,35 +15,34 @@
     <p:sldId id="298" r:id="rId9"/>
     <p:sldId id="276" r:id="rId10"/>
     <p:sldId id="277" r:id="rId11"/>
-    <p:sldId id="318" r:id="rId12"/>
-    <p:sldId id="278" r:id="rId13"/>
-    <p:sldId id="279" r:id="rId14"/>
-    <p:sldId id="286" r:id="rId15"/>
-    <p:sldId id="287" r:id="rId16"/>
-    <p:sldId id="266" r:id="rId17"/>
-    <p:sldId id="268" r:id="rId18"/>
-    <p:sldId id="267" r:id="rId19"/>
-    <p:sldId id="293" r:id="rId20"/>
-    <p:sldId id="294" r:id="rId21"/>
-    <p:sldId id="295" r:id="rId22"/>
-    <p:sldId id="281" r:id="rId23"/>
-    <p:sldId id="269" r:id="rId24"/>
-    <p:sldId id="265" r:id="rId25"/>
-    <p:sldId id="297" r:id="rId26"/>
-    <p:sldId id="270" r:id="rId27"/>
-    <p:sldId id="271" r:id="rId28"/>
-    <p:sldId id="288" r:id="rId29"/>
-    <p:sldId id="274" r:id="rId30"/>
-    <p:sldId id="259" r:id="rId31"/>
-    <p:sldId id="282" r:id="rId32"/>
-    <p:sldId id="283" r:id="rId33"/>
-    <p:sldId id="315" r:id="rId34"/>
-    <p:sldId id="285" r:id="rId35"/>
-    <p:sldId id="316" r:id="rId36"/>
-    <p:sldId id="284" r:id="rId37"/>
-    <p:sldId id="290" r:id="rId38"/>
-    <p:sldId id="317" r:id="rId39"/>
-    <p:sldId id="258" r:id="rId40"/>
+    <p:sldId id="278" r:id="rId12"/>
+    <p:sldId id="279" r:id="rId13"/>
+    <p:sldId id="286" r:id="rId14"/>
+    <p:sldId id="287" r:id="rId15"/>
+    <p:sldId id="266" r:id="rId16"/>
+    <p:sldId id="268" r:id="rId17"/>
+    <p:sldId id="267" r:id="rId18"/>
+    <p:sldId id="293" r:id="rId19"/>
+    <p:sldId id="294" r:id="rId20"/>
+    <p:sldId id="295" r:id="rId21"/>
+    <p:sldId id="281" r:id="rId22"/>
+    <p:sldId id="269" r:id="rId23"/>
+    <p:sldId id="265" r:id="rId24"/>
+    <p:sldId id="297" r:id="rId25"/>
+    <p:sldId id="270" r:id="rId26"/>
+    <p:sldId id="271" r:id="rId27"/>
+    <p:sldId id="288" r:id="rId28"/>
+    <p:sldId id="274" r:id="rId29"/>
+    <p:sldId id="259" r:id="rId30"/>
+    <p:sldId id="282" r:id="rId31"/>
+    <p:sldId id="283" r:id="rId32"/>
+    <p:sldId id="315" r:id="rId33"/>
+    <p:sldId id="285" r:id="rId34"/>
+    <p:sldId id="316" r:id="rId35"/>
+    <p:sldId id="284" r:id="rId36"/>
+    <p:sldId id="290" r:id="rId37"/>
+    <p:sldId id="317" r:id="rId38"/>
+    <p:sldId id="258" r:id="rId39"/>
   </p:sldIdLst>
   <p:sldSz cx="12192000" cy="6858000"/>
   <p:notesSz cx="6858000" cy="9144000"/>
@@ -150,14 +149,6 @@
 </p:presentation>
 </file>
 
-<file path=ppt/revisionInfo.xml><?xml version="1.0" encoding="utf-8"?>
-<p1510:revInfo xmlns:a="http://schemas.openxmlformats.org/drawingml/2006/main" xmlns:r="http://schemas.openxmlformats.org/officeDocument/2006/relationships" xmlns:p1510="http://schemas.microsoft.com/office/powerpoint/2015/10/main">
-  <p1510:revLst>
-    <p1510:client id="{F7E50110-C233-47BD-AD07-CF0778A4B2F4}" v="22" dt="2024-12-09T17:12:46.181"/>
-  </p1510:revLst>
-</p1510:revInfo>
-</file>
-
 <file path=ppt/changesInfos/changesInfo1.xml><?xml version="1.0" encoding="utf-8"?>
 <pc:chgInfo xmlns:a="http://schemas.openxmlformats.org/drawingml/2006/main" xmlns:r="http://schemas.openxmlformats.org/officeDocument/2006/relationships" xmlns:ac="http://schemas.microsoft.com/office/drawing/2013/main/command" xmlns:pc="http://schemas.microsoft.com/office/powerpoint/2013/main/command">
   <pc:docChgLst>
@@ -173,14 +164,6 @@
           <pc:docMk/>
           <pc:sldMk cId="993497870" sldId="265"/>
         </pc:sldMkLst>
-        <pc:spChg chg="mod">
-          <ac:chgData name="Are Mjaavatten" userId="00bb58f78e5d171c" providerId="LiveId" clId="{F7E50110-C233-47BD-AD07-CF0778A4B2F4}" dt="2024-11-23T10:29:11.863" v="1015" actId="21"/>
-          <ac:spMkLst>
-            <pc:docMk/>
-            <pc:sldMk cId="993497870" sldId="265"/>
-            <ac:spMk id="3" creationId="{8AFF1A4D-B6A6-002E-0A17-9D9AD3D3BB33}"/>
-          </ac:spMkLst>
-        </pc:spChg>
       </pc:sldChg>
       <pc:sldChg chg="addSp modSp mod">
         <pc:chgData name="Are Mjaavatten" userId="00bb58f78e5d171c" providerId="LiveId" clId="{F7E50110-C233-47BD-AD07-CF0778A4B2F4}" dt="2024-11-23T10:14:57.047" v="491" actId="1076"/>
@@ -188,14 +171,6 @@
           <pc:docMk/>
           <pc:sldMk cId="951915012" sldId="266"/>
         </pc:sldMkLst>
-        <pc:spChg chg="add mod">
-          <ac:chgData name="Are Mjaavatten" userId="00bb58f78e5d171c" providerId="LiveId" clId="{F7E50110-C233-47BD-AD07-CF0778A4B2F4}" dt="2024-11-23T10:14:57.047" v="491" actId="1076"/>
-          <ac:spMkLst>
-            <pc:docMk/>
-            <pc:sldMk cId="951915012" sldId="266"/>
-            <ac:spMk id="4" creationId="{4F6F27EE-DE3F-27A3-FAD1-07CAB23F244B}"/>
-          </ac:spMkLst>
-        </pc:spChg>
       </pc:sldChg>
       <pc:sldChg chg="ord">
         <pc:chgData name="Are Mjaavatten" userId="00bb58f78e5d171c" providerId="LiveId" clId="{F7E50110-C233-47BD-AD07-CF0778A4B2F4}" dt="2024-12-09T17:30:37.017" v="2268"/>
@@ -217,14 +192,6 @@
           <pc:docMk/>
           <pc:sldMk cId="34042762" sldId="269"/>
         </pc:sldMkLst>
-        <pc:spChg chg="mod">
-          <ac:chgData name="Are Mjaavatten" userId="00bb58f78e5d171c" providerId="LiveId" clId="{F7E50110-C233-47BD-AD07-CF0778A4B2F4}" dt="2024-12-03T14:11:04.678" v="1314" actId="20577"/>
-          <ac:spMkLst>
-            <pc:docMk/>
-            <pc:sldMk cId="34042762" sldId="269"/>
-            <ac:spMk id="6" creationId="{92A6A31D-37FF-95B9-730E-0F42FB9048FE}"/>
-          </ac:spMkLst>
-        </pc:spChg>
       </pc:sldChg>
       <pc:sldChg chg="modSp mod">
         <pc:chgData name="Are Mjaavatten" userId="00bb58f78e5d171c" providerId="LiveId" clId="{F7E50110-C233-47BD-AD07-CF0778A4B2F4}" dt="2024-12-03T14:16:21.574" v="1332" actId="20577"/>
@@ -232,14 +199,6 @@
           <pc:docMk/>
           <pc:sldMk cId="2870539914" sldId="271"/>
         </pc:sldMkLst>
-        <pc:spChg chg="mod">
-          <ac:chgData name="Are Mjaavatten" userId="00bb58f78e5d171c" providerId="LiveId" clId="{F7E50110-C233-47BD-AD07-CF0778A4B2F4}" dt="2024-12-03T14:16:21.574" v="1332" actId="20577"/>
-          <ac:spMkLst>
-            <pc:docMk/>
-            <pc:sldMk cId="2870539914" sldId="271"/>
-            <ac:spMk id="8" creationId="{DE312110-5C43-D77C-A2EC-47EB6666D900}"/>
-          </ac:spMkLst>
-        </pc:spChg>
       </pc:sldChg>
       <pc:sldChg chg="modSp mod">
         <pc:chgData name="Are Mjaavatten" userId="00bb58f78e5d171c" providerId="LiveId" clId="{F7E50110-C233-47BD-AD07-CF0778A4B2F4}" dt="2024-11-23T10:05:46.461" v="430" actId="1076"/>
@@ -247,14 +206,6 @@
           <pc:docMk/>
           <pc:sldMk cId="929935833" sldId="275"/>
         </pc:sldMkLst>
-        <pc:spChg chg="mod">
-          <ac:chgData name="Are Mjaavatten" userId="00bb58f78e5d171c" providerId="LiveId" clId="{F7E50110-C233-47BD-AD07-CF0778A4B2F4}" dt="2024-11-23T10:05:46.461" v="430" actId="1076"/>
-          <ac:spMkLst>
-            <pc:docMk/>
-            <pc:sldMk cId="929935833" sldId="275"/>
-            <ac:spMk id="3" creationId="{3EC9A98D-B096-1765-33CD-BCE98D447E91}"/>
-          </ac:spMkLst>
-        </pc:spChg>
       </pc:sldChg>
       <pc:sldChg chg="addSp delSp modSp mod">
         <pc:chgData name="Are Mjaavatten" userId="00bb58f78e5d171c" providerId="LiveId" clId="{F7E50110-C233-47BD-AD07-CF0778A4B2F4}" dt="2024-12-09T17:21:25.683" v="2245" actId="790"/>
@@ -262,22 +213,6 @@
           <pc:docMk/>
           <pc:sldMk cId="935628899" sldId="286"/>
         </pc:sldMkLst>
-        <pc:spChg chg="add mod">
-          <ac:chgData name="Are Mjaavatten" userId="00bb58f78e5d171c" providerId="LiveId" clId="{F7E50110-C233-47BD-AD07-CF0778A4B2F4}" dt="2024-12-09T17:21:25.683" v="2245" actId="790"/>
-          <ac:spMkLst>
-            <pc:docMk/>
-            <pc:sldMk cId="935628899" sldId="286"/>
-            <ac:spMk id="4" creationId="{F3200832-6819-8F23-E690-8A4AA0CE3EFA}"/>
-          </ac:spMkLst>
-        </pc:spChg>
-        <pc:spChg chg="add del mod">
-          <ac:chgData name="Are Mjaavatten" userId="00bb58f78e5d171c" providerId="LiveId" clId="{F7E50110-C233-47BD-AD07-CF0778A4B2F4}" dt="2024-12-09T17:20:56.667" v="2243" actId="478"/>
-          <ac:spMkLst>
-            <pc:docMk/>
-            <pc:sldMk cId="935628899" sldId="286"/>
-            <ac:spMk id="9" creationId="{6639E114-B5CD-5311-4E57-41F32D2CF3DC}"/>
-          </ac:spMkLst>
-        </pc:spChg>
       </pc:sldChg>
       <pc:sldChg chg="modSp mod">
         <pc:chgData name="Are Mjaavatten" userId="00bb58f78e5d171c" providerId="LiveId" clId="{F7E50110-C233-47BD-AD07-CF0778A4B2F4}" dt="2024-12-09T17:23:10.959" v="2264" actId="20577"/>
@@ -285,14 +220,6 @@
           <pc:docMk/>
           <pc:sldMk cId="3923112241" sldId="287"/>
         </pc:sldMkLst>
-        <pc:spChg chg="mod">
-          <ac:chgData name="Are Mjaavatten" userId="00bb58f78e5d171c" providerId="LiveId" clId="{F7E50110-C233-47BD-AD07-CF0778A4B2F4}" dt="2024-12-09T17:23:10.959" v="2264" actId="20577"/>
-          <ac:spMkLst>
-            <pc:docMk/>
-            <pc:sldMk cId="3923112241" sldId="287"/>
-            <ac:spMk id="4" creationId="{6BF09426-A00E-F54E-ED38-ED13250CE22D}"/>
-          </ac:spMkLst>
-        </pc:spChg>
       </pc:sldChg>
       <pc:sldChg chg="modSp mod">
         <pc:chgData name="Are Mjaavatten" userId="00bb58f78e5d171c" providerId="LiveId" clId="{F7E50110-C233-47BD-AD07-CF0778A4B2F4}" dt="2024-12-09T17:02:08.795" v="1449" actId="20577"/>
@@ -300,14 +227,6 @@
           <pc:docMk/>
           <pc:sldMk cId="3375353450" sldId="291"/>
         </pc:sldMkLst>
-        <pc:spChg chg="mod">
-          <ac:chgData name="Are Mjaavatten" userId="00bb58f78e5d171c" providerId="LiveId" clId="{F7E50110-C233-47BD-AD07-CF0778A4B2F4}" dt="2024-12-09T17:02:08.795" v="1449" actId="20577"/>
-          <ac:spMkLst>
-            <pc:docMk/>
-            <pc:sldMk cId="3375353450" sldId="291"/>
-            <ac:spMk id="11" creationId="{85B9952D-D1E5-0515-5E56-26BE23514BF6}"/>
-          </ac:spMkLst>
-        </pc:spChg>
       </pc:sldChg>
       <pc:sldChg chg="modSp mod">
         <pc:chgData name="Are Mjaavatten" userId="00bb58f78e5d171c" providerId="LiveId" clId="{F7E50110-C233-47BD-AD07-CF0778A4B2F4}" dt="2024-11-23T09:52:22.749" v="263" actId="20577"/>
@@ -315,14 +234,6 @@
           <pc:docMk/>
           <pc:sldMk cId="2158410459" sldId="293"/>
         </pc:sldMkLst>
-        <pc:spChg chg="mod">
-          <ac:chgData name="Are Mjaavatten" userId="00bb58f78e5d171c" providerId="LiveId" clId="{F7E50110-C233-47BD-AD07-CF0778A4B2F4}" dt="2024-11-23T09:52:22.749" v="263" actId="20577"/>
-          <ac:spMkLst>
-            <pc:docMk/>
-            <pc:sldMk cId="2158410459" sldId="293"/>
-            <ac:spMk id="3" creationId="{EA2D0C46-3AD9-3956-1DDB-02EFB5682D96}"/>
-          </ac:spMkLst>
-        </pc:spChg>
       </pc:sldChg>
       <pc:sldChg chg="modSp mod">
         <pc:chgData name="Are Mjaavatten" userId="00bb58f78e5d171c" providerId="LiveId" clId="{F7E50110-C233-47BD-AD07-CF0778A4B2F4}" dt="2024-11-23T09:58:20.563" v="352" actId="20577"/>
@@ -330,14 +241,6 @@
           <pc:docMk/>
           <pc:sldMk cId="3201626842" sldId="295"/>
         </pc:sldMkLst>
-        <pc:spChg chg="mod">
-          <ac:chgData name="Are Mjaavatten" userId="00bb58f78e5d171c" providerId="LiveId" clId="{F7E50110-C233-47BD-AD07-CF0778A4B2F4}" dt="2024-11-23T09:58:20.563" v="352" actId="20577"/>
-          <ac:spMkLst>
-            <pc:docMk/>
-            <pc:sldMk cId="3201626842" sldId="295"/>
-            <ac:spMk id="3" creationId="{AF115D75-50D7-658E-D124-041FD9D2F244}"/>
-          </ac:spMkLst>
-        </pc:spChg>
       </pc:sldChg>
       <pc:sldChg chg="addSp modSp new mod">
         <pc:chgData name="Are Mjaavatten" userId="00bb58f78e5d171c" providerId="LiveId" clId="{F7E50110-C233-47BD-AD07-CF0778A4B2F4}" dt="2024-11-23T10:39:52.998" v="1311" actId="1076"/>
@@ -352,14 +255,6 @@
           <pc:docMk/>
           <pc:sldMk cId="2902811654" sldId="297"/>
         </pc:sldMkLst>
-        <pc:spChg chg="mod">
-          <ac:chgData name="Are Mjaavatten" userId="00bb58f78e5d171c" providerId="LiveId" clId="{F7E50110-C233-47BD-AD07-CF0778A4B2F4}" dt="2024-12-03T14:14:00.069" v="1318" actId="20577"/>
-          <ac:spMkLst>
-            <pc:docMk/>
-            <pc:sldMk cId="2902811654" sldId="297"/>
-            <ac:spMk id="5" creationId="{EB6C262D-77CA-287C-A5E0-CF41E40A1100}"/>
-          </ac:spMkLst>
-        </pc:spChg>
       </pc:sldChg>
       <pc:sldChg chg="modSp mod">
         <pc:chgData name="Are Mjaavatten" userId="00bb58f78e5d171c" providerId="LiveId" clId="{F7E50110-C233-47BD-AD07-CF0778A4B2F4}" dt="2024-12-03T14:42:06.008" v="1441" actId="255"/>
@@ -367,22 +262,6 @@
           <pc:docMk/>
           <pc:sldMk cId="499171047" sldId="317"/>
         </pc:sldMkLst>
-        <pc:spChg chg="mod">
-          <ac:chgData name="Are Mjaavatten" userId="00bb58f78e5d171c" providerId="LiveId" clId="{F7E50110-C233-47BD-AD07-CF0778A4B2F4}" dt="2024-12-03T14:38:36.858" v="1363" actId="27636"/>
-          <ac:spMkLst>
-            <pc:docMk/>
-            <pc:sldMk cId="499171047" sldId="317"/>
-            <ac:spMk id="4" creationId="{821CEF42-FFC5-DFCE-1ABD-D43F48BC47A8}"/>
-          </ac:spMkLst>
-        </pc:spChg>
-        <pc:spChg chg="mod">
-          <ac:chgData name="Are Mjaavatten" userId="00bb58f78e5d171c" providerId="LiveId" clId="{F7E50110-C233-47BD-AD07-CF0778A4B2F4}" dt="2024-12-03T14:42:06.008" v="1441" actId="255"/>
-          <ac:spMkLst>
-            <pc:docMk/>
-            <pc:sldMk cId="499171047" sldId="317"/>
-            <ac:spMk id="5" creationId="{C3A6AED0-963F-1F14-8584-8D0BE40B8A6F}"/>
-          </ac:spMkLst>
-        </pc:spChg>
       </pc:sldChg>
       <pc:sldChg chg="modSp new mod">
         <pc:chgData name="Are Mjaavatten" userId="00bb58f78e5d171c" providerId="LiveId" clId="{F7E50110-C233-47BD-AD07-CF0778A4B2F4}" dt="2024-12-09T17:11:08.364" v="1913" actId="20577"/>
@@ -390,22 +269,6 @@
           <pc:docMk/>
           <pc:sldMk cId="232088836" sldId="318"/>
         </pc:sldMkLst>
-        <pc:spChg chg="mod">
-          <ac:chgData name="Are Mjaavatten" userId="00bb58f78e5d171c" providerId="LiveId" clId="{F7E50110-C233-47BD-AD07-CF0778A4B2F4}" dt="2024-12-09T17:03:39.508" v="1453" actId="20577"/>
-          <ac:spMkLst>
-            <pc:docMk/>
-            <pc:sldMk cId="232088836" sldId="318"/>
-            <ac:spMk id="2" creationId="{0674DF78-8B81-C58D-E114-850F556C42DC}"/>
-          </ac:spMkLst>
-        </pc:spChg>
-        <pc:spChg chg="mod">
-          <ac:chgData name="Are Mjaavatten" userId="00bb58f78e5d171c" providerId="LiveId" clId="{F7E50110-C233-47BD-AD07-CF0778A4B2F4}" dt="2024-12-09T17:11:08.364" v="1913" actId="20577"/>
-          <ac:spMkLst>
-            <pc:docMk/>
-            <pc:sldMk cId="232088836" sldId="318"/>
-            <ac:spMk id="3" creationId="{3C134FFE-4202-599D-4DE1-2A816323D0CF}"/>
-          </ac:spMkLst>
-        </pc:spChg>
       </pc:sldChg>
     </pc:docChg>
   </pc:docChgLst>
@@ -422,30 +285,6 @@
           <pc:docMk/>
           <pc:sldMk cId="1521227644" sldId="256"/>
         </pc:sldMkLst>
-        <pc:spChg chg="mod">
-          <ac:chgData name="Are Mjaavatten" userId="00bb58f78e5d171c" providerId="LiveId" clId="{F80FCCAC-22F4-4BD9-BD04-EE2233D1C28B}" dt="2024-10-24T11:54:57.771" v="5150" actId="1036"/>
-          <ac:spMkLst>
-            <pc:docMk/>
-            <pc:sldMk cId="1521227644" sldId="256"/>
-            <ac:spMk id="2" creationId="{22FA35A4-F5D0-77BB-541D-71CADF87D55C}"/>
-          </ac:spMkLst>
-        </pc:spChg>
-        <pc:spChg chg="mod">
-          <ac:chgData name="Are Mjaavatten" userId="00bb58f78e5d171c" providerId="LiveId" clId="{F80FCCAC-22F4-4BD9-BD04-EE2233D1C28B}" dt="2024-10-24T11:54:57.771" v="5150" actId="1036"/>
-          <ac:spMkLst>
-            <pc:docMk/>
-            <pc:sldMk cId="1521227644" sldId="256"/>
-            <ac:spMk id="3" creationId="{F7E022BE-655B-6198-0C9C-015E649340F3}"/>
-          </ac:spMkLst>
-        </pc:spChg>
-        <pc:spChg chg="add mod">
-          <ac:chgData name="Are Mjaavatten" userId="00bb58f78e5d171c" providerId="LiveId" clId="{F80FCCAC-22F4-4BD9-BD04-EE2233D1C28B}" dt="2024-10-24T12:00:31.313" v="5209" actId="20577"/>
-          <ac:spMkLst>
-            <pc:docMk/>
-            <pc:sldMk cId="1521227644" sldId="256"/>
-            <ac:spMk id="6" creationId="{711756D9-6B33-019A-6DCC-DEB88A4082BD}"/>
-          </ac:spMkLst>
-        </pc:spChg>
       </pc:sldChg>
       <pc:sldChg chg="addSp delSp modSp new mod ord">
         <pc:chgData name="Are Mjaavatten" userId="00bb58f78e5d171c" providerId="LiveId" clId="{F80FCCAC-22F4-4BD9-BD04-EE2233D1C28B}" dt="2024-11-05T16:46:53.381" v="14178" actId="20577"/>
@@ -453,22 +292,6 @@
           <pc:docMk/>
           <pc:sldMk cId="2060213347" sldId="257"/>
         </pc:sldMkLst>
-        <pc:spChg chg="mod">
-          <ac:chgData name="Are Mjaavatten" userId="00bb58f78e5d171c" providerId="LiveId" clId="{F80FCCAC-22F4-4BD9-BD04-EE2233D1C28B}" dt="2024-10-27T07:24:46.020" v="5615"/>
-          <ac:spMkLst>
-            <pc:docMk/>
-            <pc:sldMk cId="2060213347" sldId="257"/>
-            <ac:spMk id="2" creationId="{F38DEB22-BE72-A22F-0FFC-83F1A075B5F2}"/>
-          </ac:spMkLst>
-        </pc:spChg>
-        <pc:spChg chg="mod">
-          <ac:chgData name="Are Mjaavatten" userId="00bb58f78e5d171c" providerId="LiveId" clId="{F80FCCAC-22F4-4BD9-BD04-EE2233D1C28B}" dt="2024-11-05T16:46:53.381" v="14178" actId="20577"/>
-          <ac:spMkLst>
-            <pc:docMk/>
-            <pc:sldMk cId="2060213347" sldId="257"/>
-            <ac:spMk id="3" creationId="{36353399-9D56-01E3-F12D-E417C0FD7DF7}"/>
-          </ac:spMkLst>
-        </pc:spChg>
       </pc:sldChg>
       <pc:sldChg chg="addSp delSp modSp new mod ord">
         <pc:chgData name="Are Mjaavatten" userId="00bb58f78e5d171c" providerId="LiveId" clId="{F80FCCAC-22F4-4BD9-BD04-EE2233D1C28B}" dt="2024-10-29T12:25:34.095" v="12853" actId="14100"/>
@@ -476,14 +299,6 @@
           <pc:docMk/>
           <pc:sldMk cId="1865247118" sldId="258"/>
         </pc:sldMkLst>
-        <pc:spChg chg="mod">
-          <ac:chgData name="Are Mjaavatten" userId="00bb58f78e5d171c" providerId="LiveId" clId="{F80FCCAC-22F4-4BD9-BD04-EE2233D1C28B}" dt="2024-10-10T10:17:12.945" v="221" actId="1076"/>
-          <ac:spMkLst>
-            <pc:docMk/>
-            <pc:sldMk cId="1865247118" sldId="258"/>
-            <ac:spMk id="2" creationId="{9F0C508A-AF68-FD72-AD5C-EB78F9697DC3}"/>
-          </ac:spMkLst>
-        </pc:spChg>
       </pc:sldChg>
       <pc:sldChg chg="addSp delSp modSp new mod modClrScheme chgLayout">
         <pc:chgData name="Are Mjaavatten" userId="00bb58f78e5d171c" providerId="LiveId" clId="{F80FCCAC-22F4-4BD9-BD04-EE2233D1C28B}" dt="2024-10-24T11:28:30.082" v="5130" actId="20577"/>
@@ -491,22 +306,6 @@
           <pc:docMk/>
           <pc:sldMk cId="951015916" sldId="259"/>
         </pc:sldMkLst>
-        <pc:spChg chg="mod ord">
-          <ac:chgData name="Are Mjaavatten" userId="00bb58f78e5d171c" providerId="LiveId" clId="{F80FCCAC-22F4-4BD9-BD04-EE2233D1C28B}" dt="2024-10-24T11:14:05.067" v="4859" actId="20577"/>
-          <ac:spMkLst>
-            <pc:docMk/>
-            <pc:sldMk cId="951015916" sldId="259"/>
-            <ac:spMk id="2" creationId="{624CB892-5379-B693-0976-3ADA88506E05}"/>
-          </ac:spMkLst>
-        </pc:spChg>
-        <pc:spChg chg="add mod ord">
-          <ac:chgData name="Are Mjaavatten" userId="00bb58f78e5d171c" providerId="LiveId" clId="{F80FCCAC-22F4-4BD9-BD04-EE2233D1C28B}" dt="2024-10-24T11:28:30.082" v="5130" actId="20577"/>
-          <ac:spMkLst>
-            <pc:docMk/>
-            <pc:sldMk cId="951015916" sldId="259"/>
-            <ac:spMk id="3" creationId="{26D403B4-3D4C-2078-2A01-4ACE7A34BB43}"/>
-          </ac:spMkLst>
-        </pc:spChg>
       </pc:sldChg>
       <pc:sldChg chg="addSp delSp modSp new mod">
         <pc:chgData name="Are Mjaavatten" userId="00bb58f78e5d171c" providerId="LiveId" clId="{F80FCCAC-22F4-4BD9-BD04-EE2233D1C28B}" dt="2024-10-21T15:00:16.927" v="1429" actId="478"/>
@@ -514,54 +313,6 @@
           <pc:docMk/>
           <pc:sldMk cId="1934544939" sldId="260"/>
         </pc:sldMkLst>
-        <pc:spChg chg="mod">
-          <ac:chgData name="Are Mjaavatten" userId="00bb58f78e5d171c" providerId="LiveId" clId="{F80FCCAC-22F4-4BD9-BD04-EE2233D1C28B}" dt="2024-10-10T14:11:53.252" v="786" actId="122"/>
-          <ac:spMkLst>
-            <pc:docMk/>
-            <pc:sldMk cId="1934544939" sldId="260"/>
-            <ac:spMk id="2" creationId="{D9BFECEF-7D84-86A0-6294-F5C5E699CB40}"/>
-          </ac:spMkLst>
-        </pc:spChg>
-        <pc:spChg chg="add mod">
-          <ac:chgData name="Are Mjaavatten" userId="00bb58f78e5d171c" providerId="LiveId" clId="{F80FCCAC-22F4-4BD9-BD04-EE2233D1C28B}" dt="2024-10-21T14:58:54.170" v="1418" actId="207"/>
-          <ac:spMkLst>
-            <pc:docMk/>
-            <pc:sldMk cId="1934544939" sldId="260"/>
-            <ac:spMk id="5" creationId="{3E44772C-FCD0-F733-CD3A-25A5577D1D5B}"/>
-          </ac:spMkLst>
-        </pc:spChg>
-        <pc:spChg chg="add mod">
-          <ac:chgData name="Are Mjaavatten" userId="00bb58f78e5d171c" providerId="LiveId" clId="{F80FCCAC-22F4-4BD9-BD04-EE2233D1C28B}" dt="2024-10-21T08:12:52.743" v="1328" actId="20577"/>
-          <ac:spMkLst>
-            <pc:docMk/>
-            <pc:sldMk cId="1934544939" sldId="260"/>
-            <ac:spMk id="7" creationId="{54E86455-D2B9-C99C-0ACF-02AF4D2EA321}"/>
-          </ac:spMkLst>
-        </pc:spChg>
-        <pc:spChg chg="add mod">
-          <ac:chgData name="Are Mjaavatten" userId="00bb58f78e5d171c" providerId="LiveId" clId="{F80FCCAC-22F4-4BD9-BD04-EE2233D1C28B}" dt="2024-10-21T14:59:53.325" v="1428" actId="20577"/>
-          <ac:spMkLst>
-            <pc:docMk/>
-            <pc:sldMk cId="1934544939" sldId="260"/>
-            <ac:spMk id="9" creationId="{48B9EF1C-4D34-81A7-F15F-A6CDBE018BCE}"/>
-          </ac:spMkLst>
-        </pc:spChg>
-        <pc:cxnChg chg="add mod">
-          <ac:chgData name="Are Mjaavatten" userId="00bb58f78e5d171c" providerId="LiveId" clId="{F80FCCAC-22F4-4BD9-BD04-EE2233D1C28B}" dt="2024-10-21T14:56:19.389" v="1411" actId="692"/>
-          <ac:cxnSpMkLst>
-            <pc:docMk/>
-            <pc:sldMk cId="1934544939" sldId="260"/>
-            <ac:cxnSpMk id="4" creationId="{0F99887B-1764-B7D6-E6BF-25CD0E72B9C1}"/>
-          </ac:cxnSpMkLst>
-        </pc:cxnChg>
-        <pc:cxnChg chg="add mod">
-          <ac:chgData name="Are Mjaavatten" userId="00bb58f78e5d171c" providerId="LiveId" clId="{F80FCCAC-22F4-4BD9-BD04-EE2233D1C28B}" dt="2024-10-21T14:59:38.910" v="1425" actId="14100"/>
-          <ac:cxnSpMkLst>
-            <pc:docMk/>
-            <pc:sldMk cId="1934544939" sldId="260"/>
-            <ac:cxnSpMk id="8" creationId="{2E524776-BF20-4E53-7E4A-E6495BC714E0}"/>
-          </ac:cxnSpMkLst>
-        </pc:cxnChg>
       </pc:sldChg>
       <pc:sldChg chg="addSp delSp modSp new del mod">
         <pc:chgData name="Are Mjaavatten" userId="00bb58f78e5d171c" providerId="LiveId" clId="{F80FCCAC-22F4-4BD9-BD04-EE2233D1C28B}" dt="2024-10-21T08:06:45.723" v="1245" actId="2696"/>
@@ -604,30 +355,6 @@
           <pc:docMk/>
           <pc:sldMk cId="3991534619" sldId="264"/>
         </pc:sldMkLst>
-        <pc:spChg chg="mod">
-          <ac:chgData name="Are Mjaavatten" userId="00bb58f78e5d171c" providerId="LiveId" clId="{F80FCCAC-22F4-4BD9-BD04-EE2233D1C28B}" dt="2024-10-21T07:53:13.086" v="906" actId="20577"/>
-          <ac:spMkLst>
-            <pc:docMk/>
-            <pc:sldMk cId="3991534619" sldId="264"/>
-            <ac:spMk id="2" creationId="{CE4C0D81-2423-A327-649E-0289CF1797B6}"/>
-          </ac:spMkLst>
-        </pc:spChg>
-        <pc:spChg chg="mod">
-          <ac:chgData name="Are Mjaavatten" userId="00bb58f78e5d171c" providerId="LiveId" clId="{F80FCCAC-22F4-4BD9-BD04-EE2233D1C28B}" dt="2024-10-21T13:59:52.201" v="1338" actId="20577"/>
-          <ac:spMkLst>
-            <pc:docMk/>
-            <pc:sldMk cId="3991534619" sldId="264"/>
-            <ac:spMk id="3" creationId="{D0ED26A4-2141-C972-F9B5-2DD483F109DF}"/>
-          </ac:spMkLst>
-        </pc:spChg>
-        <pc:picChg chg="add mod">
-          <ac:chgData name="Are Mjaavatten" userId="00bb58f78e5d171c" providerId="LiveId" clId="{F80FCCAC-22F4-4BD9-BD04-EE2233D1C28B}" dt="2024-10-21T08:02:24.163" v="1241" actId="14100"/>
-          <ac:picMkLst>
-            <pc:docMk/>
-            <pc:sldMk cId="3991534619" sldId="264"/>
-            <ac:picMk id="5" creationId="{90D430FE-DA88-164F-C76A-0617314B6D59}"/>
-          </ac:picMkLst>
-        </pc:picChg>
       </pc:sldChg>
       <pc:sldChg chg="addSp delSp modSp new mod">
         <pc:chgData name="Are Mjaavatten" userId="00bb58f78e5d171c" providerId="LiveId" clId="{F80FCCAC-22F4-4BD9-BD04-EE2233D1C28B}" dt="2024-11-06T10:24:24.406" v="16345" actId="20577"/>
@@ -635,22 +362,6 @@
           <pc:docMk/>
           <pc:sldMk cId="993497870" sldId="265"/>
         </pc:sldMkLst>
-        <pc:spChg chg="mod">
-          <ac:chgData name="Are Mjaavatten" userId="00bb58f78e5d171c" providerId="LiveId" clId="{F80FCCAC-22F4-4BD9-BD04-EE2233D1C28B}" dt="2024-10-23T12:28:38.227" v="3176" actId="20577"/>
-          <ac:spMkLst>
-            <pc:docMk/>
-            <pc:sldMk cId="993497870" sldId="265"/>
-            <ac:spMk id="2" creationId="{F2D3ECFB-9F8A-F64C-E0F4-1BA5B941E386}"/>
-          </ac:spMkLst>
-        </pc:spChg>
-        <pc:spChg chg="mod">
-          <ac:chgData name="Are Mjaavatten" userId="00bb58f78e5d171c" providerId="LiveId" clId="{F80FCCAC-22F4-4BD9-BD04-EE2233D1C28B}" dt="2024-10-28T16:12:43.902" v="10619" actId="20577"/>
-          <ac:spMkLst>
-            <pc:docMk/>
-            <pc:sldMk cId="993497870" sldId="265"/>
-            <ac:spMk id="3" creationId="{8AFF1A4D-B6A6-002E-0A17-9D9AD3D3BB33}"/>
-          </ac:spMkLst>
-        </pc:spChg>
       </pc:sldChg>
       <pc:sldChg chg="new del">
         <pc:chgData name="Are Mjaavatten" userId="00bb58f78e5d171c" providerId="LiveId" clId="{F80FCCAC-22F4-4BD9-BD04-EE2233D1C28B}" dt="2024-10-21T07:52:20.046" v="857" actId="2696"/>
@@ -665,22 +376,6 @@
           <pc:docMk/>
           <pc:sldMk cId="951915012" sldId="266"/>
         </pc:sldMkLst>
-        <pc:spChg chg="mod">
-          <ac:chgData name="Are Mjaavatten" userId="00bb58f78e5d171c" providerId="LiveId" clId="{F80FCCAC-22F4-4BD9-BD04-EE2233D1C28B}" dt="2024-10-27T09:48:40.054" v="6569" actId="20577"/>
-          <ac:spMkLst>
-            <pc:docMk/>
-            <pc:sldMk cId="951915012" sldId="266"/>
-            <ac:spMk id="2" creationId="{B69231B1-7C98-B83D-F6E4-08CE8C57E0D6}"/>
-          </ac:spMkLst>
-        </pc:spChg>
-        <pc:spChg chg="mod">
-          <ac:chgData name="Are Mjaavatten" userId="00bb58f78e5d171c" providerId="LiveId" clId="{F80FCCAC-22F4-4BD9-BD04-EE2233D1C28B}" dt="2024-10-27T09:48:50.462" v="6571" actId="14"/>
-          <ac:spMkLst>
-            <pc:docMk/>
-            <pc:sldMk cId="951915012" sldId="266"/>
-            <ac:spMk id="3" creationId="{A7FA766A-B888-9720-5CBA-68732A0A53FB}"/>
-          </ac:spMkLst>
-        </pc:spChg>
       </pc:sldChg>
       <pc:sldChg chg="addSp delSp modSp new mod">
         <pc:chgData name="Are Mjaavatten" userId="00bb58f78e5d171c" providerId="LiveId" clId="{F80FCCAC-22F4-4BD9-BD04-EE2233D1C28B}" dt="2024-10-27T17:07:57.788" v="9458" actId="255"/>
@@ -688,54 +383,6 @@
           <pc:docMk/>
           <pc:sldMk cId="3259227442" sldId="267"/>
         </pc:sldMkLst>
-        <pc:spChg chg="mod">
-          <ac:chgData name="Are Mjaavatten" userId="00bb58f78e5d171c" providerId="LiveId" clId="{F80FCCAC-22F4-4BD9-BD04-EE2233D1C28B}" dt="2024-10-27T17:07:57.788" v="9458" actId="255"/>
-          <ac:spMkLst>
-            <pc:docMk/>
-            <pc:sldMk cId="3259227442" sldId="267"/>
-            <ac:spMk id="2" creationId="{FB5C3201-23DF-4682-0958-BECC9CDDD1F5}"/>
-          </ac:spMkLst>
-        </pc:spChg>
-        <pc:spChg chg="mod">
-          <ac:chgData name="Are Mjaavatten" userId="00bb58f78e5d171c" providerId="LiveId" clId="{F80FCCAC-22F4-4BD9-BD04-EE2233D1C28B}" dt="2024-10-22T15:26:38.936" v="1805" actId="20577"/>
-          <ac:spMkLst>
-            <pc:docMk/>
-            <pc:sldMk cId="3259227442" sldId="267"/>
-            <ac:spMk id="3" creationId="{3D4728BA-7E78-6316-A92F-A75CB283302E}"/>
-          </ac:spMkLst>
-        </pc:spChg>
-        <pc:picChg chg="add mod">
-          <ac:chgData name="Are Mjaavatten" userId="00bb58f78e5d171c" providerId="LiveId" clId="{F80FCCAC-22F4-4BD9-BD04-EE2233D1C28B}" dt="2024-10-21T16:06:24.971" v="1680" actId="1076"/>
-          <ac:picMkLst>
-            <pc:docMk/>
-            <pc:sldMk cId="3259227442" sldId="267"/>
-            <ac:picMk id="5" creationId="{1CE2726E-DD45-FC3B-CAFC-A2B8E059D91E}"/>
-          </ac:picMkLst>
-        </pc:picChg>
-        <pc:picChg chg="add mod">
-          <ac:chgData name="Are Mjaavatten" userId="00bb58f78e5d171c" providerId="LiveId" clId="{F80FCCAC-22F4-4BD9-BD04-EE2233D1C28B}" dt="2024-10-21T16:06:34.853" v="1681" actId="1076"/>
-          <ac:picMkLst>
-            <pc:docMk/>
-            <pc:sldMk cId="3259227442" sldId="267"/>
-            <ac:picMk id="11" creationId="{C72B15C2-9EB2-1D74-A4D3-40581D13A880}"/>
-          </ac:picMkLst>
-        </pc:picChg>
-        <pc:cxnChg chg="add mod">
-          <ac:chgData name="Are Mjaavatten" userId="00bb58f78e5d171c" providerId="LiveId" clId="{F80FCCAC-22F4-4BD9-BD04-EE2233D1C28B}" dt="2024-10-21T16:07:42.352" v="1687" actId="1076"/>
-          <ac:cxnSpMkLst>
-            <pc:docMk/>
-            <pc:sldMk cId="3259227442" sldId="267"/>
-            <ac:cxnSpMk id="12" creationId="{E5E604A6-578E-F871-B431-457676B631C7}"/>
-          </ac:cxnSpMkLst>
-        </pc:cxnChg>
-        <pc:cxnChg chg="add mod">
-          <ac:chgData name="Are Mjaavatten" userId="00bb58f78e5d171c" providerId="LiveId" clId="{F80FCCAC-22F4-4BD9-BD04-EE2233D1C28B}" dt="2024-10-21T16:07:56.754" v="1689" actId="1076"/>
-          <ac:cxnSpMkLst>
-            <pc:docMk/>
-            <pc:sldMk cId="3259227442" sldId="267"/>
-            <ac:cxnSpMk id="15" creationId="{5076AAC4-D082-D799-1A15-3CDBD87CE14E}"/>
-          </ac:cxnSpMkLst>
-        </pc:cxnChg>
       </pc:sldChg>
       <pc:sldChg chg="addSp delSp modSp new mod ord">
         <pc:chgData name="Are Mjaavatten" userId="00bb58f78e5d171c" providerId="LiveId" clId="{F80FCCAC-22F4-4BD9-BD04-EE2233D1C28B}" dt="2024-10-27T17:07:11.468" v="9455"/>
@@ -743,30 +390,6 @@
           <pc:docMk/>
           <pc:sldMk cId="4088723979" sldId="268"/>
         </pc:sldMkLst>
-        <pc:spChg chg="mod">
-          <ac:chgData name="Are Mjaavatten" userId="00bb58f78e5d171c" providerId="LiveId" clId="{F80FCCAC-22F4-4BD9-BD04-EE2233D1C28B}" dt="2024-10-21T16:12:07.647" v="1733"/>
-          <ac:spMkLst>
-            <pc:docMk/>
-            <pc:sldMk cId="4088723979" sldId="268"/>
-            <ac:spMk id="2" creationId="{1C034332-5344-5A7C-3B8E-80942626F8A5}"/>
-          </ac:spMkLst>
-        </pc:spChg>
-        <pc:spChg chg="mod">
-          <ac:chgData name="Are Mjaavatten" userId="00bb58f78e5d171c" providerId="LiveId" clId="{F80FCCAC-22F4-4BD9-BD04-EE2233D1C28B}" dt="2024-10-21T16:12:40.467" v="1790" actId="20577"/>
-          <ac:spMkLst>
-            <pc:docMk/>
-            <pc:sldMk cId="4088723979" sldId="268"/>
-            <ac:spMk id="3" creationId="{ECFFC7D0-390D-95D8-A9EE-32D42ACFE681}"/>
-          </ac:spMkLst>
-        </pc:spChg>
-        <pc:picChg chg="add mod modCrop">
-          <ac:chgData name="Are Mjaavatten" userId="00bb58f78e5d171c" providerId="LiveId" clId="{F80FCCAC-22F4-4BD9-BD04-EE2233D1C28B}" dt="2024-10-23T11:58:28.726" v="2688" actId="1035"/>
-          <ac:picMkLst>
-            <pc:docMk/>
-            <pc:sldMk cId="4088723979" sldId="268"/>
-            <ac:picMk id="7" creationId="{0A934275-0A04-1716-AE83-86D895A03220}"/>
-          </ac:picMkLst>
-        </pc:picChg>
       </pc:sldChg>
       <pc:sldChg chg="addSp modSp new mod">
         <pc:chgData name="Are Mjaavatten" userId="00bb58f78e5d171c" providerId="LiveId" clId="{F80FCCAC-22F4-4BD9-BD04-EE2233D1C28B}" dt="2024-10-28T15:40:36.607" v="10594" actId="2711"/>
@@ -774,38 +397,6 @@
           <pc:docMk/>
           <pc:sldMk cId="34042762" sldId="269"/>
         </pc:sldMkLst>
-        <pc:spChg chg="mod">
-          <ac:chgData name="Are Mjaavatten" userId="00bb58f78e5d171c" providerId="LiveId" clId="{F80FCCAC-22F4-4BD9-BD04-EE2233D1C28B}" dt="2024-10-22T16:15:05.119" v="2445" actId="20577"/>
-          <ac:spMkLst>
-            <pc:docMk/>
-            <pc:sldMk cId="34042762" sldId="269"/>
-            <ac:spMk id="2" creationId="{472EBC0F-0863-FC08-A12B-6E5B523BE5B5}"/>
-          </ac:spMkLst>
-        </pc:spChg>
-        <pc:spChg chg="mod">
-          <ac:chgData name="Are Mjaavatten" userId="00bb58f78e5d171c" providerId="LiveId" clId="{F80FCCAC-22F4-4BD9-BD04-EE2233D1C28B}" dt="2024-10-22T16:24:14.815" v="2645" actId="20577"/>
-          <ac:spMkLst>
-            <pc:docMk/>
-            <pc:sldMk cId="34042762" sldId="269"/>
-            <ac:spMk id="3" creationId="{2E9A1E1F-E1FB-D600-D0EE-A17FB6095AFF}"/>
-          </ac:spMkLst>
-        </pc:spChg>
-        <pc:spChg chg="add mod">
-          <ac:chgData name="Are Mjaavatten" userId="00bb58f78e5d171c" providerId="LiveId" clId="{F80FCCAC-22F4-4BD9-BD04-EE2233D1C28B}" dt="2024-10-28T15:40:36.607" v="10594" actId="2711"/>
-          <ac:spMkLst>
-            <pc:docMk/>
-            <pc:sldMk cId="34042762" sldId="269"/>
-            <ac:spMk id="6" creationId="{92A6A31D-37FF-95B9-730E-0F42FB9048FE}"/>
-          </ac:spMkLst>
-        </pc:spChg>
-        <pc:picChg chg="add mod">
-          <ac:chgData name="Are Mjaavatten" userId="00bb58f78e5d171c" providerId="LiveId" clId="{F80FCCAC-22F4-4BD9-BD04-EE2233D1C28B}" dt="2024-10-22T16:14:12.414" v="2421" actId="14100"/>
-          <ac:picMkLst>
-            <pc:docMk/>
-            <pc:sldMk cId="34042762" sldId="269"/>
-            <ac:picMk id="5" creationId="{7E983D36-8148-C52C-3212-D1C2FF4A54C9}"/>
-          </ac:picMkLst>
-        </pc:picChg>
       </pc:sldChg>
       <pc:sldChg chg="addSp delSp modSp new mod modClrScheme chgLayout">
         <pc:chgData name="Are Mjaavatten" userId="00bb58f78e5d171c" providerId="LiveId" clId="{F80FCCAC-22F4-4BD9-BD04-EE2233D1C28B}" dt="2024-10-23T13:23:10.825" v="3408" actId="14"/>
@@ -813,62 +404,6 @@
           <pc:docMk/>
           <pc:sldMk cId="1708848268" sldId="270"/>
         </pc:sldMkLst>
-        <pc:spChg chg="mod ord">
-          <ac:chgData name="Are Mjaavatten" userId="00bb58f78e5d171c" providerId="LiveId" clId="{F80FCCAC-22F4-4BD9-BD04-EE2233D1C28B}" dt="2024-10-23T12:43:04.020" v="3286" actId="790"/>
-          <ac:spMkLst>
-            <pc:docMk/>
-            <pc:sldMk cId="1708848268" sldId="270"/>
-            <ac:spMk id="2" creationId="{429F0CC3-8EB5-E94E-FB57-EBFB5F3CA65C}"/>
-          </ac:spMkLst>
-        </pc:spChg>
-        <pc:spChg chg="add mod ord">
-          <ac:chgData name="Are Mjaavatten" userId="00bb58f78e5d171c" providerId="LiveId" clId="{F80FCCAC-22F4-4BD9-BD04-EE2233D1C28B}" dt="2024-10-23T13:23:10.825" v="3408" actId="14"/>
-          <ac:spMkLst>
-            <pc:docMk/>
-            <pc:sldMk cId="1708848268" sldId="270"/>
-            <ac:spMk id="8" creationId="{453EC2FA-1F81-E84D-1B88-E0ADE3D4274C}"/>
-          </ac:spMkLst>
-        </pc:spChg>
-        <pc:picChg chg="add mod">
-          <ac:chgData name="Are Mjaavatten" userId="00bb58f78e5d171c" providerId="LiveId" clId="{F80FCCAC-22F4-4BD9-BD04-EE2233D1C28B}" dt="2024-10-23T13:10:55.098" v="3362" actId="14100"/>
-          <ac:picMkLst>
-            <pc:docMk/>
-            <pc:sldMk cId="1708848268" sldId="270"/>
-            <ac:picMk id="11" creationId="{FDB83E84-6DCC-707C-DF23-1B9283BED3C7}"/>
-          </ac:picMkLst>
-        </pc:picChg>
-        <pc:picChg chg="add mod modCrop">
-          <ac:chgData name="Are Mjaavatten" userId="00bb58f78e5d171c" providerId="LiveId" clId="{F80FCCAC-22F4-4BD9-BD04-EE2233D1C28B}" dt="2024-10-23T13:17:19.592" v="3390" actId="1076"/>
-          <ac:picMkLst>
-            <pc:docMk/>
-            <pc:sldMk cId="1708848268" sldId="270"/>
-            <ac:picMk id="15" creationId="{0EC50135-B732-38C7-FFED-38243DCA4CFC}"/>
-          </ac:picMkLst>
-        </pc:picChg>
-        <pc:picChg chg="add mod modCrop">
-          <ac:chgData name="Are Mjaavatten" userId="00bb58f78e5d171c" providerId="LiveId" clId="{F80FCCAC-22F4-4BD9-BD04-EE2233D1C28B}" dt="2024-10-23T13:17:11.162" v="3389" actId="1076"/>
-          <ac:picMkLst>
-            <pc:docMk/>
-            <pc:sldMk cId="1708848268" sldId="270"/>
-            <ac:picMk id="16" creationId="{A0245A41-5E4C-E5DC-1D3C-2415494F96DB}"/>
-          </ac:picMkLst>
-        </pc:picChg>
-        <pc:picChg chg="add mod">
-          <ac:chgData name="Are Mjaavatten" userId="00bb58f78e5d171c" providerId="LiveId" clId="{F80FCCAC-22F4-4BD9-BD04-EE2233D1C28B}" dt="2024-10-23T13:21:20.036" v="3403" actId="1076"/>
-          <ac:picMkLst>
-            <pc:docMk/>
-            <pc:sldMk cId="1708848268" sldId="270"/>
-            <ac:picMk id="19" creationId="{DDFA791A-962F-B7C2-8127-5D9AB5BA51AA}"/>
-          </ac:picMkLst>
-        </pc:picChg>
-        <pc:picChg chg="add mod modCrop">
-          <ac:chgData name="Are Mjaavatten" userId="00bb58f78e5d171c" providerId="LiveId" clId="{F80FCCAC-22F4-4BD9-BD04-EE2233D1C28B}" dt="2024-10-23T13:21:08.368" v="3402" actId="1076"/>
-          <ac:picMkLst>
-            <pc:docMk/>
-            <pc:sldMk cId="1708848268" sldId="270"/>
-            <ac:picMk id="21" creationId="{A5963A2F-03EA-167E-16B7-1A4EBCC3A877}"/>
-          </ac:picMkLst>
-        </pc:picChg>
       </pc:sldChg>
       <pc:sldChg chg="addSp delSp modSp new mod modClrScheme chgLayout">
         <pc:chgData name="Are Mjaavatten" userId="00bb58f78e5d171c" providerId="LiveId" clId="{F80FCCAC-22F4-4BD9-BD04-EE2233D1C28B}" dt="2024-10-29T16:53:52.852" v="14172" actId="1076"/>
@@ -876,30 +411,6 @@
           <pc:docMk/>
           <pc:sldMk cId="2870539914" sldId="271"/>
         </pc:sldMkLst>
-        <pc:spChg chg="mod ord">
-          <ac:chgData name="Are Mjaavatten" userId="00bb58f78e5d171c" providerId="LiveId" clId="{F80FCCAC-22F4-4BD9-BD04-EE2233D1C28B}" dt="2024-10-29T16:50:57.150" v="14042" actId="122"/>
-          <ac:spMkLst>
-            <pc:docMk/>
-            <pc:sldMk cId="2870539914" sldId="271"/>
-            <ac:spMk id="2" creationId="{E533021E-DE16-FF40-6B46-03D9B2773570}"/>
-          </ac:spMkLst>
-        </pc:spChg>
-        <pc:spChg chg="add mod ord">
-          <ac:chgData name="Are Mjaavatten" userId="00bb58f78e5d171c" providerId="LiveId" clId="{F80FCCAC-22F4-4BD9-BD04-EE2233D1C28B}" dt="2024-10-29T16:53:48.671" v="14171" actId="14100"/>
-          <ac:spMkLst>
-            <pc:docMk/>
-            <pc:sldMk cId="2870539914" sldId="271"/>
-            <ac:spMk id="7" creationId="{BD27EE11-78DD-9B9E-5E6A-F2CB4927025F}"/>
-          </ac:spMkLst>
-        </pc:spChg>
-        <pc:spChg chg="add mod ord">
-          <ac:chgData name="Are Mjaavatten" userId="00bb58f78e5d171c" providerId="LiveId" clId="{F80FCCAC-22F4-4BD9-BD04-EE2233D1C28B}" dt="2024-10-29T16:53:52.852" v="14172" actId="1076"/>
-          <ac:spMkLst>
-            <pc:docMk/>
-            <pc:sldMk cId="2870539914" sldId="271"/>
-            <ac:spMk id="8" creationId="{DE312110-5C43-D77C-A2EC-47EB6666D900}"/>
-          </ac:spMkLst>
-        </pc:spChg>
       </pc:sldChg>
       <pc:sldChg chg="modSp new del mod">
         <pc:chgData name="Are Mjaavatten" userId="00bb58f78e5d171c" providerId="LiveId" clId="{F80FCCAC-22F4-4BD9-BD04-EE2233D1C28B}" dt="2024-10-24T12:10:54.160" v="5211" actId="47"/>
@@ -928,22 +439,6 @@
           <pc:docMk/>
           <pc:sldMk cId="929935833" sldId="275"/>
         </pc:sldMkLst>
-        <pc:spChg chg="mod">
-          <ac:chgData name="Are Mjaavatten" userId="00bb58f78e5d171c" providerId="LiveId" clId="{F80FCCAC-22F4-4BD9-BD04-EE2233D1C28B}" dt="2024-11-05T16:46:02.749" v="14176" actId="20577"/>
-          <ac:spMkLst>
-            <pc:docMk/>
-            <pc:sldMk cId="929935833" sldId="275"/>
-            <ac:spMk id="2" creationId="{FAB757F9-8227-22AB-B9DB-7A37DA92DD41}"/>
-          </ac:spMkLst>
-        </pc:spChg>
-        <pc:spChg chg="mod">
-          <ac:chgData name="Are Mjaavatten" userId="00bb58f78e5d171c" providerId="LiveId" clId="{F80FCCAC-22F4-4BD9-BD04-EE2233D1C28B}" dt="2024-10-28T14:05:41.596" v="9775" actId="20577"/>
-          <ac:spMkLst>
-            <pc:docMk/>
-            <pc:sldMk cId="929935833" sldId="275"/>
-            <ac:spMk id="3" creationId="{3EC9A98D-B096-1765-33CD-BCE98D447E91}"/>
-          </ac:spMkLst>
-        </pc:spChg>
       </pc:sldChg>
       <pc:sldChg chg="addSp delSp modSp new mod">
         <pc:chgData name="Are Mjaavatten" userId="00bb58f78e5d171c" providerId="LiveId" clId="{F80FCCAC-22F4-4BD9-BD04-EE2233D1C28B}" dt="2024-11-05T16:51:10.957" v="14245" actId="20577"/>
@@ -951,78 +446,6 @@
           <pc:docMk/>
           <pc:sldMk cId="2297231925" sldId="276"/>
         </pc:sldMkLst>
-        <pc:spChg chg="mod">
-          <ac:chgData name="Are Mjaavatten" userId="00bb58f78e5d171c" providerId="LiveId" clId="{F80FCCAC-22F4-4BD9-BD04-EE2233D1C28B}" dt="2024-10-27T09:13:20.496" v="5956" actId="1076"/>
-          <ac:spMkLst>
-            <pc:docMk/>
-            <pc:sldMk cId="2297231925" sldId="276"/>
-            <ac:spMk id="2" creationId="{16C6BD59-EF69-BCEC-EF5D-08A8A06B54A2}"/>
-          </ac:spMkLst>
-        </pc:spChg>
-        <pc:spChg chg="mod">
-          <ac:chgData name="Are Mjaavatten" userId="00bb58f78e5d171c" providerId="LiveId" clId="{F80FCCAC-22F4-4BD9-BD04-EE2233D1C28B}" dt="2024-11-05T16:51:10.957" v="14245" actId="20577"/>
-          <ac:spMkLst>
-            <pc:docMk/>
-            <pc:sldMk cId="2297231925" sldId="276"/>
-            <ac:spMk id="3" creationId="{B5FCD886-01C1-86A1-9517-53E6F36E8EE2}"/>
-          </ac:spMkLst>
-        </pc:spChg>
-        <pc:spChg chg="add mod">
-          <ac:chgData name="Are Mjaavatten" userId="00bb58f78e5d171c" providerId="LiveId" clId="{F80FCCAC-22F4-4BD9-BD04-EE2233D1C28B}" dt="2024-11-05T16:49:37.158" v="14213" actId="1076"/>
-          <ac:spMkLst>
-            <pc:docMk/>
-            <pc:sldMk cId="2297231925" sldId="276"/>
-            <ac:spMk id="4" creationId="{763B74DF-B858-198F-8C81-220622468539}"/>
-          </ac:spMkLst>
-        </pc:spChg>
-        <pc:spChg chg="add mod">
-          <ac:chgData name="Are Mjaavatten" userId="00bb58f78e5d171c" providerId="LiveId" clId="{F80FCCAC-22F4-4BD9-BD04-EE2233D1C28B}" dt="2024-10-27T09:05:10.292" v="5900" actId="14100"/>
-          <ac:spMkLst>
-            <pc:docMk/>
-            <pc:sldMk cId="2297231925" sldId="276"/>
-            <ac:spMk id="12" creationId="{E238D69F-2917-511D-F0E9-5339A6C2EC7A}"/>
-          </ac:spMkLst>
-        </pc:spChg>
-        <pc:spChg chg="add mod">
-          <ac:chgData name="Are Mjaavatten" userId="00bb58f78e5d171c" providerId="LiveId" clId="{F80FCCAC-22F4-4BD9-BD04-EE2233D1C28B}" dt="2024-10-27T09:06:43.530" v="5916" actId="14100"/>
-          <ac:spMkLst>
-            <pc:docMk/>
-            <pc:sldMk cId="2297231925" sldId="276"/>
-            <ac:spMk id="13" creationId="{6EB5CD59-BCF5-1598-12CF-1A0B7CE7256B}"/>
-          </ac:spMkLst>
-        </pc:spChg>
-        <pc:spChg chg="add mod">
-          <ac:chgData name="Are Mjaavatten" userId="00bb58f78e5d171c" providerId="LiveId" clId="{F80FCCAC-22F4-4BD9-BD04-EE2233D1C28B}" dt="2024-10-27T09:46:18.244" v="6545" actId="1076"/>
-          <ac:spMkLst>
-            <pc:docMk/>
-            <pc:sldMk cId="2297231925" sldId="276"/>
-            <ac:spMk id="16" creationId="{C83EF918-511A-1AA8-437E-BE5CA0A72A74}"/>
-          </ac:spMkLst>
-        </pc:spChg>
-        <pc:picChg chg="add mod">
-          <ac:chgData name="Are Mjaavatten" userId="00bb58f78e5d171c" providerId="LiveId" clId="{F80FCCAC-22F4-4BD9-BD04-EE2233D1C28B}" dt="2024-10-27T09:06:28.038" v="5914" actId="14100"/>
-          <ac:picMkLst>
-            <pc:docMk/>
-            <pc:sldMk cId="2297231925" sldId="276"/>
-            <ac:picMk id="7" creationId="{CAAC37F6-1153-B532-64FD-A0F77FD5DB1A}"/>
-          </ac:picMkLst>
-        </pc:picChg>
-        <pc:picChg chg="add mod ord">
-          <ac:chgData name="Are Mjaavatten" userId="00bb58f78e5d171c" providerId="LiveId" clId="{F80FCCAC-22F4-4BD9-BD04-EE2233D1C28B}" dt="2024-10-27T09:12:18.632" v="5955" actId="1037"/>
-          <ac:picMkLst>
-            <pc:docMk/>
-            <pc:sldMk cId="2297231925" sldId="276"/>
-            <ac:picMk id="15" creationId="{33896AFD-8450-EEE1-E053-0E95931B6094}"/>
-          </ac:picMkLst>
-        </pc:picChg>
-        <pc:cxnChg chg="add mod">
-          <ac:chgData name="Are Mjaavatten" userId="00bb58f78e5d171c" providerId="LiveId" clId="{F80FCCAC-22F4-4BD9-BD04-EE2233D1C28B}" dt="2024-11-05T16:49:29.015" v="14212" actId="14100"/>
-          <ac:cxnSpMkLst>
-            <pc:docMk/>
-            <pc:sldMk cId="2297231925" sldId="276"/>
-            <ac:cxnSpMk id="6" creationId="{E5130747-5D6F-3D21-A166-40485A225484}"/>
-          </ac:cxnSpMkLst>
-        </pc:cxnChg>
       </pc:sldChg>
       <pc:sldChg chg="addSp modSp new del mod">
         <pc:chgData name="Are Mjaavatten" userId="00bb58f78e5d171c" providerId="LiveId" clId="{F80FCCAC-22F4-4BD9-BD04-EE2233D1C28B}" dt="2024-10-27T09:14:12.541" v="5957" actId="47"/>
@@ -1037,22 +460,6 @@
           <pc:docMk/>
           <pc:sldMk cId="3795277216" sldId="277"/>
         </pc:sldMkLst>
-        <pc:spChg chg="mod">
-          <ac:chgData name="Are Mjaavatten" userId="00bb58f78e5d171c" providerId="LiveId" clId="{F80FCCAC-22F4-4BD9-BD04-EE2233D1C28B}" dt="2024-10-27T09:15:00.320" v="5963" actId="20577"/>
-          <ac:spMkLst>
-            <pc:docMk/>
-            <pc:sldMk cId="3795277216" sldId="277"/>
-            <ac:spMk id="2" creationId="{2274DD12-BDFC-8CAF-538D-57560821F713}"/>
-          </ac:spMkLst>
-        </pc:spChg>
-        <pc:spChg chg="mod">
-          <ac:chgData name="Are Mjaavatten" userId="00bb58f78e5d171c" providerId="LiveId" clId="{F80FCCAC-22F4-4BD9-BD04-EE2233D1C28B}" dt="2024-11-05T16:51:59.911" v="14261" actId="20577"/>
-          <ac:spMkLst>
-            <pc:docMk/>
-            <pc:sldMk cId="3795277216" sldId="277"/>
-            <ac:spMk id="3" creationId="{7F22BECD-4858-0BA6-91CA-C9D48FA26E8F}"/>
-          </ac:spMkLst>
-        </pc:spChg>
       </pc:sldChg>
       <pc:sldChg chg="addSp delSp modSp new mod">
         <pc:chgData name="Are Mjaavatten" userId="00bb58f78e5d171c" providerId="LiveId" clId="{F80FCCAC-22F4-4BD9-BD04-EE2233D1C28B}" dt="2024-11-05T16:52:41.605" v="14268" actId="20577"/>
@@ -1060,38 +467,6 @@
           <pc:docMk/>
           <pc:sldMk cId="2958550613" sldId="278"/>
         </pc:sldMkLst>
-        <pc:spChg chg="mod">
-          <ac:chgData name="Are Mjaavatten" userId="00bb58f78e5d171c" providerId="LiveId" clId="{F80FCCAC-22F4-4BD9-BD04-EE2233D1C28B}" dt="2024-10-27T09:49:27.200" v="6596" actId="20577"/>
-          <ac:spMkLst>
-            <pc:docMk/>
-            <pc:sldMk cId="2958550613" sldId="278"/>
-            <ac:spMk id="2" creationId="{054D8866-5159-A701-9D35-CDD4CB7022C2}"/>
-          </ac:spMkLst>
-        </pc:spChg>
-        <pc:spChg chg="mod">
-          <ac:chgData name="Are Mjaavatten" userId="00bb58f78e5d171c" providerId="LiveId" clId="{F80FCCAC-22F4-4BD9-BD04-EE2233D1C28B}" dt="2024-11-05T16:52:41.605" v="14268" actId="20577"/>
-          <ac:spMkLst>
-            <pc:docMk/>
-            <pc:sldMk cId="2958550613" sldId="278"/>
-            <ac:spMk id="3" creationId="{7B5445D7-A644-0FC0-561E-74DFBAAB3012}"/>
-          </ac:spMkLst>
-        </pc:spChg>
-        <pc:picChg chg="add mod">
-          <ac:chgData name="Are Mjaavatten" userId="00bb58f78e5d171c" providerId="LiveId" clId="{F80FCCAC-22F4-4BD9-BD04-EE2233D1C28B}" dt="2024-10-27T13:34:44.118" v="7881" actId="14100"/>
-          <ac:picMkLst>
-            <pc:docMk/>
-            <pc:sldMk cId="2958550613" sldId="278"/>
-            <ac:picMk id="15" creationId="{29DACF69-6516-AC49-2958-2F38C3B83677}"/>
-          </ac:picMkLst>
-        </pc:picChg>
-        <pc:picChg chg="add mod">
-          <ac:chgData name="Are Mjaavatten" userId="00bb58f78e5d171c" providerId="LiveId" clId="{F80FCCAC-22F4-4BD9-BD04-EE2233D1C28B}" dt="2024-10-27T13:34:44.118" v="7881" actId="14100"/>
-          <ac:picMkLst>
-            <pc:docMk/>
-            <pc:sldMk cId="2958550613" sldId="278"/>
-            <ac:picMk id="19" creationId="{057EC24D-423E-2381-39FE-C056493E3900}"/>
-          </ac:picMkLst>
-        </pc:picChg>
       </pc:sldChg>
       <pc:sldChg chg="addSp delSp modSp new mod">
         <pc:chgData name="Are Mjaavatten" userId="00bb58f78e5d171c" providerId="LiveId" clId="{F80FCCAC-22F4-4BD9-BD04-EE2233D1C28B}" dt="2024-10-27T17:05:44.946" v="9453" actId="1076"/>
@@ -1099,38 +474,6 @@
           <pc:docMk/>
           <pc:sldMk cId="2497253767" sldId="279"/>
         </pc:sldMkLst>
-        <pc:spChg chg="mod">
-          <ac:chgData name="Are Mjaavatten" userId="00bb58f78e5d171c" providerId="LiveId" clId="{F80FCCAC-22F4-4BD9-BD04-EE2233D1C28B}" dt="2024-10-27T13:33:51.718" v="7865" actId="20577"/>
-          <ac:spMkLst>
-            <pc:docMk/>
-            <pc:sldMk cId="2497253767" sldId="279"/>
-            <ac:spMk id="2" creationId="{02B9FCEA-A528-96CD-0850-0B0874736F39}"/>
-          </ac:spMkLst>
-        </pc:spChg>
-        <pc:spChg chg="mod">
-          <ac:chgData name="Are Mjaavatten" userId="00bb58f78e5d171c" providerId="LiveId" clId="{F80FCCAC-22F4-4BD9-BD04-EE2233D1C28B}" dt="2024-10-27T17:02:35.761" v="9367" actId="5793"/>
-          <ac:spMkLst>
-            <pc:docMk/>
-            <pc:sldMk cId="2497253767" sldId="279"/>
-            <ac:spMk id="3" creationId="{CEE8AD73-E6B1-1667-A41C-EFC9F4F304D5}"/>
-          </ac:spMkLst>
-        </pc:spChg>
-        <pc:spChg chg="add del mod">
-          <ac:chgData name="Are Mjaavatten" userId="00bb58f78e5d171c" providerId="LiveId" clId="{F80FCCAC-22F4-4BD9-BD04-EE2233D1C28B}" dt="2024-10-27T17:05:44.946" v="9453" actId="1076"/>
-          <ac:spMkLst>
-            <pc:docMk/>
-            <pc:sldMk cId="2497253767" sldId="279"/>
-            <ac:spMk id="8" creationId="{DA8AFFDB-8691-6257-B2A9-FD1068F907F6}"/>
-          </ac:spMkLst>
-        </pc:spChg>
-        <pc:picChg chg="add mod">
-          <ac:chgData name="Are Mjaavatten" userId="00bb58f78e5d171c" providerId="LiveId" clId="{F80FCCAC-22F4-4BD9-BD04-EE2233D1C28B}" dt="2024-10-27T13:46:42.957" v="8538" actId="1076"/>
-          <ac:picMkLst>
-            <pc:docMk/>
-            <pc:sldMk cId="2497253767" sldId="279"/>
-            <ac:picMk id="7" creationId="{17016E48-11B6-2DAA-ACA3-0FE3AED9513D}"/>
-          </ac:picMkLst>
-        </pc:picChg>
       </pc:sldChg>
       <pc:sldChg chg="addSp delSp modSp new del mod ord">
         <pc:chgData name="Are Mjaavatten" userId="00bb58f78e5d171c" providerId="LiveId" clId="{F80FCCAC-22F4-4BD9-BD04-EE2233D1C28B}" dt="2024-10-29T16:34:09.748" v="13850" actId="47"/>
@@ -1152,22 +495,6 @@
           <pc:docMk/>
           <pc:sldMk cId="3816220206" sldId="281"/>
         </pc:sldMkLst>
-        <pc:spChg chg="mod">
-          <ac:chgData name="Are Mjaavatten" userId="00bb58f78e5d171c" providerId="LiveId" clId="{F80FCCAC-22F4-4BD9-BD04-EE2233D1C28B}" dt="2024-10-28T14:12:58.066" v="9970" actId="20577"/>
-          <ac:spMkLst>
-            <pc:docMk/>
-            <pc:sldMk cId="3816220206" sldId="281"/>
-            <ac:spMk id="2" creationId="{007274B8-4871-681C-A44C-BACC989A3AEF}"/>
-          </ac:spMkLst>
-        </pc:spChg>
-        <pc:spChg chg="mod">
-          <ac:chgData name="Are Mjaavatten" userId="00bb58f78e5d171c" providerId="LiveId" clId="{F80FCCAC-22F4-4BD9-BD04-EE2233D1C28B}" dt="2024-10-29T16:36:04.576" v="13858" actId="20577"/>
-          <ac:spMkLst>
-            <pc:docMk/>
-            <pc:sldMk cId="3816220206" sldId="281"/>
-            <ac:spMk id="3" creationId="{D69F0E18-403E-2856-0E01-F43BC137040A}"/>
-          </ac:spMkLst>
-        </pc:spChg>
       </pc:sldChg>
       <pc:sldChg chg="modSp new del mod">
         <pc:chgData name="Are Mjaavatten" userId="00bb58f78e5d171c" providerId="LiveId" clId="{F80FCCAC-22F4-4BD9-BD04-EE2233D1C28B}" dt="2024-10-28T16:10:44.900" v="10606" actId="47"/>
@@ -1189,86 +516,6 @@
           <pc:docMk/>
           <pc:sldMk cId="2908438448" sldId="283"/>
         </pc:sldMkLst>
-        <pc:spChg chg="mod">
-          <ac:chgData name="Are Mjaavatten" userId="00bb58f78e5d171c" providerId="LiveId" clId="{F80FCCAC-22F4-4BD9-BD04-EE2233D1C28B}" dt="2024-10-28T16:51:07.565" v="10812" actId="255"/>
-          <ac:spMkLst>
-            <pc:docMk/>
-            <pc:sldMk cId="2908438448" sldId="283"/>
-            <ac:spMk id="2" creationId="{0E2220A7-5ACD-B443-8709-6C3E184F58A3}"/>
-          </ac:spMkLst>
-        </pc:spChg>
-        <pc:spChg chg="mod">
-          <ac:chgData name="Are Mjaavatten" userId="00bb58f78e5d171c" providerId="LiveId" clId="{F80FCCAC-22F4-4BD9-BD04-EE2233D1C28B}" dt="2024-10-28T17:07:32.420" v="11286" actId="5793"/>
-          <ac:spMkLst>
-            <pc:docMk/>
-            <pc:sldMk cId="2908438448" sldId="283"/>
-            <ac:spMk id="3" creationId="{32D90A08-2F5A-528B-1339-11923FD34D21}"/>
-          </ac:spMkLst>
-        </pc:spChg>
-        <pc:picChg chg="add mod">
-          <ac:chgData name="Are Mjaavatten" userId="00bb58f78e5d171c" providerId="LiveId" clId="{F80FCCAC-22F4-4BD9-BD04-EE2233D1C28B}" dt="2024-10-28T16:53:19.189" v="10852" actId="1076"/>
-          <ac:picMkLst>
-            <pc:docMk/>
-            <pc:sldMk cId="2908438448" sldId="283"/>
-            <ac:picMk id="4" creationId="{8042E31A-9F79-974E-EBB5-320AF4E04EA4}"/>
-          </ac:picMkLst>
-        </pc:picChg>
-        <pc:picChg chg="add mod">
-          <ac:chgData name="Are Mjaavatten" userId="00bb58f78e5d171c" providerId="LiveId" clId="{F80FCCAC-22F4-4BD9-BD04-EE2233D1C28B}" dt="2024-10-28T16:53:23.539" v="10853" actId="1076"/>
-          <ac:picMkLst>
-            <pc:docMk/>
-            <pc:sldMk cId="2908438448" sldId="283"/>
-            <ac:picMk id="5" creationId="{C8D1550D-2DD5-C4F0-63AE-8FD71AAC73F3}"/>
-          </ac:picMkLst>
-        </pc:picChg>
-        <pc:picChg chg="add mod">
-          <ac:chgData name="Are Mjaavatten" userId="00bb58f78e5d171c" providerId="LiveId" clId="{F80FCCAC-22F4-4BD9-BD04-EE2233D1C28B}" dt="2024-10-28T16:55:01.360" v="10876" actId="1076"/>
-          <ac:picMkLst>
-            <pc:docMk/>
-            <pc:sldMk cId="2908438448" sldId="283"/>
-            <ac:picMk id="7" creationId="{780D0ADD-3ECA-5FAA-AF0C-986B38A1050A}"/>
-          </ac:picMkLst>
-        </pc:picChg>
-        <pc:picChg chg="add mod">
-          <ac:chgData name="Are Mjaavatten" userId="00bb58f78e5d171c" providerId="LiveId" clId="{F80FCCAC-22F4-4BD9-BD04-EE2233D1C28B}" dt="2024-10-28T16:55:43.109" v="10881" actId="14100"/>
-          <ac:picMkLst>
-            <pc:docMk/>
-            <pc:sldMk cId="2908438448" sldId="283"/>
-            <ac:picMk id="9" creationId="{895041DC-6383-1262-2FFD-4E721542E5F8}"/>
-          </ac:picMkLst>
-        </pc:picChg>
-        <pc:picChg chg="add mod">
-          <ac:chgData name="Are Mjaavatten" userId="00bb58f78e5d171c" providerId="LiveId" clId="{F80FCCAC-22F4-4BD9-BD04-EE2233D1C28B}" dt="2024-10-28T16:57:19.568" v="10919" actId="1076"/>
-          <ac:picMkLst>
-            <pc:docMk/>
-            <pc:sldMk cId="2908438448" sldId="283"/>
-            <ac:picMk id="11" creationId="{A3016F4F-D079-6344-859F-67BACF8C125C}"/>
-          </ac:picMkLst>
-        </pc:picChg>
-        <pc:picChg chg="add mod">
-          <ac:chgData name="Are Mjaavatten" userId="00bb58f78e5d171c" providerId="LiveId" clId="{F80FCCAC-22F4-4BD9-BD04-EE2233D1C28B}" dt="2024-10-28T17:00:14.064" v="11031" actId="1035"/>
-          <ac:picMkLst>
-            <pc:docMk/>
-            <pc:sldMk cId="2908438448" sldId="283"/>
-            <ac:picMk id="15" creationId="{4B7608BA-6B77-DD29-2960-AE8EC0325753}"/>
-          </ac:picMkLst>
-        </pc:picChg>
-        <pc:picChg chg="add mod">
-          <ac:chgData name="Are Mjaavatten" userId="00bb58f78e5d171c" providerId="LiveId" clId="{F80FCCAC-22F4-4BD9-BD04-EE2233D1C28B}" dt="2024-10-28T17:04:25.981" v="11156" actId="14100"/>
-          <ac:picMkLst>
-            <pc:docMk/>
-            <pc:sldMk cId="2908438448" sldId="283"/>
-            <ac:picMk id="17" creationId="{CFE33738-307E-D8E8-73CE-B921BD9008E3}"/>
-          </ac:picMkLst>
-        </pc:picChg>
-        <pc:picChg chg="add mod">
-          <ac:chgData name="Are Mjaavatten" userId="00bb58f78e5d171c" providerId="LiveId" clId="{F80FCCAC-22F4-4BD9-BD04-EE2233D1C28B}" dt="2024-10-28T17:06:12.206" v="11251" actId="14100"/>
-          <ac:picMkLst>
-            <pc:docMk/>
-            <pc:sldMk cId="2908438448" sldId="283"/>
-            <ac:picMk id="19" creationId="{D9474D78-9CAF-FE0F-F3A7-817EAAEA0C57}"/>
-          </ac:picMkLst>
-        </pc:picChg>
       </pc:sldChg>
       <pc:sldChg chg="addSp delSp modSp new mod">
         <pc:chgData name="Are Mjaavatten" userId="00bb58f78e5d171c" providerId="LiveId" clId="{F80FCCAC-22F4-4BD9-BD04-EE2233D1C28B}" dt="2024-11-06T09:44:30.893" v="15769" actId="313"/>
@@ -1276,22 +523,6 @@
           <pc:docMk/>
           <pc:sldMk cId="2086630511" sldId="284"/>
         </pc:sldMkLst>
-        <pc:spChg chg="mod">
-          <ac:chgData name="Are Mjaavatten" userId="00bb58f78e5d171c" providerId="LiveId" clId="{F80FCCAC-22F4-4BD9-BD04-EE2233D1C28B}" dt="2024-10-29T10:27:40.073" v="12818" actId="20577"/>
-          <ac:spMkLst>
-            <pc:docMk/>
-            <pc:sldMk cId="2086630511" sldId="284"/>
-            <ac:spMk id="2" creationId="{78D0C970-EEBF-05B1-FF2C-E7E978A7A8DA}"/>
-          </ac:spMkLst>
-        </pc:spChg>
-        <pc:spChg chg="mod">
-          <ac:chgData name="Are Mjaavatten" userId="00bb58f78e5d171c" providerId="LiveId" clId="{F80FCCAC-22F4-4BD9-BD04-EE2233D1C28B}" dt="2024-11-06T09:44:30.893" v="15769" actId="313"/>
-          <ac:spMkLst>
-            <pc:docMk/>
-            <pc:sldMk cId="2086630511" sldId="284"/>
-            <ac:spMk id="3" creationId="{5450935E-3A40-D7CF-8176-D0364C5C9505}"/>
-          </ac:spMkLst>
-        </pc:spChg>
       </pc:sldChg>
       <pc:sldChg chg="modSp new mod">
         <pc:chgData name="Are Mjaavatten" userId="00bb58f78e5d171c" providerId="LiveId" clId="{F80FCCAC-22F4-4BD9-BD04-EE2233D1C28B}" dt="2024-10-29T10:27:56.419" v="12845" actId="20577"/>
@@ -1299,22 +530,6 @@
           <pc:docMk/>
           <pc:sldMk cId="884547013" sldId="285"/>
         </pc:sldMkLst>
-        <pc:spChg chg="mod">
-          <ac:chgData name="Are Mjaavatten" userId="00bb58f78e5d171c" providerId="LiveId" clId="{F80FCCAC-22F4-4BD9-BD04-EE2233D1C28B}" dt="2024-10-29T10:27:56.419" v="12845" actId="20577"/>
-          <ac:spMkLst>
-            <pc:docMk/>
-            <pc:sldMk cId="884547013" sldId="285"/>
-            <ac:spMk id="2" creationId="{C373C1A9-A330-F9C2-C99C-940FD700E964}"/>
-          </ac:spMkLst>
-        </pc:spChg>
-        <pc:spChg chg="mod">
-          <ac:chgData name="Are Mjaavatten" userId="00bb58f78e5d171c" providerId="LiveId" clId="{F80FCCAC-22F4-4BD9-BD04-EE2233D1C28B}" dt="2024-10-29T10:24:53.440" v="12780" actId="20577"/>
-          <ac:spMkLst>
-            <pc:docMk/>
-            <pc:sldMk cId="884547013" sldId="285"/>
-            <ac:spMk id="3" creationId="{B0163CB2-48D0-F0C3-D103-BDC6D7DEA086}"/>
-          </ac:spMkLst>
-        </pc:spChg>
       </pc:sldChg>
       <pc:sldChg chg="addSp delSp modSp new mod setBg modClrScheme chgLayout">
         <pc:chgData name="Are Mjaavatten" userId="00bb58f78e5d171c" providerId="LiveId" clId="{F80FCCAC-22F4-4BD9-BD04-EE2233D1C28B}" dt="2024-11-06T08:36:35.310" v="14459" actId="1036"/>
@@ -1322,30 +537,6 @@
           <pc:docMk/>
           <pc:sldMk cId="935628899" sldId="286"/>
         </pc:sldMkLst>
-        <pc:spChg chg="add mod ord">
-          <ac:chgData name="Are Mjaavatten" userId="00bb58f78e5d171c" providerId="LiveId" clId="{F80FCCAC-22F4-4BD9-BD04-EE2233D1C28B}" dt="2024-11-06T08:22:16.710" v="14276" actId="1076"/>
-          <ac:spMkLst>
-            <pc:docMk/>
-            <pc:sldMk cId="935628899" sldId="286"/>
-            <ac:spMk id="20" creationId="{21C27A0D-A4E4-86C4-A0F3-9820C8B82E10}"/>
-          </ac:spMkLst>
-        </pc:spChg>
-        <pc:picChg chg="add mod">
-          <ac:chgData name="Are Mjaavatten" userId="00bb58f78e5d171c" providerId="LiveId" clId="{F80FCCAC-22F4-4BD9-BD04-EE2233D1C28B}" dt="2024-11-06T08:23:14.012" v="14378" actId="1076"/>
-          <ac:picMkLst>
-            <pc:docMk/>
-            <pc:sldMk cId="935628899" sldId="286"/>
-            <ac:picMk id="3" creationId="{3F820652-CFC3-8829-6FAE-09E685B18049}"/>
-          </ac:picMkLst>
-        </pc:picChg>
-        <pc:picChg chg="add mod">
-          <ac:chgData name="Are Mjaavatten" userId="00bb58f78e5d171c" providerId="LiveId" clId="{F80FCCAC-22F4-4BD9-BD04-EE2233D1C28B}" dt="2024-11-06T08:36:35.310" v="14459" actId="1036"/>
-          <ac:picMkLst>
-            <pc:docMk/>
-            <pc:sldMk cId="935628899" sldId="286"/>
-            <ac:picMk id="5" creationId="{2B192BF8-F855-8968-4F0A-557EA74A02EE}"/>
-          </ac:picMkLst>
-        </pc:picChg>
       </pc:sldChg>
       <pc:sldChg chg="addSp delSp modSp new mod modClrScheme chgLayout">
         <pc:chgData name="Are Mjaavatten" userId="00bb58f78e5d171c" providerId="LiveId" clId="{F80FCCAC-22F4-4BD9-BD04-EE2233D1C28B}" dt="2024-11-06T08:38:05.499" v="14483" actId="1038"/>
@@ -1353,30 +544,6 @@
           <pc:docMk/>
           <pc:sldMk cId="3923112241" sldId="287"/>
         </pc:sldMkLst>
-        <pc:spChg chg="add mod ord">
-          <ac:chgData name="Are Mjaavatten" userId="00bb58f78e5d171c" providerId="LiveId" clId="{F80FCCAC-22F4-4BD9-BD04-EE2233D1C28B}" dt="2024-10-29T16:27:10.433" v="13462"/>
-          <ac:spMkLst>
-            <pc:docMk/>
-            <pc:sldMk cId="3923112241" sldId="287"/>
-            <ac:spMk id="3" creationId="{26D5C9CB-F7BE-44A8-1C2F-855D765E1E13}"/>
-          </ac:spMkLst>
-        </pc:spChg>
-        <pc:spChg chg="add mod ord">
-          <ac:chgData name="Are Mjaavatten" userId="00bb58f78e5d171c" providerId="LiveId" clId="{F80FCCAC-22F4-4BD9-BD04-EE2233D1C28B}" dt="2024-11-06T08:37:30.539" v="14463" actId="20577"/>
-          <ac:spMkLst>
-            <pc:docMk/>
-            <pc:sldMk cId="3923112241" sldId="287"/>
-            <ac:spMk id="4" creationId="{6BF09426-A00E-F54E-ED38-ED13250CE22D}"/>
-          </ac:spMkLst>
-        </pc:spChg>
-        <pc:picChg chg="add mod">
-          <ac:chgData name="Are Mjaavatten" userId="00bb58f78e5d171c" providerId="LiveId" clId="{F80FCCAC-22F4-4BD9-BD04-EE2233D1C28B}" dt="2024-11-06T08:38:05.499" v="14483" actId="1038"/>
-          <ac:picMkLst>
-            <pc:docMk/>
-            <pc:sldMk cId="3923112241" sldId="287"/>
-            <ac:picMk id="2" creationId="{FA090F91-DDFD-537E-FFE4-C32A21FD2D1B}"/>
-          </ac:picMkLst>
-        </pc:picChg>
       </pc:sldChg>
       <pc:sldChg chg="addSp modSp new mod">
         <pc:chgData name="Are Mjaavatten" userId="00bb58f78e5d171c" providerId="LiveId" clId="{F80FCCAC-22F4-4BD9-BD04-EE2233D1C28B}" dt="2024-10-29T16:40:59.663" v="13945" actId="20577"/>
@@ -1384,22 +551,6 @@
           <pc:docMk/>
           <pc:sldMk cId="3156030858" sldId="288"/>
         </pc:sldMkLst>
-        <pc:spChg chg="mod">
-          <ac:chgData name="Are Mjaavatten" userId="00bb58f78e5d171c" providerId="LiveId" clId="{F80FCCAC-22F4-4BD9-BD04-EE2233D1C28B}" dt="2024-10-29T16:40:59.663" v="13945" actId="20577"/>
-          <ac:spMkLst>
-            <pc:docMk/>
-            <pc:sldMk cId="3156030858" sldId="288"/>
-            <ac:spMk id="3" creationId="{64DD5B0D-9B53-6491-1E1E-0D1AD518870C}"/>
-          </ac:spMkLst>
-        </pc:spChg>
-        <pc:picChg chg="add mod">
-          <ac:chgData name="Are Mjaavatten" userId="00bb58f78e5d171c" providerId="LiveId" clId="{F80FCCAC-22F4-4BD9-BD04-EE2233D1C28B}" dt="2024-10-29T16:40:46.700" v="13941" actId="1076"/>
-          <ac:picMkLst>
-            <pc:docMk/>
-            <pc:sldMk cId="3156030858" sldId="288"/>
-            <ac:picMk id="6" creationId="{92DF7DC8-8AB0-896E-05FB-7C3413DCD21A}"/>
-          </ac:picMkLst>
-        </pc:picChg>
       </pc:sldChg>
       <pc:sldChg chg="modSp new del mod">
         <pc:chgData name="Are Mjaavatten" userId="00bb58f78e5d171c" providerId="LiveId" clId="{F80FCCAC-22F4-4BD9-BD04-EE2233D1C28B}" dt="2024-11-06T15:25:22.440" v="16346" actId="2696"/>
@@ -1421,20 +572,65 @@
           <pc:docMk/>
           <pc:sldMk cId="2204234833" sldId="290"/>
         </pc:sldMkLst>
+      </pc:sldChg>
+    </pc:docChg>
+  </pc:docChgLst>
+  <pc:docChgLst>
+    <pc:chgData name="Are Mjaavatten" userId="00bb58f78e5d171c" providerId="LiveId" clId="{6B5B7818-72E3-4F31-AB95-67CDB43C58F2}"/>
+    <pc:docChg chg="undo custSel addSld delSld modSld">
+      <pc:chgData name="Are Mjaavatten" userId="00bb58f78e5d171c" providerId="LiveId" clId="{6B5B7818-72E3-4F31-AB95-67CDB43C58F2}" dt="2025-04-10T08:54:08.720" v="20" actId="20577"/>
+      <pc:docMkLst>
+        <pc:docMk/>
+      </pc:docMkLst>
+      <pc:sldChg chg="modSp mod">
+        <pc:chgData name="Are Mjaavatten" userId="00bb58f78e5d171c" providerId="LiveId" clId="{6B5B7818-72E3-4F31-AB95-67CDB43C58F2}" dt="2025-04-10T08:47:58.241" v="2" actId="20577"/>
+        <pc:sldMkLst>
+          <pc:docMk/>
+          <pc:sldMk cId="2060213347" sldId="257"/>
+        </pc:sldMkLst>
         <pc:spChg chg="mod">
-          <ac:chgData name="Are Mjaavatten" userId="00bb58f78e5d171c" providerId="LiveId" clId="{F80FCCAC-22F4-4BD9-BD04-EE2233D1C28B}" dt="2024-11-06T09:44:08.512" v="15762" actId="313"/>
+          <ac:chgData name="Are Mjaavatten" userId="00bb58f78e5d171c" providerId="LiveId" clId="{6B5B7818-72E3-4F31-AB95-67CDB43C58F2}" dt="2025-04-10T08:47:58.241" v="2" actId="20577"/>
           <ac:spMkLst>
             <pc:docMk/>
-            <pc:sldMk cId="2204234833" sldId="290"/>
-            <ac:spMk id="2" creationId="{46C48805-6E71-9540-F0AA-92613C975FBF}"/>
+            <pc:sldMk cId="2060213347" sldId="257"/>
+            <ac:spMk id="3" creationId="{36353399-9D56-01E3-F12D-E417C0FD7DF7}"/>
           </ac:spMkLst>
         </pc:spChg>
+      </pc:sldChg>
+      <pc:sldChg chg="add del">
+        <pc:chgData name="Are Mjaavatten" userId="00bb58f78e5d171c" providerId="LiveId" clId="{6B5B7818-72E3-4F31-AB95-67CDB43C58F2}" dt="2025-04-10T08:52:02.084" v="18" actId="2696"/>
+        <pc:sldMkLst>
+          <pc:docMk/>
+          <pc:sldMk cId="2958550613" sldId="278"/>
+        </pc:sldMkLst>
+      </pc:sldChg>
+      <pc:sldChg chg="modSp mod">
+        <pc:chgData name="Are Mjaavatten" userId="00bb58f78e5d171c" providerId="LiveId" clId="{6B5B7818-72E3-4F31-AB95-67CDB43C58F2}" dt="2025-04-10T08:54:08.720" v="20" actId="20577"/>
+        <pc:sldMkLst>
+          <pc:docMk/>
+          <pc:sldMk cId="2158410459" sldId="293"/>
+        </pc:sldMkLst>
         <pc:spChg chg="mod">
-          <ac:chgData name="Are Mjaavatten" userId="00bb58f78e5d171c" providerId="LiveId" clId="{F80FCCAC-22F4-4BD9-BD04-EE2233D1C28B}" dt="2024-11-06T10:07:30.562" v="16341" actId="20577"/>
+          <ac:chgData name="Are Mjaavatten" userId="00bb58f78e5d171c" providerId="LiveId" clId="{6B5B7818-72E3-4F31-AB95-67CDB43C58F2}" dt="2025-04-10T08:54:08.720" v="20" actId="20577"/>
           <ac:spMkLst>
             <pc:docMk/>
-            <pc:sldMk cId="2204234833" sldId="290"/>
-            <ac:spMk id="3" creationId="{2E6D2D2F-9CE8-051E-3EDD-49C2FA6ADBD3}"/>
+            <pc:sldMk cId="2158410459" sldId="293"/>
+            <ac:spMk id="3" creationId="{EA2D0C46-3AD9-3956-1DDB-02EFB5682D96}"/>
+          </ac:spMkLst>
+        </pc:spChg>
+      </pc:sldChg>
+      <pc:sldChg chg="modSp del mod">
+        <pc:chgData name="Are Mjaavatten" userId="00bb58f78e5d171c" providerId="LiveId" clId="{6B5B7818-72E3-4F31-AB95-67CDB43C58F2}" dt="2025-04-10T08:52:14.278" v="19" actId="2696"/>
+        <pc:sldMkLst>
+          <pc:docMk/>
+          <pc:sldMk cId="232088836" sldId="318"/>
+        </pc:sldMkLst>
+        <pc:spChg chg="mod">
+          <ac:chgData name="Are Mjaavatten" userId="00bb58f78e5d171c" providerId="LiveId" clId="{6B5B7818-72E3-4F31-AB95-67CDB43C58F2}" dt="2025-04-10T08:51:30.731" v="16" actId="20577"/>
+          <ac:spMkLst>
+            <pc:docMk/>
+            <pc:sldMk cId="232088836" sldId="318"/>
+            <ac:spMk id="3" creationId="{3C134FFE-4202-599D-4DE1-2A816323D0CF}"/>
           </ac:spMkLst>
         </pc:spChg>
       </pc:sldChg>
@@ -1453,14 +649,6 @@
           <pc:docMk/>
           <pc:sldMk cId="2060213347" sldId="257"/>
         </pc:sldMkLst>
-        <pc:spChg chg="mod">
-          <ac:chgData name="Are Mjaavatten" userId="00bb58f78e5d171c" providerId="LiveId" clId="{055438CC-AB35-4861-8EC0-1B0371FB636C}" dt="2024-11-30T16:34:43.810" v="3429" actId="20577"/>
-          <ac:spMkLst>
-            <pc:docMk/>
-            <pc:sldMk cId="2060213347" sldId="257"/>
-            <ac:spMk id="3" creationId="{36353399-9D56-01E3-F12D-E417C0FD7DF7}"/>
-          </ac:spMkLst>
-        </pc:spChg>
       </pc:sldChg>
       <pc:sldChg chg="addSp delSp modSp mod">
         <pc:chgData name="Are Mjaavatten" userId="00bb58f78e5d171c" providerId="LiveId" clId="{055438CC-AB35-4861-8EC0-1B0371FB636C}" dt="2024-11-23T11:50:18.933" v="3103" actId="1076"/>
@@ -1468,14 +656,6 @@
           <pc:docMk/>
           <pc:sldMk cId="1865247118" sldId="258"/>
         </pc:sldMkLst>
-        <pc:picChg chg="add mod">
-          <ac:chgData name="Are Mjaavatten" userId="00bb58f78e5d171c" providerId="LiveId" clId="{055438CC-AB35-4861-8EC0-1B0371FB636C}" dt="2024-11-23T11:50:18.933" v="3103" actId="1076"/>
-          <ac:picMkLst>
-            <pc:docMk/>
-            <pc:sldMk cId="1865247118" sldId="258"/>
-            <ac:picMk id="4" creationId="{A7276E8E-6E7C-49C8-02C1-CB26C47E1EAF}"/>
-          </ac:picMkLst>
-        </pc:picChg>
       </pc:sldChg>
       <pc:sldChg chg="modSp mod">
         <pc:chgData name="Are Mjaavatten" userId="00bb58f78e5d171c" providerId="LiveId" clId="{055438CC-AB35-4861-8EC0-1B0371FB636C}" dt="2024-11-23T11:35:58.875" v="3090" actId="20577"/>
@@ -1483,14 +663,6 @@
           <pc:docMk/>
           <pc:sldMk cId="951015916" sldId="259"/>
         </pc:sldMkLst>
-        <pc:spChg chg="mod">
-          <ac:chgData name="Are Mjaavatten" userId="00bb58f78e5d171c" providerId="LiveId" clId="{055438CC-AB35-4861-8EC0-1B0371FB636C}" dt="2024-11-23T11:35:58.875" v="3090" actId="20577"/>
-          <ac:spMkLst>
-            <pc:docMk/>
-            <pc:sldMk cId="951015916" sldId="259"/>
-            <ac:spMk id="3" creationId="{26D403B4-3D4C-2078-2A01-4ACE7A34BB43}"/>
-          </ac:spMkLst>
-        </pc:spChg>
       </pc:sldChg>
       <pc:sldChg chg="addSp delSp modSp mod">
         <pc:chgData name="Are Mjaavatten" userId="00bb58f78e5d171c" providerId="LiveId" clId="{055438CC-AB35-4861-8EC0-1B0371FB636C}" dt="2024-11-12T08:47:21.489" v="2786" actId="20577"/>
@@ -1498,54 +670,6 @@
           <pc:docMk/>
           <pc:sldMk cId="1934544939" sldId="260"/>
         </pc:sldMkLst>
-        <pc:spChg chg="mod">
-          <ac:chgData name="Are Mjaavatten" userId="00bb58f78e5d171c" providerId="LiveId" clId="{055438CC-AB35-4861-8EC0-1B0371FB636C}" dt="2024-11-12T08:46:52.604" v="2783" actId="1038"/>
-          <ac:spMkLst>
-            <pc:docMk/>
-            <pc:sldMk cId="1934544939" sldId="260"/>
-            <ac:spMk id="5" creationId="{3E44772C-FCD0-F733-CD3A-25A5577D1D5B}"/>
-          </ac:spMkLst>
-        </pc:spChg>
-        <pc:spChg chg="mod">
-          <ac:chgData name="Are Mjaavatten" userId="00bb58f78e5d171c" providerId="LiveId" clId="{055438CC-AB35-4861-8EC0-1B0371FB636C}" dt="2024-11-12T08:47:21.489" v="2786" actId="20577"/>
-          <ac:spMkLst>
-            <pc:docMk/>
-            <pc:sldMk cId="1934544939" sldId="260"/>
-            <ac:spMk id="7" creationId="{54E86455-D2B9-C99C-0ACF-02AF4D2EA321}"/>
-          </ac:spMkLst>
-        </pc:spChg>
-        <pc:spChg chg="mod">
-          <ac:chgData name="Are Mjaavatten" userId="00bb58f78e5d171c" providerId="LiveId" clId="{055438CC-AB35-4861-8EC0-1B0371FB636C}" dt="2024-11-12T08:46:52.604" v="2783" actId="1038"/>
-          <ac:spMkLst>
-            <pc:docMk/>
-            <pc:sldMk cId="1934544939" sldId="260"/>
-            <ac:spMk id="9" creationId="{48B9EF1C-4D34-81A7-F15F-A6CDBE018BCE}"/>
-          </ac:spMkLst>
-        </pc:spChg>
-        <pc:picChg chg="add mod ord modCrop">
-          <ac:chgData name="Are Mjaavatten" userId="00bb58f78e5d171c" providerId="LiveId" clId="{055438CC-AB35-4861-8EC0-1B0371FB636C}" dt="2024-11-12T08:46:52.604" v="2783" actId="1038"/>
-          <ac:picMkLst>
-            <pc:docMk/>
-            <pc:sldMk cId="1934544939" sldId="260"/>
-            <ac:picMk id="10" creationId="{38FAE64A-303E-BAFF-8734-6ACA1FC9A7EB}"/>
-          </ac:picMkLst>
-        </pc:picChg>
-        <pc:cxnChg chg="mod">
-          <ac:chgData name="Are Mjaavatten" userId="00bb58f78e5d171c" providerId="LiveId" clId="{055438CC-AB35-4861-8EC0-1B0371FB636C}" dt="2024-11-12T08:46:52.604" v="2783" actId="1038"/>
-          <ac:cxnSpMkLst>
-            <pc:docMk/>
-            <pc:sldMk cId="1934544939" sldId="260"/>
-            <ac:cxnSpMk id="4" creationId="{0F99887B-1764-B7D6-E6BF-25CD0E72B9C1}"/>
-          </ac:cxnSpMkLst>
-        </pc:cxnChg>
-        <pc:cxnChg chg="mod">
-          <ac:chgData name="Are Mjaavatten" userId="00bb58f78e5d171c" providerId="LiveId" clId="{055438CC-AB35-4861-8EC0-1B0371FB636C}" dt="2024-11-12T08:46:52.604" v="2783" actId="1038"/>
-          <ac:cxnSpMkLst>
-            <pc:docMk/>
-            <pc:sldMk cId="1934544939" sldId="260"/>
-            <ac:cxnSpMk id="8" creationId="{2E524776-BF20-4E53-7E4A-E6495BC714E0}"/>
-          </ac:cxnSpMkLst>
-        </pc:cxnChg>
       </pc:sldChg>
       <pc:sldChg chg="modSp mod">
         <pc:chgData name="Are Mjaavatten" userId="00bb58f78e5d171c" providerId="LiveId" clId="{055438CC-AB35-4861-8EC0-1B0371FB636C}" dt="2024-12-02T16:18:45.916" v="3783" actId="20577"/>
@@ -1553,14 +677,6 @@
           <pc:docMk/>
           <pc:sldMk cId="993497870" sldId="265"/>
         </pc:sldMkLst>
-        <pc:spChg chg="mod">
-          <ac:chgData name="Are Mjaavatten" userId="00bb58f78e5d171c" providerId="LiveId" clId="{055438CC-AB35-4861-8EC0-1B0371FB636C}" dt="2024-12-02T16:18:45.916" v="3783" actId="20577"/>
-          <ac:spMkLst>
-            <pc:docMk/>
-            <pc:sldMk cId="993497870" sldId="265"/>
-            <ac:spMk id="3" creationId="{8AFF1A4D-B6A6-002E-0A17-9D9AD3D3BB33}"/>
-          </ac:spMkLst>
-        </pc:spChg>
       </pc:sldChg>
       <pc:sldChg chg="addSp delSp modSp mod">
         <pc:chgData name="Are Mjaavatten" userId="00bb58f78e5d171c" providerId="LiveId" clId="{055438CC-AB35-4861-8EC0-1B0371FB636C}" dt="2024-11-30T16:20:27.993" v="3329" actId="20577"/>
@@ -1568,22 +684,6 @@
           <pc:docMk/>
           <pc:sldMk cId="951915012" sldId="266"/>
         </pc:sldMkLst>
-        <pc:spChg chg="mod">
-          <ac:chgData name="Are Mjaavatten" userId="00bb58f78e5d171c" providerId="LiveId" clId="{055438CC-AB35-4861-8EC0-1B0371FB636C}" dt="2024-11-30T16:20:27.993" v="3329" actId="20577"/>
-          <ac:spMkLst>
-            <pc:docMk/>
-            <pc:sldMk cId="951915012" sldId="266"/>
-            <ac:spMk id="3" creationId="{A7FA766A-B888-9720-5CBA-68732A0A53FB}"/>
-          </ac:spMkLst>
-        </pc:spChg>
-        <pc:picChg chg="add mod">
-          <ac:chgData name="Are Mjaavatten" userId="00bb58f78e5d171c" providerId="LiveId" clId="{055438CC-AB35-4861-8EC0-1B0371FB636C}" dt="2024-11-11T09:24:47.782" v="658" actId="1076"/>
-          <ac:picMkLst>
-            <pc:docMk/>
-            <pc:sldMk cId="951915012" sldId="266"/>
-            <ac:picMk id="5" creationId="{99E187C5-1612-6AAD-AEBB-BDD5539E66DC}"/>
-          </ac:picMkLst>
-        </pc:picChg>
       </pc:sldChg>
       <pc:sldChg chg="ord">
         <pc:chgData name="Are Mjaavatten" userId="00bb58f78e5d171c" providerId="LiveId" clId="{055438CC-AB35-4861-8EC0-1B0371FB636C}" dt="2024-11-23T10:52:54.844" v="3006"/>
@@ -1605,14 +705,6 @@
           <pc:docMk/>
           <pc:sldMk cId="34042762" sldId="269"/>
         </pc:sldMkLst>
-        <pc:spChg chg="mod">
-          <ac:chgData name="Are Mjaavatten" userId="00bb58f78e5d171c" providerId="LiveId" clId="{055438CC-AB35-4861-8EC0-1B0371FB636C}" dt="2024-11-30T16:13:30.137" v="3158" actId="27636"/>
-          <ac:spMkLst>
-            <pc:docMk/>
-            <pc:sldMk cId="34042762" sldId="269"/>
-            <ac:spMk id="3" creationId="{2E9A1E1F-E1FB-D600-D0EE-A17FB6095AFF}"/>
-          </ac:spMkLst>
-        </pc:spChg>
       </pc:sldChg>
       <pc:sldChg chg="modSp mod">
         <pc:chgData name="Are Mjaavatten" userId="00bb58f78e5d171c" providerId="LiveId" clId="{055438CC-AB35-4861-8EC0-1B0371FB636C}" dt="2024-11-30T16:21:23.283" v="3338" actId="20577"/>
@@ -1620,22 +712,6 @@
           <pc:docMk/>
           <pc:sldMk cId="2870539914" sldId="271"/>
         </pc:sldMkLst>
-        <pc:spChg chg="mod">
-          <ac:chgData name="Are Mjaavatten" userId="00bb58f78e5d171c" providerId="LiveId" clId="{055438CC-AB35-4861-8EC0-1B0371FB636C}" dt="2024-11-21T16:57:05.544" v="2933" actId="14100"/>
-          <ac:spMkLst>
-            <pc:docMk/>
-            <pc:sldMk cId="2870539914" sldId="271"/>
-            <ac:spMk id="7" creationId="{BD27EE11-78DD-9B9E-5E6A-F2CB4927025F}"/>
-          </ac:spMkLst>
-        </pc:spChg>
-        <pc:spChg chg="mod">
-          <ac:chgData name="Are Mjaavatten" userId="00bb58f78e5d171c" providerId="LiveId" clId="{055438CC-AB35-4861-8EC0-1B0371FB636C}" dt="2024-11-30T16:21:23.283" v="3338" actId="20577"/>
-          <ac:spMkLst>
-            <pc:docMk/>
-            <pc:sldMk cId="2870539914" sldId="271"/>
-            <ac:spMk id="8" creationId="{DE312110-5C43-D77C-A2EC-47EB6666D900}"/>
-          </ac:spMkLst>
-        </pc:spChg>
       </pc:sldChg>
       <pc:sldChg chg="modSp add del mod">
         <pc:chgData name="Are Mjaavatten" userId="00bb58f78e5d171c" providerId="LiveId" clId="{055438CC-AB35-4861-8EC0-1B0371FB636C}" dt="2024-11-30T17:18:46.612" v="3667" actId="20577"/>
@@ -1643,14 +719,6 @@
           <pc:docMk/>
           <pc:sldMk cId="4127174572" sldId="274"/>
         </pc:sldMkLst>
-        <pc:spChg chg="mod">
-          <ac:chgData name="Are Mjaavatten" userId="00bb58f78e5d171c" providerId="LiveId" clId="{055438CC-AB35-4861-8EC0-1B0371FB636C}" dt="2024-11-30T17:18:46.612" v="3667" actId="20577"/>
-          <ac:spMkLst>
-            <pc:docMk/>
-            <pc:sldMk cId="4127174572" sldId="274"/>
-            <ac:spMk id="3" creationId="{F0A4A313-7E15-500B-ED77-95FD44C0C03E}"/>
-          </ac:spMkLst>
-        </pc:spChg>
       </pc:sldChg>
       <pc:sldChg chg="modSp mod">
         <pc:chgData name="Are Mjaavatten" userId="00bb58f78e5d171c" providerId="LiveId" clId="{055438CC-AB35-4861-8EC0-1B0371FB636C}" dt="2024-11-25T12:06:40.877" v="3109" actId="20577"/>
@@ -1658,14 +726,6 @@
           <pc:docMk/>
           <pc:sldMk cId="929935833" sldId="275"/>
         </pc:sldMkLst>
-        <pc:spChg chg="mod">
-          <ac:chgData name="Are Mjaavatten" userId="00bb58f78e5d171c" providerId="LiveId" clId="{055438CC-AB35-4861-8EC0-1B0371FB636C}" dt="2024-11-25T12:06:40.877" v="3109" actId="20577"/>
-          <ac:spMkLst>
-            <pc:docMk/>
-            <pc:sldMk cId="929935833" sldId="275"/>
-            <ac:spMk id="3" creationId="{3EC9A98D-B096-1765-33CD-BCE98D447E91}"/>
-          </ac:spMkLst>
-        </pc:spChg>
       </pc:sldChg>
       <pc:sldChg chg="addSp modSp mod">
         <pc:chgData name="Are Mjaavatten" userId="00bb58f78e5d171c" providerId="LiveId" clId="{055438CC-AB35-4861-8EC0-1B0371FB636C}" dt="2024-11-30T16:58:28.558" v="3579" actId="20577"/>
@@ -1673,30 +733,6 @@
           <pc:docMk/>
           <pc:sldMk cId="2297231925" sldId="276"/>
         </pc:sldMkLst>
-        <pc:spChg chg="mod">
-          <ac:chgData name="Are Mjaavatten" userId="00bb58f78e5d171c" providerId="LiveId" clId="{055438CC-AB35-4861-8EC0-1B0371FB636C}" dt="2024-11-30T16:58:28.558" v="3579" actId="20577"/>
-          <ac:spMkLst>
-            <pc:docMk/>
-            <pc:sldMk cId="2297231925" sldId="276"/>
-            <ac:spMk id="3" creationId="{B5FCD886-01C1-86A1-9517-53E6F36E8EE2}"/>
-          </ac:spMkLst>
-        </pc:spChg>
-        <pc:spChg chg="add mod">
-          <ac:chgData name="Are Mjaavatten" userId="00bb58f78e5d171c" providerId="LiveId" clId="{055438CC-AB35-4861-8EC0-1B0371FB636C}" dt="2024-11-12T08:50:44.262" v="2806" actId="1076"/>
-          <ac:spMkLst>
-            <pc:docMk/>
-            <pc:sldMk cId="2297231925" sldId="276"/>
-            <ac:spMk id="5" creationId="{C1EAD592-E34D-7FA1-97AF-4797F8D0DEF0}"/>
-          </ac:spMkLst>
-        </pc:spChg>
-        <pc:picChg chg="ord">
-          <ac:chgData name="Are Mjaavatten" userId="00bb58f78e5d171c" providerId="LiveId" clId="{055438CC-AB35-4861-8EC0-1B0371FB636C}" dt="2024-11-12T08:48:28.868" v="2788" actId="167"/>
-          <ac:picMkLst>
-            <pc:docMk/>
-            <pc:sldMk cId="2297231925" sldId="276"/>
-            <ac:picMk id="15" creationId="{33896AFD-8450-EEE1-E053-0E95931B6094}"/>
-          </ac:picMkLst>
-        </pc:picChg>
       </pc:sldChg>
       <pc:sldChg chg="addSp delSp modSp mod">
         <pc:chgData name="Are Mjaavatten" userId="00bb58f78e5d171c" providerId="LiveId" clId="{055438CC-AB35-4861-8EC0-1B0371FB636C}" dt="2024-11-12T09:21:55.071" v="2810" actId="20577"/>
@@ -1704,22 +740,6 @@
           <pc:docMk/>
           <pc:sldMk cId="3795277216" sldId="277"/>
         </pc:sldMkLst>
-        <pc:spChg chg="mod">
-          <ac:chgData name="Are Mjaavatten" userId="00bb58f78e5d171c" providerId="LiveId" clId="{055438CC-AB35-4861-8EC0-1B0371FB636C}" dt="2024-11-12T09:21:55.071" v="2810" actId="20577"/>
-          <ac:spMkLst>
-            <pc:docMk/>
-            <pc:sldMk cId="3795277216" sldId="277"/>
-            <ac:spMk id="3" creationId="{7F22BECD-4858-0BA6-91CA-C9D48FA26E8F}"/>
-          </ac:spMkLst>
-        </pc:spChg>
-        <pc:picChg chg="add mod">
-          <ac:chgData name="Are Mjaavatten" userId="00bb58f78e5d171c" providerId="LiveId" clId="{055438CC-AB35-4861-8EC0-1B0371FB636C}" dt="2024-11-12T09:21:31.861" v="2808"/>
-          <ac:picMkLst>
-            <pc:docMk/>
-            <pc:sldMk cId="3795277216" sldId="277"/>
-            <ac:picMk id="4" creationId="{BB3DE1E5-040F-29CD-83DF-3FCB0C2230EE}"/>
-          </ac:picMkLst>
-        </pc:picChg>
       </pc:sldChg>
       <pc:sldChg chg="modSp mod">
         <pc:chgData name="Are Mjaavatten" userId="00bb58f78e5d171c" providerId="LiveId" clId="{055438CC-AB35-4861-8EC0-1B0371FB636C}" dt="2024-11-30T16:15:11.705" v="3264" actId="20577"/>
@@ -1727,14 +747,6 @@
           <pc:docMk/>
           <pc:sldMk cId="3816220206" sldId="281"/>
         </pc:sldMkLst>
-        <pc:spChg chg="mod">
-          <ac:chgData name="Are Mjaavatten" userId="00bb58f78e5d171c" providerId="LiveId" clId="{055438CC-AB35-4861-8EC0-1B0371FB636C}" dt="2024-11-30T16:15:11.705" v="3264" actId="20577"/>
-          <ac:spMkLst>
-            <pc:docMk/>
-            <pc:sldMk cId="3816220206" sldId="281"/>
-            <ac:spMk id="3" creationId="{D69F0E18-403E-2856-0E01-F43BC137040A}"/>
-          </ac:spMkLst>
-        </pc:spChg>
       </pc:sldChg>
       <pc:sldChg chg="addSp delSp modSp mod setBg">
         <pc:chgData name="Are Mjaavatten" userId="00bb58f78e5d171c" providerId="LiveId" clId="{055438CC-AB35-4861-8EC0-1B0371FB636C}" dt="2024-11-23T11:42:20.981" v="3098" actId="26606"/>
@@ -1742,14 +754,6 @@
           <pc:docMk/>
           <pc:sldMk cId="3469188368" sldId="282"/>
         </pc:sldMkLst>
-        <pc:picChg chg="add mod modCrop">
-          <ac:chgData name="Are Mjaavatten" userId="00bb58f78e5d171c" providerId="LiveId" clId="{055438CC-AB35-4861-8EC0-1B0371FB636C}" dt="2024-11-23T11:42:20.981" v="3098" actId="26606"/>
-          <ac:picMkLst>
-            <pc:docMk/>
-            <pc:sldMk cId="3469188368" sldId="282"/>
-            <ac:picMk id="3" creationId="{E802F7AC-4B89-22BF-A6B4-98171629B24C}"/>
-          </ac:picMkLst>
-        </pc:picChg>
       </pc:sldChg>
       <pc:sldChg chg="ord">
         <pc:chgData name="Are Mjaavatten" userId="00bb58f78e5d171c" providerId="LiveId" clId="{055438CC-AB35-4861-8EC0-1B0371FB636C}" dt="2024-11-30T19:27:30.139" v="3672"/>
@@ -1764,14 +768,6 @@
           <pc:docMk/>
           <pc:sldMk cId="2086630511" sldId="284"/>
         </pc:sldMkLst>
-        <pc:spChg chg="mod">
-          <ac:chgData name="Are Mjaavatten" userId="00bb58f78e5d171c" providerId="LiveId" clId="{055438CC-AB35-4861-8EC0-1B0371FB636C}" dt="2024-12-02T16:45:18.183" v="3806" actId="20577"/>
-          <ac:spMkLst>
-            <pc:docMk/>
-            <pc:sldMk cId="2086630511" sldId="284"/>
-            <ac:spMk id="3" creationId="{5450935E-3A40-D7CF-8176-D0364C5C9505}"/>
-          </ac:spMkLst>
-        </pc:spChg>
       </pc:sldChg>
       <pc:sldChg chg="modSp mod ord">
         <pc:chgData name="Are Mjaavatten" userId="00bb58f78e5d171c" providerId="LiveId" clId="{055438CC-AB35-4861-8EC0-1B0371FB636C}" dt="2024-12-02T16:00:13.839" v="3781" actId="20577"/>
@@ -1779,14 +775,6 @@
           <pc:docMk/>
           <pc:sldMk cId="884547013" sldId="285"/>
         </pc:sldMkLst>
-        <pc:spChg chg="mod">
-          <ac:chgData name="Are Mjaavatten" userId="00bb58f78e5d171c" providerId="LiveId" clId="{055438CC-AB35-4861-8EC0-1B0371FB636C}" dt="2024-12-02T16:00:13.839" v="3781" actId="20577"/>
-          <ac:spMkLst>
-            <pc:docMk/>
-            <pc:sldMk cId="884547013" sldId="285"/>
-            <ac:spMk id="3" creationId="{B0163CB2-48D0-F0C3-D103-BDC6D7DEA086}"/>
-          </ac:spMkLst>
-        </pc:spChg>
       </pc:sldChg>
       <pc:sldChg chg="addSp modSp mod">
         <pc:chgData name="Are Mjaavatten" userId="00bb58f78e5d171c" providerId="LiveId" clId="{055438CC-AB35-4861-8EC0-1B0371FB636C}" dt="2024-11-11T09:13:55.751" v="655" actId="14100"/>
@@ -1794,38 +782,6 @@
           <pc:docMk/>
           <pc:sldMk cId="935628899" sldId="286"/>
         </pc:sldMkLst>
-        <pc:spChg chg="add mod">
-          <ac:chgData name="Are Mjaavatten" userId="00bb58f78e5d171c" providerId="LiveId" clId="{055438CC-AB35-4861-8EC0-1B0371FB636C}" dt="2024-11-11T09:13:16.209" v="651" actId="1076"/>
-          <ac:spMkLst>
-            <pc:docMk/>
-            <pc:sldMk cId="935628899" sldId="286"/>
-            <ac:spMk id="2" creationId="{F814D40B-23D1-45EC-177F-15A1D4F052CA}"/>
-          </ac:spMkLst>
-        </pc:spChg>
-        <pc:cxnChg chg="add mod">
-          <ac:chgData name="Are Mjaavatten" userId="00bb58f78e5d171c" providerId="LiveId" clId="{055438CC-AB35-4861-8EC0-1B0371FB636C}" dt="2024-11-11T09:13:16.209" v="651" actId="1076"/>
-          <ac:cxnSpMkLst>
-            <pc:docMk/>
-            <pc:sldMk cId="935628899" sldId="286"/>
-            <ac:cxnSpMk id="6" creationId="{C4BCDB14-C979-24D7-A89C-374DAE977D81}"/>
-          </ac:cxnSpMkLst>
-        </pc:cxnChg>
-        <pc:cxnChg chg="add mod">
-          <ac:chgData name="Are Mjaavatten" userId="00bb58f78e5d171c" providerId="LiveId" clId="{055438CC-AB35-4861-8EC0-1B0371FB636C}" dt="2024-11-11T09:13:39.555" v="653" actId="14100"/>
-          <ac:cxnSpMkLst>
-            <pc:docMk/>
-            <pc:sldMk cId="935628899" sldId="286"/>
-            <ac:cxnSpMk id="8" creationId="{32F7D5DE-5F54-A901-F012-B8357616DB0A}"/>
-          </ac:cxnSpMkLst>
-        </pc:cxnChg>
-        <pc:cxnChg chg="add mod">
-          <ac:chgData name="Are Mjaavatten" userId="00bb58f78e5d171c" providerId="LiveId" clId="{055438CC-AB35-4861-8EC0-1B0371FB636C}" dt="2024-11-11T09:13:55.751" v="655" actId="14100"/>
-          <ac:cxnSpMkLst>
-            <pc:docMk/>
-            <pc:sldMk cId="935628899" sldId="286"/>
-            <ac:cxnSpMk id="11" creationId="{B91A8E23-51D3-EB1C-9A36-BEA6C4A87086}"/>
-          </ac:cxnSpMkLst>
-        </pc:cxnChg>
       </pc:sldChg>
       <pc:sldChg chg="modSp mod">
         <pc:chgData name="Are Mjaavatten" userId="00bb58f78e5d171c" providerId="LiveId" clId="{055438CC-AB35-4861-8EC0-1B0371FB636C}" dt="2024-11-30T17:04:49.798" v="3600" actId="20577"/>
@@ -1833,14 +789,6 @@
           <pc:docMk/>
           <pc:sldMk cId="3923112241" sldId="287"/>
         </pc:sldMkLst>
-        <pc:spChg chg="mod">
-          <ac:chgData name="Are Mjaavatten" userId="00bb58f78e5d171c" providerId="LiveId" clId="{055438CC-AB35-4861-8EC0-1B0371FB636C}" dt="2024-11-30T17:04:49.798" v="3600" actId="20577"/>
-          <ac:spMkLst>
-            <pc:docMk/>
-            <pc:sldMk cId="3923112241" sldId="287"/>
-            <ac:spMk id="4" creationId="{6BF09426-A00E-F54E-ED38-ED13250CE22D}"/>
-          </ac:spMkLst>
-        </pc:spChg>
       </pc:sldChg>
       <pc:sldChg chg="modSp mod">
         <pc:chgData name="Are Mjaavatten" userId="00bb58f78e5d171c" providerId="LiveId" clId="{055438CC-AB35-4861-8EC0-1B0371FB636C}" dt="2024-11-21T16:59:28.968" v="2958" actId="122"/>
@@ -1848,14 +796,6 @@
           <pc:docMk/>
           <pc:sldMk cId="3156030858" sldId="288"/>
         </pc:sldMkLst>
-        <pc:spChg chg="mod">
-          <ac:chgData name="Are Mjaavatten" userId="00bb58f78e5d171c" providerId="LiveId" clId="{055438CC-AB35-4861-8EC0-1B0371FB636C}" dt="2024-11-21T16:59:28.968" v="2958" actId="122"/>
-          <ac:spMkLst>
-            <pc:docMk/>
-            <pc:sldMk cId="3156030858" sldId="288"/>
-            <ac:spMk id="2" creationId="{B43B8408-7F68-1587-2CB1-314D6FF1119D}"/>
-          </ac:spMkLst>
-        </pc:spChg>
       </pc:sldChg>
       <pc:sldChg chg="modSp mod">
         <pc:chgData name="Are Mjaavatten" userId="00bb58f78e5d171c" providerId="LiveId" clId="{055438CC-AB35-4861-8EC0-1B0371FB636C}" dt="2024-12-02T16:46:47.243" v="3807" actId="790"/>
@@ -1863,14 +803,6 @@
           <pc:docMk/>
           <pc:sldMk cId="2204234833" sldId="290"/>
         </pc:sldMkLst>
-        <pc:spChg chg="mod">
-          <ac:chgData name="Are Mjaavatten" userId="00bb58f78e5d171c" providerId="LiveId" clId="{055438CC-AB35-4861-8EC0-1B0371FB636C}" dt="2024-12-02T16:46:47.243" v="3807" actId="790"/>
-          <ac:spMkLst>
-            <pc:docMk/>
-            <pc:sldMk cId="2204234833" sldId="290"/>
-            <ac:spMk id="3" creationId="{2E6D2D2F-9CE8-051E-3EDD-49C2FA6ADBD3}"/>
-          </ac:spMkLst>
-        </pc:spChg>
       </pc:sldChg>
       <pc:sldChg chg="addSp delSp modSp new del mod modClrScheme chgLayout">
         <pc:chgData name="Are Mjaavatten" userId="00bb58f78e5d171c" providerId="LiveId" clId="{055438CC-AB35-4861-8EC0-1B0371FB636C}" dt="2024-11-10T09:04:45.099" v="36" actId="47"/>
@@ -1885,38 +817,6 @@
           <pc:docMk/>
           <pc:sldMk cId="3375353450" sldId="291"/>
         </pc:sldMkLst>
-        <pc:spChg chg="add mod ord">
-          <ac:chgData name="Are Mjaavatten" userId="00bb58f78e5d171c" providerId="LiveId" clId="{055438CC-AB35-4861-8EC0-1B0371FB636C}" dt="2024-11-10T10:14:11.892" v="58" actId="20577"/>
-          <ac:spMkLst>
-            <pc:docMk/>
-            <pc:sldMk cId="3375353450" sldId="291"/>
-            <ac:spMk id="4" creationId="{559AABA9-62F2-CFAF-9FE3-11ABB0319720}"/>
-          </ac:spMkLst>
-        </pc:spChg>
-        <pc:spChg chg="add mod">
-          <ac:chgData name="Are Mjaavatten" userId="00bb58f78e5d171c" providerId="LiveId" clId="{055438CC-AB35-4861-8EC0-1B0371FB636C}" dt="2024-11-10T10:31:02.621" v="253" actId="1036"/>
-          <ac:spMkLst>
-            <pc:docMk/>
-            <pc:sldMk cId="3375353450" sldId="291"/>
-            <ac:spMk id="11" creationId="{85B9952D-D1E5-0515-5E56-26BE23514BF6}"/>
-          </ac:spMkLst>
-        </pc:spChg>
-        <pc:picChg chg="add mod">
-          <ac:chgData name="Are Mjaavatten" userId="00bb58f78e5d171c" providerId="LiveId" clId="{055438CC-AB35-4861-8EC0-1B0371FB636C}" dt="2024-11-10T09:05:41.512" v="41" actId="1076"/>
-          <ac:picMkLst>
-            <pc:docMk/>
-            <pc:sldMk cId="3375353450" sldId="291"/>
-            <ac:picMk id="5" creationId="{755D8C4A-DE93-58FE-037D-218B20662101}"/>
-          </ac:picMkLst>
-        </pc:picChg>
-        <pc:picChg chg="add mod">
-          <ac:chgData name="Are Mjaavatten" userId="00bb58f78e5d171c" providerId="LiveId" clId="{055438CC-AB35-4861-8EC0-1B0371FB636C}" dt="2024-11-10T10:30:02.453" v="231" actId="1035"/>
-          <ac:picMkLst>
-            <pc:docMk/>
-            <pc:sldMk cId="3375353450" sldId="291"/>
-            <ac:picMk id="13" creationId="{4BA1268A-C807-4C5F-AF8F-326EFDD11402}"/>
-          </ac:picMkLst>
-        </pc:picChg>
       </pc:sldChg>
       <pc:sldChg chg="addSp delSp modSp new mod ord modClrScheme chgLayout">
         <pc:chgData name="Are Mjaavatten" userId="00bb58f78e5d171c" providerId="LiveId" clId="{055438CC-AB35-4861-8EC0-1B0371FB636C}" dt="2024-11-30T16:30:45.475" v="3348"/>
@@ -1924,86 +824,6 @@
           <pc:docMk/>
           <pc:sldMk cId="2324055941" sldId="292"/>
         </pc:sldMkLst>
-        <pc:spChg chg="add mod ord">
-          <ac:chgData name="Are Mjaavatten" userId="00bb58f78e5d171c" providerId="LiveId" clId="{055438CC-AB35-4861-8EC0-1B0371FB636C}" dt="2024-11-21T16:48:27.026" v="2859" actId="122"/>
-          <ac:spMkLst>
-            <pc:docMk/>
-            <pc:sldMk cId="2324055941" sldId="292"/>
-            <ac:spMk id="4" creationId="{393E523C-9FF8-5DBF-807E-15E9F0360A43}"/>
-          </ac:spMkLst>
-        </pc:spChg>
-        <pc:spChg chg="add mod">
-          <ac:chgData name="Are Mjaavatten" userId="00bb58f78e5d171c" providerId="LiveId" clId="{055438CC-AB35-4861-8EC0-1B0371FB636C}" dt="2024-11-10T10:47:56.184" v="459" actId="1076"/>
-          <ac:spMkLst>
-            <pc:docMk/>
-            <pc:sldMk cId="2324055941" sldId="292"/>
-            <ac:spMk id="7" creationId="{C29B2822-7DAF-7BFC-0148-8FC599CCFF99}"/>
-          </ac:spMkLst>
-        </pc:spChg>
-        <pc:spChg chg="add mod">
-          <ac:chgData name="Are Mjaavatten" userId="00bb58f78e5d171c" providerId="LiveId" clId="{055438CC-AB35-4861-8EC0-1B0371FB636C}" dt="2024-11-10T10:47:52.409" v="458" actId="1076"/>
-          <ac:spMkLst>
-            <pc:docMk/>
-            <pc:sldMk cId="2324055941" sldId="292"/>
-            <ac:spMk id="8" creationId="{CEA45F0C-FBAE-4F68-622E-0AA965AEF51E}"/>
-          </ac:spMkLst>
-        </pc:spChg>
-        <pc:spChg chg="add mod">
-          <ac:chgData name="Are Mjaavatten" userId="00bb58f78e5d171c" providerId="LiveId" clId="{055438CC-AB35-4861-8EC0-1B0371FB636C}" dt="2024-11-10T10:47:47.691" v="457" actId="1076"/>
-          <ac:spMkLst>
-            <pc:docMk/>
-            <pc:sldMk cId="2324055941" sldId="292"/>
-            <ac:spMk id="9" creationId="{71E2011A-6411-D281-8C31-42CDB8C2C2B1}"/>
-          </ac:spMkLst>
-        </pc:spChg>
-        <pc:spChg chg="add mod">
-          <ac:chgData name="Are Mjaavatten" userId="00bb58f78e5d171c" providerId="LiveId" clId="{055438CC-AB35-4861-8EC0-1B0371FB636C}" dt="2024-11-10T10:48:49.283" v="467" actId="20577"/>
-          <ac:spMkLst>
-            <pc:docMk/>
-            <pc:sldMk cId="2324055941" sldId="292"/>
-            <ac:spMk id="16" creationId="{B7C652D4-8A1C-53A7-7DE6-94BA871903B3}"/>
-          </ac:spMkLst>
-        </pc:spChg>
-        <pc:spChg chg="add mod">
-          <ac:chgData name="Are Mjaavatten" userId="00bb58f78e5d171c" providerId="LiveId" clId="{055438CC-AB35-4861-8EC0-1B0371FB636C}" dt="2024-11-10T10:50:16.874" v="518" actId="14100"/>
-          <ac:spMkLst>
-            <pc:docMk/>
-            <pc:sldMk cId="2324055941" sldId="292"/>
-            <ac:spMk id="17" creationId="{9DFCE763-CF36-557C-1769-93EA11A1FF0E}"/>
-          </ac:spMkLst>
-        </pc:spChg>
-        <pc:spChg chg="add mod">
-          <ac:chgData name="Are Mjaavatten" userId="00bb58f78e5d171c" providerId="LiveId" clId="{055438CC-AB35-4861-8EC0-1B0371FB636C}" dt="2024-11-10T10:51:49.582" v="583" actId="20577"/>
-          <ac:spMkLst>
-            <pc:docMk/>
-            <pc:sldMk cId="2324055941" sldId="292"/>
-            <ac:spMk id="18" creationId="{AFF007E3-6BCE-3E8C-5621-27522A29897F}"/>
-          </ac:spMkLst>
-        </pc:spChg>
-        <pc:spChg chg="add mod">
-          <ac:chgData name="Are Mjaavatten" userId="00bb58f78e5d171c" providerId="LiveId" clId="{055438CC-AB35-4861-8EC0-1B0371FB636C}" dt="2024-11-10T10:56:11.759" v="638" actId="1037"/>
-          <ac:spMkLst>
-            <pc:docMk/>
-            <pc:sldMk cId="2324055941" sldId="292"/>
-            <ac:spMk id="19" creationId="{5F300220-665E-39C3-5CAD-39DE6F4AE95F}"/>
-          </ac:spMkLst>
-        </pc:spChg>
-        <pc:spChg chg="add mod">
-          <ac:chgData name="Are Mjaavatten" userId="00bb58f78e5d171c" providerId="LiveId" clId="{055438CC-AB35-4861-8EC0-1B0371FB636C}" dt="2024-11-10T10:55:31.260" v="621" actId="208"/>
-          <ac:spMkLst>
-            <pc:docMk/>
-            <pc:sldMk cId="2324055941" sldId="292"/>
-            <ac:spMk id="20" creationId="{8806A3B6-B7CD-383E-4F39-587614CA5FF7}"/>
-          </ac:spMkLst>
-        </pc:spChg>
-        <pc:picChg chg="add mod">
-          <ac:chgData name="Are Mjaavatten" userId="00bb58f78e5d171c" providerId="LiveId" clId="{055438CC-AB35-4861-8EC0-1B0371FB636C}" dt="2024-11-10T10:47:07.596" v="414" actId="1076"/>
-          <ac:picMkLst>
-            <pc:docMk/>
-            <pc:sldMk cId="2324055941" sldId="292"/>
-            <ac:picMk id="11" creationId="{B7F959B8-282A-4B29-3339-16B963050805}"/>
-          </ac:picMkLst>
-        </pc:picChg>
       </pc:sldChg>
       <pc:sldChg chg="modSp new mod">
         <pc:chgData name="Are Mjaavatten" userId="00bb58f78e5d171c" providerId="LiveId" clId="{055438CC-AB35-4861-8EC0-1B0371FB636C}" dt="2024-11-11T13:54:37.713" v="1589" actId="20577"/>
@@ -2011,22 +831,6 @@
           <pc:docMk/>
           <pc:sldMk cId="2158410459" sldId="293"/>
         </pc:sldMkLst>
-        <pc:spChg chg="mod">
-          <ac:chgData name="Are Mjaavatten" userId="00bb58f78e5d171c" providerId="LiveId" clId="{055438CC-AB35-4861-8EC0-1B0371FB636C}" dt="2024-11-11T13:11:50.479" v="721" actId="20577"/>
-          <ac:spMkLst>
-            <pc:docMk/>
-            <pc:sldMk cId="2158410459" sldId="293"/>
-            <ac:spMk id="2" creationId="{7B591BD6-B923-AA65-EEB0-D33B056D7011}"/>
-          </ac:spMkLst>
-        </pc:spChg>
-        <pc:spChg chg="mod">
-          <ac:chgData name="Are Mjaavatten" userId="00bb58f78e5d171c" providerId="LiveId" clId="{055438CC-AB35-4861-8EC0-1B0371FB636C}" dt="2024-11-11T13:54:37.713" v="1589" actId="20577"/>
-          <ac:spMkLst>
-            <pc:docMk/>
-            <pc:sldMk cId="2158410459" sldId="293"/>
-            <ac:spMk id="3" creationId="{EA2D0C46-3AD9-3956-1DDB-02EFB5682D96}"/>
-          </ac:spMkLst>
-        </pc:spChg>
       </pc:sldChg>
       <pc:sldChg chg="modSp new mod">
         <pc:chgData name="Are Mjaavatten" userId="00bb58f78e5d171c" providerId="LiveId" clId="{055438CC-AB35-4861-8EC0-1B0371FB636C}" dt="2024-11-30T17:06:31.800" v="3605" actId="20577"/>
@@ -2034,22 +838,6 @@
           <pc:docMk/>
           <pc:sldMk cId="650093402" sldId="294"/>
         </pc:sldMkLst>
-        <pc:spChg chg="mod">
-          <ac:chgData name="Are Mjaavatten" userId="00bb58f78e5d171c" providerId="LiveId" clId="{055438CC-AB35-4861-8EC0-1B0371FB636C}" dt="2024-11-11T13:52:39.863" v="1515" actId="20577"/>
-          <ac:spMkLst>
-            <pc:docMk/>
-            <pc:sldMk cId="650093402" sldId="294"/>
-            <ac:spMk id="2" creationId="{38D82950-C6BA-5597-B24C-612D7AAAF80B}"/>
-          </ac:spMkLst>
-        </pc:spChg>
-        <pc:spChg chg="mod">
-          <ac:chgData name="Are Mjaavatten" userId="00bb58f78e5d171c" providerId="LiveId" clId="{055438CC-AB35-4861-8EC0-1B0371FB636C}" dt="2024-11-30T17:06:31.800" v="3605" actId="20577"/>
-          <ac:spMkLst>
-            <pc:docMk/>
-            <pc:sldMk cId="650093402" sldId="294"/>
-            <ac:spMk id="3" creationId="{9584E759-2B3F-31BC-6788-D199E2821F0D}"/>
-          </ac:spMkLst>
-        </pc:spChg>
       </pc:sldChg>
       <pc:sldChg chg="addSp delSp modSp new mod">
         <pc:chgData name="Are Mjaavatten" userId="00bb58f78e5d171c" providerId="LiveId" clId="{055438CC-AB35-4861-8EC0-1B0371FB636C}" dt="2024-11-30T16:09:46.668" v="3154" actId="14100"/>
@@ -2057,30 +845,6 @@
           <pc:docMk/>
           <pc:sldMk cId="3201626842" sldId="295"/>
         </pc:sldMkLst>
-        <pc:spChg chg="mod">
-          <ac:chgData name="Are Mjaavatten" userId="00bb58f78e5d171c" providerId="LiveId" clId="{055438CC-AB35-4861-8EC0-1B0371FB636C}" dt="2024-11-21T16:55:06.680" v="2932" actId="122"/>
-          <ac:spMkLst>
-            <pc:docMk/>
-            <pc:sldMk cId="3201626842" sldId="295"/>
-            <ac:spMk id="2" creationId="{391BB5DB-2000-A3A1-03B2-0220EB004B86}"/>
-          </ac:spMkLst>
-        </pc:spChg>
-        <pc:spChg chg="mod">
-          <ac:chgData name="Are Mjaavatten" userId="00bb58f78e5d171c" providerId="LiveId" clId="{055438CC-AB35-4861-8EC0-1B0371FB636C}" dt="2024-11-23T10:50:58.507" v="3004" actId="20577"/>
-          <ac:spMkLst>
-            <pc:docMk/>
-            <pc:sldMk cId="3201626842" sldId="295"/>
-            <ac:spMk id="3" creationId="{AF115D75-50D7-658E-D124-041FD9D2F244}"/>
-          </ac:spMkLst>
-        </pc:spChg>
-        <pc:picChg chg="add mod">
-          <ac:chgData name="Are Mjaavatten" userId="00bb58f78e5d171c" providerId="LiveId" clId="{055438CC-AB35-4861-8EC0-1B0371FB636C}" dt="2024-11-30T16:09:46.668" v="3154" actId="14100"/>
-          <ac:picMkLst>
-            <pc:docMk/>
-            <pc:sldMk cId="3201626842" sldId="295"/>
-            <ac:picMk id="6" creationId="{E751B404-A69C-77D2-6D36-9B0673004626}"/>
-          </ac:picMkLst>
-        </pc:picChg>
       </pc:sldChg>
       <pc:sldChg chg="addSp modSp del mod">
         <pc:chgData name="Are Mjaavatten" userId="00bb58f78e5d171c" providerId="LiveId" clId="{055438CC-AB35-4861-8EC0-1B0371FB636C}" dt="2024-11-25T17:40:59.657" v="3148" actId="47"/>
@@ -2095,38 +859,6 @@
           <pc:docMk/>
           <pc:sldMk cId="2902811654" sldId="297"/>
         </pc:sldMkLst>
-        <pc:spChg chg="mod">
-          <ac:chgData name="Are Mjaavatten" userId="00bb58f78e5d171c" providerId="LiveId" clId="{055438CC-AB35-4861-8EC0-1B0371FB636C}" dt="2024-12-01T16:37:58.819" v="3680" actId="20577"/>
-          <ac:spMkLst>
-            <pc:docMk/>
-            <pc:sldMk cId="2902811654" sldId="297"/>
-            <ac:spMk id="3" creationId="{46702C27-4A64-A7AA-2614-54744B51E38B}"/>
-          </ac:spMkLst>
-        </pc:spChg>
-        <pc:spChg chg="mod">
-          <ac:chgData name="Are Mjaavatten" userId="00bb58f78e5d171c" providerId="LiveId" clId="{055438CC-AB35-4861-8EC0-1B0371FB636C}" dt="2024-12-02T16:20:01.881" v="3798" actId="1076"/>
-          <ac:spMkLst>
-            <pc:docMk/>
-            <pc:sldMk cId="2902811654" sldId="297"/>
-            <ac:spMk id="4" creationId="{CED2EB5C-5D9A-F90A-D849-EF4439D2EF4D}"/>
-          </ac:spMkLst>
-        </pc:spChg>
-        <pc:spChg chg="mod">
-          <ac:chgData name="Are Mjaavatten" userId="00bb58f78e5d171c" providerId="LiveId" clId="{055438CC-AB35-4861-8EC0-1B0371FB636C}" dt="2024-12-02T16:19:37.293" v="3795" actId="20577"/>
-          <ac:spMkLst>
-            <pc:docMk/>
-            <pc:sldMk cId="2902811654" sldId="297"/>
-            <ac:spMk id="5" creationId="{EB6C262D-77CA-287C-A5E0-CF41E40A1100}"/>
-          </ac:spMkLst>
-        </pc:spChg>
-        <pc:cxnChg chg="mod">
-          <ac:chgData name="Are Mjaavatten" userId="00bb58f78e5d171c" providerId="LiveId" clId="{055438CC-AB35-4861-8EC0-1B0371FB636C}" dt="2024-12-02T16:19:50.945" v="3797" actId="1076"/>
-          <ac:cxnSpMkLst>
-            <pc:docMk/>
-            <pc:sldMk cId="2902811654" sldId="297"/>
-            <ac:cxnSpMk id="7" creationId="{C975A1F5-9977-90B9-49A2-B8B084A83779}"/>
-          </ac:cxnSpMkLst>
-        </pc:cxnChg>
       </pc:sldChg>
       <pc:sldChg chg="addSp delSp modSp new mod">
         <pc:chgData name="Are Mjaavatten" userId="00bb58f78e5d171c" providerId="LiveId" clId="{055438CC-AB35-4861-8EC0-1B0371FB636C}" dt="2024-11-30T16:57:56.739" v="3578" actId="1076"/>
@@ -2134,30 +866,6 @@
           <pc:docMk/>
           <pc:sldMk cId="3000256276" sldId="298"/>
         </pc:sldMkLst>
-        <pc:spChg chg="mod">
-          <ac:chgData name="Are Mjaavatten" userId="00bb58f78e5d171c" providerId="LiveId" clId="{055438CC-AB35-4861-8EC0-1B0371FB636C}" dt="2024-11-30T16:39:36.123" v="3431"/>
-          <ac:spMkLst>
-            <pc:docMk/>
-            <pc:sldMk cId="3000256276" sldId="298"/>
-            <ac:spMk id="2" creationId="{42ED12A1-553C-C2B1-D588-B3533A675C5C}"/>
-          </ac:spMkLst>
-        </pc:spChg>
-        <pc:spChg chg="add mod">
-          <ac:chgData name="Are Mjaavatten" userId="00bb58f78e5d171c" providerId="LiveId" clId="{055438CC-AB35-4861-8EC0-1B0371FB636C}" dt="2024-11-30T16:57:56.739" v="3578" actId="1076"/>
-          <ac:spMkLst>
-            <pc:docMk/>
-            <pc:sldMk cId="3000256276" sldId="298"/>
-            <ac:spMk id="7" creationId="{5B2383CE-ACEC-503D-3965-871DE127A4F7}"/>
-          </ac:spMkLst>
-        </pc:spChg>
-        <pc:picChg chg="add mod">
-          <ac:chgData name="Are Mjaavatten" userId="00bb58f78e5d171c" providerId="LiveId" clId="{055438CC-AB35-4861-8EC0-1B0371FB636C}" dt="2024-11-30T16:57:30.374" v="3573" actId="1076"/>
-          <ac:picMkLst>
-            <pc:docMk/>
-            <pc:sldMk cId="3000256276" sldId="298"/>
-            <ac:picMk id="9" creationId="{94D8929B-4B08-240F-AFAE-7A7BE05E9E3F}"/>
-          </ac:picMkLst>
-        </pc:picChg>
       </pc:sldChg>
       <pc:sldChg chg="add del">
         <pc:chgData name="Are Mjaavatten" userId="00bb58f78e5d171c" providerId="LiveId" clId="{055438CC-AB35-4861-8EC0-1B0371FB636C}" dt="2024-11-30T17:24:14.336" v="3669" actId="47"/>
@@ -2179,102 +887,6 @@
           <pc:docMk/>
           <pc:sldMk cId="3633369149" sldId="316"/>
         </pc:sldMkLst>
-        <pc:spChg chg="mod">
-          <ac:chgData name="Are Mjaavatten" userId="00bb58f78e5d171c" providerId="LiveId" clId="{055438CC-AB35-4861-8EC0-1B0371FB636C}" dt="2024-12-02T16:58:42.816" v="3864" actId="404"/>
-          <ac:spMkLst>
-            <pc:docMk/>
-            <pc:sldMk cId="3633369149" sldId="316"/>
-            <ac:spMk id="2" creationId="{CBDB9558-8EBB-0E92-EBD6-A2DA874EDF79}"/>
-          </ac:spMkLst>
-        </pc:spChg>
-        <pc:spChg chg="add del mod">
-          <ac:chgData name="Are Mjaavatten" userId="00bb58f78e5d171c" providerId="LiveId" clId="{055438CC-AB35-4861-8EC0-1B0371FB636C}" dt="2024-12-02T17:22:49.315" v="4138" actId="20577"/>
-          <ac:spMkLst>
-            <pc:docMk/>
-            <pc:sldMk cId="3633369149" sldId="316"/>
-            <ac:spMk id="3" creationId="{AFDCFD55-3A44-7836-029B-B979781BFB28}"/>
-          </ac:spMkLst>
-        </pc:spChg>
-        <pc:spChg chg="add mod">
-          <ac:chgData name="Are Mjaavatten" userId="00bb58f78e5d171c" providerId="LiveId" clId="{055438CC-AB35-4861-8EC0-1B0371FB636C}" dt="2024-12-02T17:11:12.846" v="4020" actId="1076"/>
-          <ac:spMkLst>
-            <pc:docMk/>
-            <pc:sldMk cId="3633369149" sldId="316"/>
-            <ac:spMk id="11" creationId="{9F40E2E0-6DA8-23E8-A6F4-1C4D45CDD135}"/>
-          </ac:spMkLst>
-        </pc:spChg>
-        <pc:spChg chg="add mod">
-          <ac:chgData name="Are Mjaavatten" userId="00bb58f78e5d171c" providerId="LiveId" clId="{055438CC-AB35-4861-8EC0-1B0371FB636C}" dt="2024-12-02T17:21:44.365" v="4137" actId="14100"/>
-          <ac:spMkLst>
-            <pc:docMk/>
-            <pc:sldMk cId="3633369149" sldId="316"/>
-            <ac:spMk id="18" creationId="{D882BC6F-27C7-6685-C18B-453DFA254877}"/>
-          </ac:spMkLst>
-        </pc:spChg>
-        <pc:graphicFrameChg chg="add mod">
-          <ac:chgData name="Are Mjaavatten" userId="00bb58f78e5d171c" providerId="LiveId" clId="{055438CC-AB35-4861-8EC0-1B0371FB636C}" dt="2024-12-02T16:59:02.075" v="3866"/>
-          <ac:graphicFrameMkLst>
-            <pc:docMk/>
-            <pc:sldMk cId="3633369149" sldId="316"/>
-            <ac:graphicFrameMk id="4" creationId="{7EC5787E-CD9C-9306-C92C-3D0C9C54B77C}"/>
-          </ac:graphicFrameMkLst>
-        </pc:graphicFrameChg>
-        <pc:graphicFrameChg chg="add mod modGraphic">
-          <ac:chgData name="Are Mjaavatten" userId="00bb58f78e5d171c" providerId="LiveId" clId="{055438CC-AB35-4861-8EC0-1B0371FB636C}" dt="2024-12-02T17:00:37.603" v="3931" actId="14734"/>
-          <ac:graphicFrameMkLst>
-            <pc:docMk/>
-            <pc:sldMk cId="3633369149" sldId="316"/>
-            <ac:graphicFrameMk id="5" creationId="{D214DE1E-3CBF-2B41-45FB-4965CE50CF00}"/>
-          </ac:graphicFrameMkLst>
-        </pc:graphicFrameChg>
-        <pc:graphicFrameChg chg="add mod modGraphic">
-          <ac:chgData name="Are Mjaavatten" userId="00bb58f78e5d171c" providerId="LiveId" clId="{055438CC-AB35-4861-8EC0-1B0371FB636C}" dt="2024-12-02T17:19:19.064" v="4105" actId="1035"/>
-          <ac:graphicFrameMkLst>
-            <pc:docMk/>
-            <pc:sldMk cId="3633369149" sldId="316"/>
-            <ac:graphicFrameMk id="6" creationId="{28426C0B-476D-19D4-1A2C-3D427061C493}"/>
-          </ac:graphicFrameMkLst>
-        </pc:graphicFrameChg>
-        <pc:picChg chg="add del mod">
-          <ac:chgData name="Are Mjaavatten" userId="00bb58f78e5d171c" providerId="LiveId" clId="{055438CC-AB35-4861-8EC0-1B0371FB636C}" dt="2024-12-02T17:08:49.938" v="3958" actId="478"/>
-          <ac:picMkLst>
-            <pc:docMk/>
-            <pc:sldMk cId="3633369149" sldId="316"/>
-            <ac:picMk id="8" creationId="{C58DA10F-BA72-9549-6ADC-0F751F64909A}"/>
-          </ac:picMkLst>
-        </pc:picChg>
-        <pc:picChg chg="add mod">
-          <ac:chgData name="Are Mjaavatten" userId="00bb58f78e5d171c" providerId="LiveId" clId="{055438CC-AB35-4861-8EC0-1B0371FB636C}" dt="2024-12-02T17:11:02.651" v="4019" actId="1076"/>
-          <ac:picMkLst>
-            <pc:docMk/>
-            <pc:sldMk cId="3633369149" sldId="316"/>
-            <ac:picMk id="10" creationId="{66CD94DF-865D-745A-CEE7-C80F1359134E}"/>
-          </ac:picMkLst>
-        </pc:picChg>
-        <pc:picChg chg="add del">
-          <ac:chgData name="Are Mjaavatten" userId="00bb58f78e5d171c" providerId="LiveId" clId="{055438CC-AB35-4861-8EC0-1B0371FB636C}" dt="2024-12-02T17:13:20.487" v="4022" actId="478"/>
-          <ac:picMkLst>
-            <pc:docMk/>
-            <pc:sldMk cId="3633369149" sldId="316"/>
-            <ac:picMk id="13" creationId="{7DCE9244-428C-C902-4BB0-BFD3848FD47A}"/>
-          </ac:picMkLst>
-        </pc:picChg>
-        <pc:picChg chg="add del mod">
-          <ac:chgData name="Are Mjaavatten" userId="00bb58f78e5d171c" providerId="LiveId" clId="{055438CC-AB35-4861-8EC0-1B0371FB636C}" dt="2024-12-02T17:14:50.133" v="4025" actId="478"/>
-          <ac:picMkLst>
-            <pc:docMk/>
-            <pc:sldMk cId="3633369149" sldId="316"/>
-            <ac:picMk id="15" creationId="{825F9D72-984A-A7AE-0FC8-F96CE591173A}"/>
-          </ac:picMkLst>
-        </pc:picChg>
-        <pc:picChg chg="add mod">
-          <ac:chgData name="Are Mjaavatten" userId="00bb58f78e5d171c" providerId="LiveId" clId="{055438CC-AB35-4861-8EC0-1B0371FB636C}" dt="2024-12-02T17:14:58.290" v="4027" actId="1076"/>
-          <ac:picMkLst>
-            <pc:docMk/>
-            <pc:sldMk cId="3633369149" sldId="316"/>
-            <ac:picMk id="17" creationId="{092FC71F-0969-6E58-55EF-1808F9E1A29D}"/>
-          </ac:picMkLst>
-        </pc:picChg>
       </pc:sldChg>
       <pc:sldChg chg="addSp delSp modSp new mod modClrScheme chgLayout">
         <pc:chgData name="Are Mjaavatten" userId="00bb58f78e5d171c" providerId="LiveId" clId="{055438CC-AB35-4861-8EC0-1B0371FB636C}" dt="2024-12-02T22:07:04.101" v="4788" actId="255"/>
@@ -2282,46 +894,6 @@
           <pc:docMk/>
           <pc:sldMk cId="499171047" sldId="317"/>
         </pc:sldMkLst>
-        <pc:spChg chg="mod ord">
-          <ac:chgData name="Are Mjaavatten" userId="00bb58f78e5d171c" providerId="LiveId" clId="{055438CC-AB35-4861-8EC0-1B0371FB636C}" dt="2024-12-02T17:27:07.130" v="4166" actId="700"/>
-          <ac:spMkLst>
-            <pc:docMk/>
-            <pc:sldMk cId="499171047" sldId="317"/>
-            <ac:spMk id="2" creationId="{C319B966-DCFA-55AF-209B-E5865DA1EC17}"/>
-          </ac:spMkLst>
-        </pc:spChg>
-        <pc:spChg chg="del">
-          <ac:chgData name="Are Mjaavatten" userId="00bb58f78e5d171c" providerId="LiveId" clId="{055438CC-AB35-4861-8EC0-1B0371FB636C}" dt="2024-12-02T17:26:40.006" v="4165" actId="700"/>
-          <ac:spMkLst>
-            <pc:docMk/>
-            <pc:sldMk cId="499171047" sldId="317"/>
-            <ac:spMk id="3" creationId="{2B95194D-2F0D-7100-8851-D969A180B230}"/>
-          </ac:spMkLst>
-        </pc:spChg>
-        <pc:spChg chg="add del mod ord">
-          <ac:chgData name="Are Mjaavatten" userId="00bb58f78e5d171c" providerId="LiveId" clId="{055438CC-AB35-4861-8EC0-1B0371FB636C}" dt="2024-12-02T17:38:13.867" v="4382"/>
-          <ac:spMkLst>
-            <pc:docMk/>
-            <pc:sldMk cId="499171047" sldId="317"/>
-            <ac:spMk id="4" creationId="{821CEF42-FFC5-DFCE-1ABD-D43F48BC47A8}"/>
-          </ac:spMkLst>
-        </pc:spChg>
-        <pc:spChg chg="add mod">
-          <ac:chgData name="Are Mjaavatten" userId="00bb58f78e5d171c" providerId="LiveId" clId="{055438CC-AB35-4861-8EC0-1B0371FB636C}" dt="2024-12-02T22:07:04.101" v="4788" actId="255"/>
-          <ac:spMkLst>
-            <pc:docMk/>
-            <pc:sldMk cId="499171047" sldId="317"/>
-            <ac:spMk id="5" creationId="{C3A6AED0-963F-1F14-8584-8D0BE40B8A6F}"/>
-          </ac:spMkLst>
-        </pc:spChg>
-        <pc:spChg chg="add del mod">
-          <ac:chgData name="Are Mjaavatten" userId="00bb58f78e5d171c" providerId="LiveId" clId="{055438CC-AB35-4861-8EC0-1B0371FB636C}" dt="2024-12-02T17:31:49.884" v="4222" actId="478"/>
-          <ac:spMkLst>
-            <pc:docMk/>
-            <pc:sldMk cId="499171047" sldId="317"/>
-            <ac:spMk id="7" creationId="{50AB6590-90D8-9849-8173-FE7DAD84573F}"/>
-          </ac:spMkLst>
-        </pc:spChg>
       </pc:sldChg>
     </pc:docChg>
   </pc:docChgLst>
@@ -2477,7 +1049,7 @@
           <a:p>
             <a:fld id="{DEC79A4E-9175-427E-BE99-C1822657C876}" type="datetimeFigureOut">
               <a:rPr lang="en-GB" smtClean="0"/>
-              <a:t>09/12/2024</a:t>
+              <a:t>10/04/2025</a:t>
             </a:fld>
             <a:endParaRPr lang="en-GB"/>
           </a:p>
@@ -2677,7 +1249,7 @@
           <a:p>
             <a:fld id="{DEC79A4E-9175-427E-BE99-C1822657C876}" type="datetimeFigureOut">
               <a:rPr lang="en-GB" smtClean="0"/>
-              <a:t>09/12/2024</a:t>
+              <a:t>10/04/2025</a:t>
             </a:fld>
             <a:endParaRPr lang="en-GB"/>
           </a:p>
@@ -2887,7 +1459,7 @@
           <a:p>
             <a:fld id="{DEC79A4E-9175-427E-BE99-C1822657C876}" type="datetimeFigureOut">
               <a:rPr lang="en-GB" smtClean="0"/>
-              <a:t>09/12/2024</a:t>
+              <a:t>10/04/2025</a:t>
             </a:fld>
             <a:endParaRPr lang="en-GB"/>
           </a:p>
@@ -3087,7 +1659,7 @@
           <a:p>
             <a:fld id="{DEC79A4E-9175-427E-BE99-C1822657C876}" type="datetimeFigureOut">
               <a:rPr lang="en-GB" smtClean="0"/>
-              <a:t>09/12/2024</a:t>
+              <a:t>10/04/2025</a:t>
             </a:fld>
             <a:endParaRPr lang="en-GB"/>
           </a:p>
@@ -3363,7 +1935,7 @@
           <a:p>
             <a:fld id="{DEC79A4E-9175-427E-BE99-C1822657C876}" type="datetimeFigureOut">
               <a:rPr lang="en-GB" smtClean="0"/>
-              <a:t>09/12/2024</a:t>
+              <a:t>10/04/2025</a:t>
             </a:fld>
             <a:endParaRPr lang="en-GB"/>
           </a:p>
@@ -3631,7 +2203,7 @@
           <a:p>
             <a:fld id="{DEC79A4E-9175-427E-BE99-C1822657C876}" type="datetimeFigureOut">
               <a:rPr lang="en-GB" smtClean="0"/>
-              <a:t>09/12/2024</a:t>
+              <a:t>10/04/2025</a:t>
             </a:fld>
             <a:endParaRPr lang="en-GB"/>
           </a:p>
@@ -4046,7 +2618,7 @@
           <a:p>
             <a:fld id="{DEC79A4E-9175-427E-BE99-C1822657C876}" type="datetimeFigureOut">
               <a:rPr lang="en-GB" smtClean="0"/>
-              <a:t>09/12/2024</a:t>
+              <a:t>10/04/2025</a:t>
             </a:fld>
             <a:endParaRPr lang="en-GB"/>
           </a:p>
@@ -4188,7 +2760,7 @@
           <a:p>
             <a:fld id="{DEC79A4E-9175-427E-BE99-C1822657C876}" type="datetimeFigureOut">
               <a:rPr lang="en-GB" smtClean="0"/>
-              <a:t>09/12/2024</a:t>
+              <a:t>10/04/2025</a:t>
             </a:fld>
             <a:endParaRPr lang="en-GB"/>
           </a:p>
@@ -4301,7 +2873,7 @@
           <a:p>
             <a:fld id="{DEC79A4E-9175-427E-BE99-C1822657C876}" type="datetimeFigureOut">
               <a:rPr lang="en-GB" smtClean="0"/>
-              <a:t>09/12/2024</a:t>
+              <a:t>10/04/2025</a:t>
             </a:fld>
             <a:endParaRPr lang="en-GB"/>
           </a:p>
@@ -4614,7 +3186,7 @@
           <a:p>
             <a:fld id="{DEC79A4E-9175-427E-BE99-C1822657C876}" type="datetimeFigureOut">
               <a:rPr lang="en-GB" smtClean="0"/>
-              <a:t>09/12/2024</a:t>
+              <a:t>10/04/2025</a:t>
             </a:fld>
             <a:endParaRPr lang="en-GB"/>
           </a:p>
@@ -4903,7 +3475,7 @@
           <a:p>
             <a:fld id="{DEC79A4E-9175-427E-BE99-C1822657C876}" type="datetimeFigureOut">
               <a:rPr lang="en-GB" smtClean="0"/>
-              <a:t>09/12/2024</a:t>
+              <a:t>10/04/2025</a:t>
             </a:fld>
             <a:endParaRPr lang="en-GB"/>
           </a:p>
@@ -5146,7 +3718,7 @@
           <a:p>
             <a:fld id="{DEC79A4E-9175-427E-BE99-C1822657C876}" type="datetimeFigureOut">
               <a:rPr lang="en-GB" smtClean="0"/>
-              <a:t>09/12/2024</a:t>
+              <a:t>10/04/2025</a:t>
             </a:fld>
             <a:endParaRPr lang="en-GB"/>
           </a:p>
@@ -5898,111 +4470,6 @@
           <p:cNvPr id="2" name="Title 1">
             <a:extLst>
               <a:ext uri="{FF2B5EF4-FFF2-40B4-BE49-F238E27FC236}">
-                <a16:creationId xmlns:a16="http://schemas.microsoft.com/office/drawing/2014/main" id="{0674DF78-8B81-C58D-E114-850F556C42DC}"/>
-              </a:ext>
-            </a:extLst>
-          </p:cNvPr>
-          <p:cNvSpPr>
-            <a:spLocks noGrp="1"/>
-          </p:cNvSpPr>
-          <p:nvPr>
-            <p:ph type="title"/>
-          </p:nvPr>
-        </p:nvSpPr>
-        <p:spPr/>
-        <p:txBody>
-          <a:bodyPr/>
-          <a:lstStyle/>
-          <a:p>
-            <a:r>
-              <a:rPr lang="en-GB" dirty="0"/>
-              <a:t>Find individual pull and relax traces (3)</a:t>
-            </a:r>
-          </a:p>
-        </p:txBody>
-      </p:sp>
-      <p:sp>
-        <p:nvSpPr>
-          <p:cNvPr id="3" name="Content Placeholder 2">
-            <a:extLst>
-              <a:ext uri="{FF2B5EF4-FFF2-40B4-BE49-F238E27FC236}">
-                <a16:creationId xmlns:a16="http://schemas.microsoft.com/office/drawing/2014/main" id="{3C134FFE-4202-599D-4DE1-2A816323D0CF}"/>
-              </a:ext>
-            </a:extLst>
-          </p:cNvPr>
-          <p:cNvSpPr>
-            <a:spLocks noGrp="1"/>
-          </p:cNvSpPr>
-          <p:nvPr>
-            <p:ph idx="1"/>
-          </p:nvPr>
-        </p:nvSpPr>
-        <p:spPr/>
-        <p:txBody>
-          <a:bodyPr/>
-          <a:lstStyle/>
-          <a:p>
-            <a:r>
-              <a:rPr lang="en-GB" dirty="0"/>
-              <a:t>I have just learned from Steve Smith that  the pulling and relaxing traces are specified  by the last digit in the COM file</a:t>
-            </a:r>
-          </a:p>
-          <a:p>
-            <a:pPr lvl="1"/>
-            <a:r>
-              <a:rPr lang="en-GB" dirty="0"/>
-              <a:t>(More about the COM file later)</a:t>
-            </a:r>
-          </a:p>
-          <a:p>
-            <a:r>
-              <a:rPr lang="en-GB" dirty="0"/>
-              <a:t>As long as we use experiment files from any of Steve’s instruments the logic of the two previous slides is therefore not needed. </a:t>
-            </a:r>
-          </a:p>
-          <a:p>
-            <a:r>
-              <a:rPr lang="en-GB" dirty="0"/>
-              <a:t>This may be taken into account in future releases</a:t>
-            </a:r>
-          </a:p>
-        </p:txBody>
-      </p:sp>
-    </p:spTree>
-    <p:extLst>
-      <p:ext uri="{BB962C8B-B14F-4D97-AF65-F5344CB8AC3E}">
-        <p14:creationId xmlns:p14="http://schemas.microsoft.com/office/powerpoint/2010/main" val="232088836"/>
-      </p:ext>
-    </p:extLst>
-  </p:cSld>
-  <p:clrMapOvr>
-    <a:masterClrMapping/>
-  </p:clrMapOvr>
-</p:sld>
-</file>
-
-<file path=ppt/slides/slide12.xml><?xml version="1.0" encoding="utf-8"?>
-<p:sld xmlns:a="http://schemas.openxmlformats.org/drawingml/2006/main" xmlns:r="http://schemas.openxmlformats.org/officeDocument/2006/relationships" xmlns:p="http://schemas.openxmlformats.org/presentationml/2006/main">
-  <p:cSld>
-    <p:spTree>
-      <p:nvGrpSpPr>
-        <p:cNvPr id="1" name=""/>
-        <p:cNvGrpSpPr/>
-        <p:nvPr/>
-      </p:nvGrpSpPr>
-      <p:grpSpPr>
-        <a:xfrm>
-          <a:off x="0" y="0"/>
-          <a:ext cx="0" cy="0"/>
-          <a:chOff x="0" y="0"/>
-          <a:chExt cx="0" cy="0"/>
-        </a:xfrm>
-      </p:grpSpPr>
-      <p:sp>
-        <p:nvSpPr>
-          <p:cNvPr id="2" name="Title 1">
-            <a:extLst>
-              <a:ext uri="{FF2B5EF4-FFF2-40B4-BE49-F238E27FC236}">
                 <a16:creationId xmlns:a16="http://schemas.microsoft.com/office/drawing/2014/main" id="{054D8866-5159-A701-9D35-CDD4CB7022C2}"/>
               </a:ext>
             </a:extLst>
@@ -7586,7 +6053,7 @@
 </p:sld>
 </file>
 
-<file path=ppt/slides/slide13.xml><?xml version="1.0" encoding="utf-8"?>
+<file path=ppt/slides/slide12.xml><?xml version="1.0" encoding="utf-8"?>
 <p:sld xmlns:a="http://schemas.openxmlformats.org/drawingml/2006/main" xmlns:r="http://schemas.openxmlformats.org/officeDocument/2006/relationships" xmlns:p="http://schemas.openxmlformats.org/presentationml/2006/main">
   <p:cSld>
     <p:spTree>
@@ -7775,7 +6242,7 @@
 </p:sld>
 </file>
 
-<file path=ppt/slides/slide14.xml><?xml version="1.0" encoding="utf-8"?>
+<file path=ppt/slides/slide13.xml><?xml version="1.0" encoding="utf-8"?>
 <p:sld xmlns:a="http://schemas.openxmlformats.org/drawingml/2006/main" xmlns:r="http://schemas.openxmlformats.org/officeDocument/2006/relationships" xmlns:p="http://schemas.openxmlformats.org/presentationml/2006/main">
   <p:cSld>
     <p:bg>
@@ -8105,7 +6572,7 @@
 </p:sld>
 </file>
 
-<file path=ppt/slides/slide15.xml><?xml version="1.0" encoding="utf-8"?>
+<file path=ppt/slides/slide14.xml><?xml version="1.0" encoding="utf-8"?>
 <p:sld xmlns:a="http://schemas.openxmlformats.org/drawingml/2006/main" xmlns:r="http://schemas.openxmlformats.org/officeDocument/2006/relationships" xmlns:p="http://schemas.openxmlformats.org/presentationml/2006/main">
   <p:cSld>
     <p:spTree>
@@ -8265,7 +6732,7 @@
 </p:sld>
 </file>
 
-<file path=ppt/slides/slide16.xml><?xml version="1.0" encoding="utf-8"?>
+<file path=ppt/slides/slide15.xml><?xml version="1.0" encoding="utf-8"?>
 <p:sld xmlns:a="http://schemas.openxmlformats.org/drawingml/2006/main" xmlns:r="http://schemas.openxmlformats.org/officeDocument/2006/relationships" xmlns:p="http://schemas.openxmlformats.org/presentationml/2006/main">
   <p:cSld>
     <p:spTree>
@@ -8506,7 +6973,7 @@
 </p:sld>
 </file>
 
-<file path=ppt/slides/slide17.xml><?xml version="1.0" encoding="utf-8"?>
+<file path=ppt/slides/slide16.xml><?xml version="1.0" encoding="utf-8"?>
 <p:sld xmlns:a="http://schemas.openxmlformats.org/drawingml/2006/main" xmlns:r="http://schemas.openxmlformats.org/officeDocument/2006/relationships" xmlns:p="http://schemas.openxmlformats.org/presentationml/2006/main">
   <p:cSld>
     <p:spTree>
@@ -8633,7 +7100,7 @@
 </p:sld>
 </file>
 
-<file path=ppt/slides/slide18.xml><?xml version="1.0" encoding="utf-8"?>
+<file path=ppt/slides/slide17.xml><?xml version="1.0" encoding="utf-8"?>
 <p:sld xmlns:a="http://schemas.openxmlformats.org/drawingml/2006/main" xmlns:r="http://schemas.openxmlformats.org/officeDocument/2006/relationships" xmlns:p="http://schemas.openxmlformats.org/presentationml/2006/main">
   <p:cSld>
     <p:spTree>
@@ -8934,7 +7401,7 @@
 </p:sld>
 </file>
 
-<file path=ppt/slides/slide19.xml><?xml version="1.0" encoding="utf-8"?>
+<file path=ppt/slides/slide18.xml><?xml version="1.0" encoding="utf-8"?>
 <p:sld xmlns:a="http://schemas.openxmlformats.org/drawingml/2006/main" xmlns:r="http://schemas.openxmlformats.org/officeDocument/2006/relationships" xmlns:p="http://schemas.openxmlformats.org/presentationml/2006/main">
   <p:cSld>
     <p:spTree>
@@ -9031,7 +7498,7 @@
           <a:p>
             <a:r>
               <a:rPr lang="en-GB" dirty="0"/>
-              <a:t>Thus Δx increases with the rip force</a:t>
+              <a:t>Thus, Δx increases with the rip force</a:t>
             </a:r>
           </a:p>
           <a:p>
@@ -9055,168 +7522,7 @@
 </p:sld>
 </file>
 
-<file path=ppt/slides/slide2.xml><?xml version="1.0" encoding="utf-8"?>
-<p:sld xmlns:a="http://schemas.openxmlformats.org/drawingml/2006/main" xmlns:r="http://schemas.openxmlformats.org/officeDocument/2006/relationships" xmlns:p="http://schemas.openxmlformats.org/presentationml/2006/main">
-  <p:cSld>
-    <p:spTree>
-      <p:nvGrpSpPr>
-        <p:cNvPr id="1" name=""/>
-        <p:cNvGrpSpPr/>
-        <p:nvPr/>
-      </p:nvGrpSpPr>
-      <p:grpSpPr>
-        <a:xfrm>
-          <a:off x="0" y="0"/>
-          <a:ext cx="0" cy="0"/>
-          <a:chOff x="0" y="0"/>
-          <a:chExt cx="0" cy="0"/>
-        </a:xfrm>
-      </p:grpSpPr>
-      <p:sp>
-        <p:nvSpPr>
-          <p:cNvPr id="2" name="Title 1">
-            <a:extLst>
-              <a:ext uri="{FF2B5EF4-FFF2-40B4-BE49-F238E27FC236}">
-                <a16:creationId xmlns:a16="http://schemas.microsoft.com/office/drawing/2014/main" id="{CE4C0D81-2423-A327-649E-0289CF1797B6}"/>
-              </a:ext>
-            </a:extLst>
-          </p:cNvPr>
-          <p:cNvSpPr>
-            <a:spLocks noGrp="1"/>
-          </p:cNvSpPr>
-          <p:nvPr>
-            <p:ph type="title"/>
-          </p:nvPr>
-        </p:nvSpPr>
-        <p:spPr/>
-        <p:txBody>
-          <a:bodyPr/>
-          <a:lstStyle/>
-          <a:p>
-            <a:r>
-              <a:rPr lang="en-GB" dirty="0"/>
-              <a:t>My background</a:t>
-            </a:r>
-          </a:p>
-        </p:txBody>
-      </p:sp>
-      <p:sp>
-        <p:nvSpPr>
-          <p:cNvPr id="3" name="Content Placeholder 2">
-            <a:extLst>
-              <a:ext uri="{FF2B5EF4-FFF2-40B4-BE49-F238E27FC236}">
-                <a16:creationId xmlns:a16="http://schemas.microsoft.com/office/drawing/2014/main" id="{D0ED26A4-2141-C972-F9B5-2DD483F109DF}"/>
-              </a:ext>
-            </a:extLst>
-          </p:cNvPr>
-          <p:cNvSpPr>
-            <a:spLocks noGrp="1"/>
-          </p:cNvSpPr>
-          <p:nvPr>
-            <p:ph idx="1"/>
-          </p:nvPr>
-        </p:nvSpPr>
-        <p:spPr>
-          <a:xfrm>
-            <a:off x="838200" y="1825625"/>
-            <a:ext cx="6740182" cy="4351338"/>
-          </a:xfrm>
-        </p:spPr>
-        <p:txBody>
-          <a:bodyPr>
-            <a:normAutofit/>
-          </a:bodyPr>
-          <a:lstStyle/>
-          <a:p>
-            <a:r>
-              <a:rPr lang="en-GB" dirty="0"/>
-              <a:t>Country: Norway</a:t>
-            </a:r>
-          </a:p>
-          <a:p>
-            <a:r>
-              <a:rPr lang="en-GB" dirty="0"/>
-              <a:t>MSc in physics</a:t>
-            </a:r>
-          </a:p>
-          <a:p>
-            <a:r>
-              <a:rPr lang="en-GB" dirty="0"/>
-              <a:t>PhD in automatic control</a:t>
-            </a:r>
-          </a:p>
-          <a:p>
-            <a:r>
-              <a:rPr lang="en-GB" dirty="0"/>
-              <a:t>Worked in the petroleum and chemical processing industries</a:t>
-            </a:r>
-          </a:p>
-          <a:p>
-            <a:pPr lvl="1"/>
-            <a:r>
-              <a:rPr lang="en-GB" dirty="0"/>
-              <a:t>Mathematical modelling</a:t>
-            </a:r>
-          </a:p>
-          <a:p>
-            <a:pPr lvl="1"/>
-            <a:r>
-              <a:rPr lang="en-GB" dirty="0"/>
-              <a:t>Thermodynamics</a:t>
-            </a:r>
-          </a:p>
-          <a:p>
-            <a:r>
-              <a:rPr lang="en-GB" dirty="0"/>
-              <a:t>Part-time professor at what is now The University of South-Eastern Norway</a:t>
-            </a:r>
-          </a:p>
-        </p:txBody>
-      </p:sp>
-      <p:pic>
-        <p:nvPicPr>
-          <p:cNvPr id="5" name="Picture 4">
-            <a:extLst>
-              <a:ext uri="{FF2B5EF4-FFF2-40B4-BE49-F238E27FC236}">
-                <a16:creationId xmlns:a16="http://schemas.microsoft.com/office/drawing/2014/main" id="{90D430FE-DA88-164F-C76A-0617314B6D59}"/>
-              </a:ext>
-            </a:extLst>
-          </p:cNvPr>
-          <p:cNvPicPr>
-            <a:picLocks noChangeAspect="1"/>
-          </p:cNvPicPr>
-          <p:nvPr/>
-        </p:nvPicPr>
-        <p:blipFill>
-          <a:blip r:embed="rId2"/>
-          <a:stretch>
-            <a:fillRect/>
-          </a:stretch>
-        </p:blipFill>
-        <p:spPr>
-          <a:xfrm>
-            <a:off x="7578381" y="1454727"/>
-            <a:ext cx="4209627" cy="4121927"/>
-          </a:xfrm>
-          <a:prstGeom prst="rect">
-            <a:avLst/>
-          </a:prstGeom>
-        </p:spPr>
-      </p:pic>
-    </p:spTree>
-    <p:extLst>
-      <p:ext uri="{BB962C8B-B14F-4D97-AF65-F5344CB8AC3E}">
-        <p14:creationId xmlns:p14="http://schemas.microsoft.com/office/powerpoint/2010/main" val="3991534619"/>
-      </p:ext>
-    </p:extLst>
-  </p:cSld>
-  <p:clrMapOvr>
-    <a:masterClrMapping/>
-  </p:clrMapOvr>
-</p:sld>
-</file>
-
-<file path=ppt/slides/slide20.xml><?xml version="1.0" encoding="utf-8"?>
+<file path=ppt/slides/slide19.xml><?xml version="1.0" encoding="utf-8"?>
 <p:sld xmlns:a="http://schemas.openxmlformats.org/drawingml/2006/main" xmlns:r="http://schemas.openxmlformats.org/officeDocument/2006/relationships" xmlns:p="http://schemas.openxmlformats.org/presentationml/2006/main">
   <p:cSld>
     <p:spTree>
@@ -9743,7 +8049,168 @@
 </p:sld>
 </file>
 
-<file path=ppt/slides/slide21.xml><?xml version="1.0" encoding="utf-8"?>
+<file path=ppt/slides/slide2.xml><?xml version="1.0" encoding="utf-8"?>
+<p:sld xmlns:a="http://schemas.openxmlformats.org/drawingml/2006/main" xmlns:r="http://schemas.openxmlformats.org/officeDocument/2006/relationships" xmlns:p="http://schemas.openxmlformats.org/presentationml/2006/main">
+  <p:cSld>
+    <p:spTree>
+      <p:nvGrpSpPr>
+        <p:cNvPr id="1" name=""/>
+        <p:cNvGrpSpPr/>
+        <p:nvPr/>
+      </p:nvGrpSpPr>
+      <p:grpSpPr>
+        <a:xfrm>
+          <a:off x="0" y="0"/>
+          <a:ext cx="0" cy="0"/>
+          <a:chOff x="0" y="0"/>
+          <a:chExt cx="0" cy="0"/>
+        </a:xfrm>
+      </p:grpSpPr>
+      <p:sp>
+        <p:nvSpPr>
+          <p:cNvPr id="2" name="Title 1">
+            <a:extLst>
+              <a:ext uri="{FF2B5EF4-FFF2-40B4-BE49-F238E27FC236}">
+                <a16:creationId xmlns:a16="http://schemas.microsoft.com/office/drawing/2014/main" id="{CE4C0D81-2423-A327-649E-0289CF1797B6}"/>
+              </a:ext>
+            </a:extLst>
+          </p:cNvPr>
+          <p:cNvSpPr>
+            <a:spLocks noGrp="1"/>
+          </p:cNvSpPr>
+          <p:nvPr>
+            <p:ph type="title"/>
+          </p:nvPr>
+        </p:nvSpPr>
+        <p:spPr/>
+        <p:txBody>
+          <a:bodyPr/>
+          <a:lstStyle/>
+          <a:p>
+            <a:r>
+              <a:rPr lang="en-GB" dirty="0"/>
+              <a:t>My background</a:t>
+            </a:r>
+          </a:p>
+        </p:txBody>
+      </p:sp>
+      <p:sp>
+        <p:nvSpPr>
+          <p:cNvPr id="3" name="Content Placeholder 2">
+            <a:extLst>
+              <a:ext uri="{FF2B5EF4-FFF2-40B4-BE49-F238E27FC236}">
+                <a16:creationId xmlns:a16="http://schemas.microsoft.com/office/drawing/2014/main" id="{D0ED26A4-2141-C972-F9B5-2DD483F109DF}"/>
+              </a:ext>
+            </a:extLst>
+          </p:cNvPr>
+          <p:cNvSpPr>
+            <a:spLocks noGrp="1"/>
+          </p:cNvSpPr>
+          <p:nvPr>
+            <p:ph idx="1"/>
+          </p:nvPr>
+        </p:nvSpPr>
+        <p:spPr>
+          <a:xfrm>
+            <a:off x="838200" y="1825625"/>
+            <a:ext cx="6740182" cy="4351338"/>
+          </a:xfrm>
+        </p:spPr>
+        <p:txBody>
+          <a:bodyPr>
+            <a:normAutofit/>
+          </a:bodyPr>
+          <a:lstStyle/>
+          <a:p>
+            <a:r>
+              <a:rPr lang="en-GB" dirty="0"/>
+              <a:t>Country: Norway</a:t>
+            </a:r>
+          </a:p>
+          <a:p>
+            <a:r>
+              <a:rPr lang="en-GB" dirty="0"/>
+              <a:t>MSc in physics</a:t>
+            </a:r>
+          </a:p>
+          <a:p>
+            <a:r>
+              <a:rPr lang="en-GB" dirty="0"/>
+              <a:t>PhD in automatic control</a:t>
+            </a:r>
+          </a:p>
+          <a:p>
+            <a:r>
+              <a:rPr lang="en-GB" dirty="0"/>
+              <a:t>Worked in the petroleum and chemical processing industries</a:t>
+            </a:r>
+          </a:p>
+          <a:p>
+            <a:pPr lvl="1"/>
+            <a:r>
+              <a:rPr lang="en-GB" dirty="0"/>
+              <a:t>Mathematical modelling</a:t>
+            </a:r>
+          </a:p>
+          <a:p>
+            <a:pPr lvl="1"/>
+            <a:r>
+              <a:rPr lang="en-GB" dirty="0"/>
+              <a:t>Thermodynamics</a:t>
+            </a:r>
+          </a:p>
+          <a:p>
+            <a:r>
+              <a:rPr lang="en-GB" dirty="0"/>
+              <a:t>Part-time professor at what is now The University of South-Eastern Norway</a:t>
+            </a:r>
+          </a:p>
+        </p:txBody>
+      </p:sp>
+      <p:pic>
+        <p:nvPicPr>
+          <p:cNvPr id="5" name="Picture 4">
+            <a:extLst>
+              <a:ext uri="{FF2B5EF4-FFF2-40B4-BE49-F238E27FC236}">
+                <a16:creationId xmlns:a16="http://schemas.microsoft.com/office/drawing/2014/main" id="{90D430FE-DA88-164F-C76A-0617314B6D59}"/>
+              </a:ext>
+            </a:extLst>
+          </p:cNvPr>
+          <p:cNvPicPr>
+            <a:picLocks noChangeAspect="1"/>
+          </p:cNvPicPr>
+          <p:nvPr/>
+        </p:nvPicPr>
+        <p:blipFill>
+          <a:blip r:embed="rId2"/>
+          <a:stretch>
+            <a:fillRect/>
+          </a:stretch>
+        </p:blipFill>
+        <p:spPr>
+          <a:xfrm>
+            <a:off x="7578381" y="1454727"/>
+            <a:ext cx="4209627" cy="4121927"/>
+          </a:xfrm>
+          <a:prstGeom prst="rect">
+            <a:avLst/>
+          </a:prstGeom>
+        </p:spPr>
+      </p:pic>
+    </p:spTree>
+    <p:extLst>
+      <p:ext uri="{BB962C8B-B14F-4D97-AF65-F5344CB8AC3E}">
+        <p14:creationId xmlns:p14="http://schemas.microsoft.com/office/powerpoint/2010/main" val="3991534619"/>
+      </p:ext>
+    </p:extLst>
+  </p:cSld>
+  <p:clrMapOvr>
+    <a:masterClrMapping/>
+  </p:clrMapOvr>
+</p:sld>
+</file>
+
+<file path=ppt/slides/slide20.xml><?xml version="1.0" encoding="utf-8"?>
 <p:sld xmlns:a="http://schemas.openxmlformats.org/drawingml/2006/main" xmlns:r="http://schemas.openxmlformats.org/officeDocument/2006/relationships" xmlns:p="http://schemas.openxmlformats.org/presentationml/2006/main">
   <p:cSld>
     <p:spTree>
@@ -10014,6 +8481,172 @@
 </p:sld>
 </file>
 
+<file path=ppt/slides/slide21.xml><?xml version="1.0" encoding="utf-8"?>
+<p:sld xmlns:a="http://schemas.openxmlformats.org/drawingml/2006/main" xmlns:r="http://schemas.openxmlformats.org/officeDocument/2006/relationships" xmlns:p="http://schemas.openxmlformats.org/presentationml/2006/main">
+  <p:cSld>
+    <p:spTree>
+      <p:nvGrpSpPr>
+        <p:cNvPr id="1" name=""/>
+        <p:cNvGrpSpPr/>
+        <p:nvPr/>
+      </p:nvGrpSpPr>
+      <p:grpSpPr>
+        <a:xfrm>
+          <a:off x="0" y="0"/>
+          <a:ext cx="0" cy="0"/>
+          <a:chOff x="0" y="0"/>
+          <a:chExt cx="0" cy="0"/>
+        </a:xfrm>
+      </p:grpSpPr>
+      <p:sp>
+        <p:nvSpPr>
+          <p:cNvPr id="2" name="Title 1">
+            <a:extLst>
+              <a:ext uri="{FF2B5EF4-FFF2-40B4-BE49-F238E27FC236}">
+                <a16:creationId xmlns:a16="http://schemas.microsoft.com/office/drawing/2014/main" id="{007274B8-4871-681C-A44C-BACC989A3AEF}"/>
+              </a:ext>
+            </a:extLst>
+          </p:cNvPr>
+          <p:cNvSpPr>
+            <a:spLocks noGrp="1"/>
+          </p:cNvSpPr>
+          <p:nvPr>
+            <p:ph type="title"/>
+          </p:nvPr>
+        </p:nvSpPr>
+        <p:spPr/>
+        <p:txBody>
+          <a:bodyPr/>
+          <a:lstStyle/>
+          <a:p>
+            <a:r>
+              <a:rPr lang="en-GB" dirty="0"/>
+              <a:t>Using Matlab to analyse experiments</a:t>
+            </a:r>
+          </a:p>
+        </p:txBody>
+      </p:sp>
+      <p:sp>
+        <p:nvSpPr>
+          <p:cNvPr id="3" name="Content Placeholder 2">
+            <a:extLst>
+              <a:ext uri="{FF2B5EF4-FFF2-40B4-BE49-F238E27FC236}">
+                <a16:creationId xmlns:a16="http://schemas.microsoft.com/office/drawing/2014/main" id="{D69F0E18-403E-2856-0E01-F43BC137040A}"/>
+              </a:ext>
+            </a:extLst>
+          </p:cNvPr>
+          <p:cNvSpPr>
+            <a:spLocks noGrp="1"/>
+          </p:cNvSpPr>
+          <p:nvPr>
+            <p:ph idx="1"/>
+          </p:nvPr>
+        </p:nvSpPr>
+        <p:spPr>
+          <a:xfrm>
+            <a:off x="838200" y="1825625"/>
+            <a:ext cx="10515600" cy="3346144"/>
+          </a:xfrm>
+        </p:spPr>
+        <p:txBody>
+          <a:bodyPr>
+            <a:normAutofit fontScale="92500" lnSpcReduction="10000"/>
+          </a:bodyPr>
+          <a:lstStyle/>
+          <a:p>
+            <a:r>
+              <a:rPr lang="en-GB" dirty="0"/>
+              <a:t>The following is a quick walk-through</a:t>
+            </a:r>
+          </a:p>
+          <a:p>
+            <a:r>
+              <a:rPr lang="en-GB" dirty="0"/>
+              <a:t>We will go through this more slowly in the exercises</a:t>
+            </a:r>
+          </a:p>
+          <a:p>
+            <a:r>
+              <a:rPr lang="en-GB" dirty="0"/>
+              <a:t>Assuming you have already installed Matlab </a:t>
+            </a:r>
+          </a:p>
+          <a:p>
+            <a:pPr lvl="1"/>
+            <a:r>
+              <a:rPr lang="en-GB" dirty="0"/>
+              <a:t>Or work together with someone who has</a:t>
+            </a:r>
+          </a:p>
+          <a:p>
+            <a:r>
+              <a:rPr lang="en-GB" dirty="0"/>
+              <a:t>Download Matlab files from </a:t>
+            </a:r>
+            <a:br>
+              <a:rPr lang="en-GB" dirty="0"/>
+            </a:br>
+            <a:r>
+              <a:rPr lang="en-GB" dirty="0">
+                <a:hlinkClick r:id="rId2"/>
+              </a:rPr>
+              <a:t>https://github.com/are-mj/OpticalTweezers</a:t>
+            </a:r>
+            <a:endParaRPr lang="en-GB" dirty="0"/>
+          </a:p>
+          <a:p>
+            <a:r>
+              <a:rPr lang="en-GB" dirty="0"/>
+              <a:t>Copy your experiment *.txt files to a folder on your computer</a:t>
+            </a:r>
+          </a:p>
+          <a:p>
+            <a:pPr lvl="1"/>
+            <a:r>
+              <a:rPr lang="en-GB" dirty="0"/>
+              <a:t>Or use a network folder</a:t>
+            </a:r>
+          </a:p>
+          <a:p>
+            <a:endParaRPr lang="en-GB" dirty="0"/>
+          </a:p>
+          <a:p>
+            <a:endParaRPr lang="en-GB" dirty="0"/>
+          </a:p>
+          <a:p>
+            <a:pPr lvl="1"/>
+            <a:endParaRPr lang="en-GB" dirty="0"/>
+          </a:p>
+          <a:p>
+            <a:pPr marL="457200" lvl="1" indent="0">
+              <a:buNone/>
+            </a:pPr>
+            <a:endParaRPr lang="en-GB" dirty="0"/>
+          </a:p>
+          <a:p>
+            <a:pPr marL="457200" lvl="1" indent="0">
+              <a:buNone/>
+            </a:pPr>
+            <a:endParaRPr lang="en-GB" dirty="0"/>
+          </a:p>
+          <a:p>
+            <a:endParaRPr lang="en-GB" dirty="0"/>
+          </a:p>
+        </p:txBody>
+      </p:sp>
+    </p:spTree>
+    <p:extLst>
+      <p:ext uri="{BB962C8B-B14F-4D97-AF65-F5344CB8AC3E}">
+        <p14:creationId xmlns:p14="http://schemas.microsoft.com/office/powerpoint/2010/main" val="3816220206"/>
+      </p:ext>
+    </p:extLst>
+  </p:cSld>
+  <p:clrMapOvr>
+    <a:masterClrMapping/>
+  </p:clrMapOvr>
+</p:sld>
+</file>
+
 <file path=ppt/slides/slide22.xml><?xml version="1.0" encoding="utf-8"?>
 <p:sld xmlns:a="http://schemas.openxmlformats.org/drawingml/2006/main" xmlns:r="http://schemas.openxmlformats.org/officeDocument/2006/relationships" xmlns:p="http://schemas.openxmlformats.org/presentationml/2006/main">
   <p:cSld>
@@ -10036,7 +8669,7 @@
           <p:cNvPr id="2" name="Title 1">
             <a:extLst>
               <a:ext uri="{FF2B5EF4-FFF2-40B4-BE49-F238E27FC236}">
-                <a16:creationId xmlns:a16="http://schemas.microsoft.com/office/drawing/2014/main" id="{007274B8-4871-681C-A44C-BACC989A3AEF}"/>
+                <a16:creationId xmlns:a16="http://schemas.microsoft.com/office/drawing/2014/main" id="{472EBC0F-0863-FC08-A12B-6E5B523BE5B5}"/>
               </a:ext>
             </a:extLst>
           </p:cNvPr>
@@ -10054,7 +8687,7 @@
           <a:p>
             <a:r>
               <a:rPr lang="en-GB" dirty="0"/>
-              <a:t>Using Matlab to analyse experiments</a:t>
+              <a:t>Suggested experiment file organisation</a:t>
             </a:r>
           </a:p>
         </p:txBody>
@@ -10064,7 +8697,7 @@
           <p:cNvPr id="3" name="Content Placeholder 2">
             <a:extLst>
               <a:ext uri="{FF2B5EF4-FFF2-40B4-BE49-F238E27FC236}">
-                <a16:creationId xmlns:a16="http://schemas.microsoft.com/office/drawing/2014/main" id="{D69F0E18-403E-2856-0E01-F43BC137040A}"/>
+                <a16:creationId xmlns:a16="http://schemas.microsoft.com/office/drawing/2014/main" id="{2E9A1E1F-E1FB-D600-D0EE-A17FB6095AFF}"/>
               </a:ext>
             </a:extLst>
           </p:cNvPr>
@@ -10077,100 +8710,134 @@
         </p:nvSpPr>
         <p:spPr>
           <a:xfrm>
-            <a:off x="838200" y="1825625"/>
-            <a:ext cx="10515600" cy="3346144"/>
+            <a:off x="838199" y="1825625"/>
+            <a:ext cx="5729749" cy="4034400"/>
           </a:xfrm>
         </p:spPr>
         <p:txBody>
           <a:bodyPr>
-            <a:normAutofit fontScale="92500" lnSpcReduction="10000"/>
+            <a:normAutofit/>
           </a:bodyPr>
           <a:lstStyle/>
           <a:p>
             <a:r>
-              <a:rPr lang="en-GB" dirty="0"/>
-              <a:t>The following is a quick walk-through</a:t>
-            </a:r>
-          </a:p>
-          <a:p>
-            <a:r>
-              <a:rPr lang="en-GB" dirty="0"/>
-              <a:t>We will go through this more slowly in the exercises</a:t>
-            </a:r>
-          </a:p>
-          <a:p>
-            <a:r>
-              <a:rPr lang="en-GB" dirty="0"/>
-              <a:t>Assuming you have already installed Matlab </a:t>
-            </a:r>
-          </a:p>
-          <a:p>
-            <a:pPr lvl="1"/>
-            <a:r>
-              <a:rPr lang="en-GB" dirty="0"/>
-              <a:t>Or work together with someone who has</a:t>
-            </a:r>
-          </a:p>
-          <a:p>
-            <a:r>
-              <a:rPr lang="en-GB" dirty="0"/>
-              <a:t>Download Matlab files from </a:t>
-            </a:r>
-            <a:br>
-              <a:rPr lang="en-GB" dirty="0"/>
-            </a:br>
-            <a:r>
-              <a:rPr lang="en-GB" dirty="0">
-                <a:hlinkClick r:id="rId2"/>
+              <a:rPr lang="en-GB" sz="2400" dirty="0"/>
+              <a:t>I prefer to store the experiment files in one data folder</a:t>
+            </a:r>
+          </a:p>
+          <a:p>
+            <a:r>
+              <a:rPr lang="en-GB" sz="2400" dirty="0"/>
+              <a:t>I use one level of subfolders for storing experiment files.</a:t>
+            </a:r>
+          </a:p>
+          <a:p>
+            <a:r>
+              <a:rPr lang="en-GB" sz="2400" dirty="0"/>
+              <a:t>Subfolders can for instance be named by experiment date.</a:t>
+            </a:r>
+          </a:p>
+          <a:p>
+            <a:r>
+              <a:rPr lang="en-GB" sz="2400" dirty="0"/>
+              <a:t>Refer to individual file as </a:t>
+            </a:r>
+            <a:r>
+              <a:rPr lang="en-GB" sz="2400" dirty="0" err="1"/>
+              <a:t>e.g</a:t>
+            </a:r>
+            <a:r>
+              <a:rPr lang="en-GB" sz="2400" dirty="0"/>
+              <a:t> . Subfolder1/Aa.txt</a:t>
+            </a:r>
+          </a:p>
+          <a:p>
+            <a:r>
+              <a:rPr lang="en-GB" sz="2400" dirty="0"/>
+              <a:t>Most of my functions automatically add the data folder when needed:</a:t>
+            </a:r>
+          </a:p>
+        </p:txBody>
+      </p:sp>
+      <p:pic>
+        <p:nvPicPr>
+          <p:cNvPr id="5" name="Picture 4">
+            <a:extLst>
+              <a:ext uri="{FF2B5EF4-FFF2-40B4-BE49-F238E27FC236}">
+                <a16:creationId xmlns:a16="http://schemas.microsoft.com/office/drawing/2014/main" id="{7E983D36-8148-C52C-3212-D1C2FF4A54C9}"/>
+              </a:ext>
+            </a:extLst>
+          </p:cNvPr>
+          <p:cNvPicPr>
+            <a:picLocks noChangeAspect="1"/>
+          </p:cNvPicPr>
+          <p:nvPr/>
+        </p:nvPicPr>
+        <p:blipFill>
+          <a:blip r:embed="rId2"/>
+          <a:stretch>
+            <a:fillRect/>
+          </a:stretch>
+        </p:blipFill>
+        <p:spPr>
+          <a:xfrm>
+            <a:off x="6744929" y="1764029"/>
+            <a:ext cx="4916057" cy="3820693"/>
+          </a:xfrm>
+          <a:prstGeom prst="rect">
+            <a:avLst/>
+          </a:prstGeom>
+        </p:spPr>
+      </p:pic>
+      <p:sp>
+        <p:nvSpPr>
+          <p:cNvPr id="6" name="TextBox 5">
+            <a:extLst>
+              <a:ext uri="{FF2B5EF4-FFF2-40B4-BE49-F238E27FC236}">
+                <a16:creationId xmlns:a16="http://schemas.microsoft.com/office/drawing/2014/main" id="{92A6A31D-37FF-95B9-730E-0F42FB9048FE}"/>
+              </a:ext>
+            </a:extLst>
+          </p:cNvPr>
+          <p:cNvSpPr txBox="1"/>
+          <p:nvPr/>
+        </p:nvSpPr>
+        <p:spPr>
+          <a:xfrm>
+            <a:off x="975851" y="5912771"/>
+            <a:ext cx="7883014" cy="461665"/>
+          </a:xfrm>
+          <a:prstGeom prst="rect">
+            <a:avLst/>
+          </a:prstGeom>
+          <a:noFill/>
+        </p:spPr>
+        <p:txBody>
+          <a:bodyPr wrap="square" rtlCol="0">
+            <a:spAutoFit/>
+          </a:bodyPr>
+          <a:lstStyle/>
+          <a:p>
+            <a:r>
+              <a:rPr lang="en-GB" sz="2400" dirty="0" err="1">
+                <a:latin typeface="Consolas" panose="020B0609020204030204" pitchFamily="49" charset="0"/>
+                <a:cs typeface="Courier New" panose="02070309020205020404" pitchFamily="49" charset="0"/>
               </a:rPr>
-              <a:t>https://github.com/are-mj/OpticalTweezers</a:t>
-            </a:r>
-            <a:endParaRPr lang="en-GB" dirty="0"/>
-          </a:p>
-          <a:p>
-            <a:r>
-              <a:rPr lang="en-GB" dirty="0"/>
-              <a:t>Copy your experiment *.txt files to a folder on your computer</a:t>
-            </a:r>
-          </a:p>
-          <a:p>
-            <a:pPr lvl="1"/>
-            <a:r>
-              <a:rPr lang="en-GB" dirty="0"/>
-              <a:t>Or use a network folder</a:t>
-            </a:r>
-          </a:p>
-          <a:p>
-            <a:endParaRPr lang="en-GB" dirty="0"/>
-          </a:p>
-          <a:p>
-            <a:endParaRPr lang="en-GB" dirty="0"/>
-          </a:p>
-          <a:p>
-            <a:pPr lvl="1"/>
-            <a:endParaRPr lang="en-GB" dirty="0"/>
-          </a:p>
-          <a:p>
-            <a:pPr marL="457200" lvl="1" indent="0">
-              <a:buNone/>
-            </a:pPr>
-            <a:endParaRPr lang="en-GB" dirty="0"/>
-          </a:p>
-          <a:p>
-            <a:pPr marL="457200" lvl="1" indent="0">
-              <a:buNone/>
-            </a:pPr>
-            <a:endParaRPr lang="en-GB" dirty="0"/>
-          </a:p>
-          <a:p>
-            <a:endParaRPr lang="en-GB" dirty="0"/>
+              <a:t>fullfile</a:t>
+            </a:r>
+            <a:r>
+              <a:rPr lang="en-GB" sz="2400" dirty="0">
+                <a:latin typeface="Consolas" panose="020B0609020204030204" pitchFamily="49" charset="0"/>
+                <a:cs typeface="Courier New" panose="02070309020205020404" pitchFamily="49" charset="0"/>
+              </a:rPr>
+              <a:t>(datafolder,'Subfolder1/Aa.txt')</a:t>
+            </a:r>
           </a:p>
         </p:txBody>
       </p:sp>
     </p:spTree>
     <p:extLst>
       <p:ext uri="{BB962C8B-B14F-4D97-AF65-F5344CB8AC3E}">
-        <p14:creationId xmlns:p14="http://schemas.microsoft.com/office/powerpoint/2010/main" val="3816220206"/>
+        <p14:creationId xmlns:p14="http://schemas.microsoft.com/office/powerpoint/2010/main" val="34042762"/>
       </p:ext>
     </p:extLst>
   </p:cSld>
@@ -10202,206 +8869,6 @@
           <p:cNvPr id="2" name="Title 1">
             <a:extLst>
               <a:ext uri="{FF2B5EF4-FFF2-40B4-BE49-F238E27FC236}">
-                <a16:creationId xmlns:a16="http://schemas.microsoft.com/office/drawing/2014/main" id="{472EBC0F-0863-FC08-A12B-6E5B523BE5B5}"/>
-              </a:ext>
-            </a:extLst>
-          </p:cNvPr>
-          <p:cNvSpPr>
-            <a:spLocks noGrp="1"/>
-          </p:cNvSpPr>
-          <p:nvPr>
-            <p:ph type="title"/>
-          </p:nvPr>
-        </p:nvSpPr>
-        <p:spPr/>
-        <p:txBody>
-          <a:bodyPr/>
-          <a:lstStyle/>
-          <a:p>
-            <a:r>
-              <a:rPr lang="en-GB" dirty="0"/>
-              <a:t>Suggested experiment file organisation</a:t>
-            </a:r>
-          </a:p>
-        </p:txBody>
-      </p:sp>
-      <p:sp>
-        <p:nvSpPr>
-          <p:cNvPr id="3" name="Content Placeholder 2">
-            <a:extLst>
-              <a:ext uri="{FF2B5EF4-FFF2-40B4-BE49-F238E27FC236}">
-                <a16:creationId xmlns:a16="http://schemas.microsoft.com/office/drawing/2014/main" id="{2E9A1E1F-E1FB-D600-D0EE-A17FB6095AFF}"/>
-              </a:ext>
-            </a:extLst>
-          </p:cNvPr>
-          <p:cNvSpPr>
-            <a:spLocks noGrp="1"/>
-          </p:cNvSpPr>
-          <p:nvPr>
-            <p:ph idx="1"/>
-          </p:nvPr>
-        </p:nvSpPr>
-        <p:spPr>
-          <a:xfrm>
-            <a:off x="838199" y="1825625"/>
-            <a:ext cx="5729749" cy="4034400"/>
-          </a:xfrm>
-        </p:spPr>
-        <p:txBody>
-          <a:bodyPr>
-            <a:normAutofit/>
-          </a:bodyPr>
-          <a:lstStyle/>
-          <a:p>
-            <a:r>
-              <a:rPr lang="en-GB" sz="2400" dirty="0"/>
-              <a:t>I prefer to store the experiment files in one data folder</a:t>
-            </a:r>
-          </a:p>
-          <a:p>
-            <a:r>
-              <a:rPr lang="en-GB" sz="2400" dirty="0"/>
-              <a:t>I use one level of subfolders for storing experiment files.</a:t>
-            </a:r>
-          </a:p>
-          <a:p>
-            <a:r>
-              <a:rPr lang="en-GB" sz="2400" dirty="0"/>
-              <a:t>Subfolders can for instance be named by experiment date.</a:t>
-            </a:r>
-          </a:p>
-          <a:p>
-            <a:r>
-              <a:rPr lang="en-GB" sz="2400" dirty="0"/>
-              <a:t>Refer to individual file as </a:t>
-            </a:r>
-            <a:r>
-              <a:rPr lang="en-GB" sz="2400" dirty="0" err="1"/>
-              <a:t>e.g</a:t>
-            </a:r>
-            <a:r>
-              <a:rPr lang="en-GB" sz="2400" dirty="0"/>
-              <a:t> . Subfolder1/Aa.txt</a:t>
-            </a:r>
-          </a:p>
-          <a:p>
-            <a:r>
-              <a:rPr lang="en-GB" sz="2400" dirty="0"/>
-              <a:t>Most of my functions automatically add the data folder when needed:</a:t>
-            </a:r>
-          </a:p>
-        </p:txBody>
-      </p:sp>
-      <p:pic>
-        <p:nvPicPr>
-          <p:cNvPr id="5" name="Picture 4">
-            <a:extLst>
-              <a:ext uri="{FF2B5EF4-FFF2-40B4-BE49-F238E27FC236}">
-                <a16:creationId xmlns:a16="http://schemas.microsoft.com/office/drawing/2014/main" id="{7E983D36-8148-C52C-3212-D1C2FF4A54C9}"/>
-              </a:ext>
-            </a:extLst>
-          </p:cNvPr>
-          <p:cNvPicPr>
-            <a:picLocks noChangeAspect="1"/>
-          </p:cNvPicPr>
-          <p:nvPr/>
-        </p:nvPicPr>
-        <p:blipFill>
-          <a:blip r:embed="rId2"/>
-          <a:stretch>
-            <a:fillRect/>
-          </a:stretch>
-        </p:blipFill>
-        <p:spPr>
-          <a:xfrm>
-            <a:off x="6744929" y="1764029"/>
-            <a:ext cx="4916057" cy="3820693"/>
-          </a:xfrm>
-          <a:prstGeom prst="rect">
-            <a:avLst/>
-          </a:prstGeom>
-        </p:spPr>
-      </p:pic>
-      <p:sp>
-        <p:nvSpPr>
-          <p:cNvPr id="6" name="TextBox 5">
-            <a:extLst>
-              <a:ext uri="{FF2B5EF4-FFF2-40B4-BE49-F238E27FC236}">
-                <a16:creationId xmlns:a16="http://schemas.microsoft.com/office/drawing/2014/main" id="{92A6A31D-37FF-95B9-730E-0F42FB9048FE}"/>
-              </a:ext>
-            </a:extLst>
-          </p:cNvPr>
-          <p:cNvSpPr txBox="1"/>
-          <p:nvPr/>
-        </p:nvSpPr>
-        <p:spPr>
-          <a:xfrm>
-            <a:off x="975851" y="5912771"/>
-            <a:ext cx="7883014" cy="461665"/>
-          </a:xfrm>
-          <a:prstGeom prst="rect">
-            <a:avLst/>
-          </a:prstGeom>
-          <a:noFill/>
-        </p:spPr>
-        <p:txBody>
-          <a:bodyPr wrap="square" rtlCol="0">
-            <a:spAutoFit/>
-          </a:bodyPr>
-          <a:lstStyle/>
-          <a:p>
-            <a:r>
-              <a:rPr lang="en-GB" sz="2400" dirty="0" err="1">
-                <a:latin typeface="Consolas" panose="020B0609020204030204" pitchFamily="49" charset="0"/>
-                <a:cs typeface="Courier New" panose="02070309020205020404" pitchFamily="49" charset="0"/>
-              </a:rPr>
-              <a:t>fullfile</a:t>
-            </a:r>
-            <a:r>
-              <a:rPr lang="en-GB" sz="2400" dirty="0">
-                <a:latin typeface="Consolas" panose="020B0609020204030204" pitchFamily="49" charset="0"/>
-                <a:cs typeface="Courier New" panose="02070309020205020404" pitchFamily="49" charset="0"/>
-              </a:rPr>
-              <a:t>(datafolder,'Subfolder1/Aa.txt')</a:t>
-            </a:r>
-          </a:p>
-        </p:txBody>
-      </p:sp>
-    </p:spTree>
-    <p:extLst>
-      <p:ext uri="{BB962C8B-B14F-4D97-AF65-F5344CB8AC3E}">
-        <p14:creationId xmlns:p14="http://schemas.microsoft.com/office/powerpoint/2010/main" val="34042762"/>
-      </p:ext>
-    </p:extLst>
-  </p:cSld>
-  <p:clrMapOvr>
-    <a:masterClrMapping/>
-  </p:clrMapOvr>
-</p:sld>
-</file>
-
-<file path=ppt/slides/slide24.xml><?xml version="1.0" encoding="utf-8"?>
-<p:sld xmlns:a="http://schemas.openxmlformats.org/drawingml/2006/main" xmlns:r="http://schemas.openxmlformats.org/officeDocument/2006/relationships" xmlns:p="http://schemas.openxmlformats.org/presentationml/2006/main">
-  <p:cSld>
-    <p:spTree>
-      <p:nvGrpSpPr>
-        <p:cNvPr id="1" name=""/>
-        <p:cNvGrpSpPr/>
-        <p:nvPr/>
-      </p:nvGrpSpPr>
-      <p:grpSpPr>
-        <a:xfrm>
-          <a:off x="0" y="0"/>
-          <a:ext cx="0" cy="0"/>
-          <a:chOff x="0" y="0"/>
-          <a:chExt cx="0" cy="0"/>
-        </a:xfrm>
-      </p:grpSpPr>
-      <p:sp>
-        <p:nvSpPr>
-          <p:cNvPr id="2" name="Title 1">
-            <a:extLst>
-              <a:ext uri="{FF2B5EF4-FFF2-40B4-BE49-F238E27FC236}">
                 <a16:creationId xmlns:a16="http://schemas.microsoft.com/office/drawing/2014/main" id="{F2D3ECFB-9F8A-F64C-E0F4-1BA5B941E386}"/>
               </a:ext>
             </a:extLst>
@@ -10567,7 +9034,7 @@
 </p:sld>
 </file>
 
-<file path=ppt/slides/slide25.xml><?xml version="1.0" encoding="utf-8"?>
+<file path=ppt/slides/slide24.xml><?xml version="1.0" encoding="utf-8"?>
 <p:sld xmlns:a="http://schemas.openxmlformats.org/drawingml/2006/main" xmlns:r="http://schemas.openxmlformats.org/officeDocument/2006/relationships" xmlns:p="http://schemas.openxmlformats.org/presentationml/2006/main">
   <p:cSld>
     <p:spTree>
@@ -10870,7 +9337,7 @@
 </p:sld>
 </file>
 
-<file path=ppt/slides/slide26.xml><?xml version="1.0" encoding="utf-8"?>
+<file path=ppt/slides/slide25.xml><?xml version="1.0" encoding="utf-8"?>
 <p:sld xmlns:a="http://schemas.openxmlformats.org/drawingml/2006/main" xmlns:r="http://schemas.openxmlformats.org/officeDocument/2006/relationships" xmlns:p="http://schemas.openxmlformats.org/presentationml/2006/main">
   <p:cSld>
     <p:spTree>
@@ -11149,7 +9616,7 @@
 </p:sld>
 </file>
 
-<file path=ppt/slides/slide27.xml><?xml version="1.0" encoding="utf-8"?>
+<file path=ppt/slides/slide26.xml><?xml version="1.0" encoding="utf-8"?>
 <p:sld xmlns:a="http://schemas.openxmlformats.org/drawingml/2006/main" xmlns:r="http://schemas.openxmlformats.org/officeDocument/2006/relationships" xmlns:p="http://schemas.openxmlformats.org/presentationml/2006/main">
   <p:cSld>
     <p:spTree>
@@ -11427,7 +9894,7 @@
 </p:sld>
 </file>
 
-<file path=ppt/slides/slide28.xml><?xml version="1.0" encoding="utf-8"?>
+<file path=ppt/slides/slide27.xml><?xml version="1.0" encoding="utf-8"?>
 <p:sld xmlns:a="http://schemas.openxmlformats.org/drawingml/2006/main" xmlns:r="http://schemas.openxmlformats.org/officeDocument/2006/relationships" xmlns:p="http://schemas.openxmlformats.org/presentationml/2006/main">
   <p:cSld>
     <p:spTree>
@@ -11573,6 +10040,399 @@
 </p:sld>
 </file>
 
+<file path=ppt/slides/slide28.xml><?xml version="1.0" encoding="utf-8"?>
+<p:sld xmlns:a="http://schemas.openxmlformats.org/drawingml/2006/main" xmlns:r="http://schemas.openxmlformats.org/officeDocument/2006/relationships" xmlns:p="http://schemas.openxmlformats.org/presentationml/2006/main">
+  <p:cSld>
+    <p:spTree>
+      <p:nvGrpSpPr>
+        <p:cNvPr id="1" name=""/>
+        <p:cNvGrpSpPr/>
+        <p:nvPr/>
+      </p:nvGrpSpPr>
+      <p:grpSpPr>
+        <a:xfrm>
+          <a:off x="0" y="0"/>
+          <a:ext cx="0" cy="0"/>
+          <a:chOff x="0" y="0"/>
+          <a:chExt cx="0" cy="0"/>
+        </a:xfrm>
+      </p:grpSpPr>
+      <p:sp>
+        <p:nvSpPr>
+          <p:cNvPr id="2" name="Title 1">
+            <a:extLst>
+              <a:ext uri="{FF2B5EF4-FFF2-40B4-BE49-F238E27FC236}">
+                <a16:creationId xmlns:a16="http://schemas.microsoft.com/office/drawing/2014/main" id="{C285FB98-B897-4574-450D-72DEB85EE57E}"/>
+              </a:ext>
+            </a:extLst>
+          </p:cNvPr>
+          <p:cNvSpPr>
+            <a:spLocks noGrp="1"/>
+          </p:cNvSpPr>
+          <p:nvPr>
+            <p:ph type="title"/>
+          </p:nvPr>
+        </p:nvSpPr>
+        <p:spPr/>
+        <p:txBody>
+          <a:bodyPr/>
+          <a:lstStyle/>
+          <a:p>
+            <a:r>
+              <a:rPr lang="en-GB" dirty="0" err="1"/>
+              <a:t>Exporting</a:t>
+            </a:r>
+            <a:r>
+              <a:rPr lang="en-GB" dirty="0"/>
+              <a:t> </a:t>
+            </a:r>
+            <a:r>
+              <a:rPr lang="en-GB" dirty="0" err="1"/>
+              <a:t>results</a:t>
+            </a:r>
+            <a:r>
+              <a:rPr lang="en-GB" dirty="0"/>
+              <a:t> </a:t>
+            </a:r>
+            <a:r>
+              <a:rPr lang="en-GB" dirty="0" err="1"/>
+              <a:t>tables</a:t>
+            </a:r>
+            <a:r>
+              <a:rPr lang="en-GB" dirty="0"/>
+              <a:t> Trip and </a:t>
+            </a:r>
+            <a:r>
+              <a:rPr lang="en-GB" dirty="0" err="1"/>
+              <a:t>Tzip</a:t>
+            </a:r>
+            <a:endParaRPr lang="en-GB" dirty="0"/>
+          </a:p>
+        </p:txBody>
+      </p:sp>
+      <p:sp>
+        <p:nvSpPr>
+          <p:cNvPr id="3" name="Content Placeholder 2">
+            <a:extLst>
+              <a:ext uri="{FF2B5EF4-FFF2-40B4-BE49-F238E27FC236}">
+                <a16:creationId xmlns:a16="http://schemas.microsoft.com/office/drawing/2014/main" id="{F0A4A313-7E15-500B-ED77-95FD44C0C03E}"/>
+              </a:ext>
+            </a:extLst>
+          </p:cNvPr>
+          <p:cNvSpPr>
+            <a:spLocks noGrp="1"/>
+          </p:cNvSpPr>
+          <p:nvPr>
+            <p:ph idx="1"/>
+          </p:nvPr>
+        </p:nvSpPr>
+        <p:spPr>
+          <a:xfrm>
+            <a:off x="838200" y="1825625"/>
+            <a:ext cx="10813026" cy="4351338"/>
+          </a:xfrm>
+        </p:spPr>
+        <p:txBody>
+          <a:bodyPr>
+            <a:normAutofit/>
+          </a:bodyPr>
+          <a:lstStyle/>
+          <a:p>
+            <a:r>
+              <a:rPr lang="en-GB" dirty="0" err="1"/>
+              <a:t>Tables</a:t>
+            </a:r>
+            <a:r>
+              <a:rPr lang="en-GB" dirty="0"/>
+              <a:t> </a:t>
+            </a:r>
+            <a:r>
+              <a:rPr lang="en-GB" dirty="0" err="1"/>
+              <a:t>may</a:t>
+            </a:r>
+            <a:r>
+              <a:rPr lang="en-GB" dirty="0"/>
+              <a:t> be </a:t>
+            </a:r>
+            <a:r>
+              <a:rPr lang="en-GB" dirty="0" err="1"/>
+              <a:t>exported</a:t>
+            </a:r>
+            <a:r>
+              <a:rPr lang="en-GB" dirty="0"/>
+              <a:t> to Excel:</a:t>
+            </a:r>
+          </a:p>
+          <a:p>
+            <a:pPr lvl="1"/>
+            <a:r>
+              <a:rPr lang="en-GB" dirty="0" err="1"/>
+              <a:t>Create</a:t>
+            </a:r>
+            <a:r>
+              <a:rPr lang="en-GB" dirty="0"/>
+              <a:t> a </a:t>
+            </a:r>
+            <a:r>
+              <a:rPr lang="en-GB" dirty="0" err="1"/>
+              <a:t>results</a:t>
+            </a:r>
+            <a:r>
+              <a:rPr lang="en-GB" dirty="0"/>
+              <a:t> folder:</a:t>
+            </a:r>
+          </a:p>
+          <a:p>
+            <a:pPr marL="914400" lvl="2" indent="0">
+              <a:buNone/>
+            </a:pPr>
+            <a:r>
+              <a:rPr lang="en-GB" dirty="0" err="1">
+                <a:latin typeface="Consolas" panose="020B0609020204030204" pitchFamily="49" charset="0"/>
+              </a:rPr>
+              <a:t>resultsfolder</a:t>
+            </a:r>
+            <a:r>
+              <a:rPr lang="en-GB" dirty="0">
+                <a:latin typeface="Consolas" panose="020B0609020204030204" pitchFamily="49" charset="0"/>
+              </a:rPr>
+              <a:t> = 'C:\Users\are\</a:t>
+            </a:r>
+            <a:r>
+              <a:rPr lang="en-GB" dirty="0" err="1">
+                <a:latin typeface="Consolas" panose="020B0609020204030204" pitchFamily="49" charset="0"/>
+              </a:rPr>
+              <a:t>myresults</a:t>
+            </a:r>
+            <a:r>
+              <a:rPr lang="en-GB" dirty="0">
+                <a:latin typeface="Consolas" panose="020B0609020204030204" pitchFamily="49" charset="0"/>
+              </a:rPr>
+              <a:t>\';</a:t>
+            </a:r>
+          </a:p>
+          <a:p>
+            <a:pPr marL="914400" lvl="2" indent="0">
+              <a:buNone/>
+            </a:pPr>
+            <a:r>
+              <a:rPr lang="en-GB" dirty="0" err="1">
+                <a:latin typeface="Consolas" panose="020B0609020204030204" pitchFamily="49" charset="0"/>
+              </a:rPr>
+              <a:t>mkdir</a:t>
+            </a:r>
+            <a:r>
+              <a:rPr lang="en-GB" dirty="0">
+                <a:latin typeface="Consolas" panose="020B0609020204030204" pitchFamily="49" charset="0"/>
+              </a:rPr>
+              <a:t>(</a:t>
+            </a:r>
+            <a:r>
+              <a:rPr lang="en-GB" dirty="0" err="1">
+                <a:latin typeface="Consolas" panose="020B0609020204030204" pitchFamily="49" charset="0"/>
+              </a:rPr>
+              <a:t>resultsfolder</a:t>
+            </a:r>
+            <a:r>
+              <a:rPr lang="en-GB" dirty="0">
+                <a:latin typeface="Consolas" panose="020B0609020204030204" pitchFamily="49" charset="0"/>
+              </a:rPr>
+              <a:t>)</a:t>
+            </a:r>
+          </a:p>
+          <a:p>
+            <a:pPr lvl="1"/>
+            <a:r>
+              <a:rPr lang="en-GB" dirty="0" err="1"/>
+              <a:t>Create</a:t>
+            </a:r>
+            <a:r>
+              <a:rPr lang="en-GB" dirty="0"/>
+              <a:t> subfolder</a:t>
+            </a:r>
+          </a:p>
+          <a:p>
+            <a:pPr marL="457200" lvl="1" indent="0">
+              <a:buNone/>
+            </a:pPr>
+            <a:r>
+              <a:rPr lang="en-GB" dirty="0"/>
+              <a:t>	</a:t>
+            </a:r>
+            <a:r>
+              <a:rPr lang="en-GB" sz="2000" dirty="0" err="1">
+                <a:latin typeface="Consolas" panose="020B0609020204030204" pitchFamily="49" charset="0"/>
+              </a:rPr>
+              <a:t>mkdir</a:t>
+            </a:r>
+            <a:r>
+              <a:rPr lang="en-GB" sz="2000" dirty="0">
+                <a:latin typeface="Consolas" panose="020B0609020204030204" pitchFamily="49" charset="0"/>
+              </a:rPr>
+              <a:t>(resultsfolder,"20231212")</a:t>
+            </a:r>
+            <a:r>
+              <a:rPr lang="en-GB" dirty="0"/>
+              <a:t>	</a:t>
+            </a:r>
+          </a:p>
+          <a:p>
+            <a:pPr lvl="1"/>
+            <a:r>
+              <a:rPr lang="en-GB" dirty="0"/>
+              <a:t>Save tables</a:t>
+            </a:r>
+            <a:br>
+              <a:rPr lang="en-GB" dirty="0"/>
+            </a:br>
+            <a:r>
+              <a:rPr lang="en-GB" dirty="0"/>
+              <a:t>	</a:t>
+            </a:r>
+            <a:r>
+              <a:rPr lang="en-GB" sz="2000" dirty="0">
+                <a:latin typeface="Consolas" panose="020B0609020204030204" pitchFamily="49" charset="0"/>
+              </a:rPr>
+              <a:t>save 20231212/</a:t>
+            </a:r>
+            <a:r>
+              <a:rPr lang="en-GB" sz="2000" dirty="0" err="1">
+                <a:latin typeface="Consolas" panose="020B0609020204030204" pitchFamily="49" charset="0"/>
+              </a:rPr>
+              <a:t>BA.mat</a:t>
+            </a:r>
+            <a:r>
+              <a:rPr lang="en-GB" sz="2000" dirty="0">
+                <a:latin typeface="Consolas" panose="020B0609020204030204" pitchFamily="49" charset="0"/>
+              </a:rPr>
+              <a:t> Trip </a:t>
+            </a:r>
+            <a:r>
+              <a:rPr lang="en-GB" sz="2000" dirty="0" err="1">
+                <a:latin typeface="Consolas" panose="020B0609020204030204" pitchFamily="49" charset="0"/>
+              </a:rPr>
+              <a:t>Tzip</a:t>
+            </a:r>
+            <a:endParaRPr lang="en-GB" sz="2000" dirty="0">
+              <a:latin typeface="Consolas" panose="020B0609020204030204" pitchFamily="49" charset="0"/>
+            </a:endParaRPr>
+          </a:p>
+          <a:p>
+            <a:pPr lvl="1"/>
+            <a:r>
+              <a:rPr lang="en-GB" dirty="0" err="1"/>
+              <a:t>Create</a:t>
+            </a:r>
+            <a:r>
+              <a:rPr lang="en-GB" dirty="0"/>
+              <a:t> Excel file</a:t>
+            </a:r>
+          </a:p>
+          <a:p>
+            <a:pPr marL="0" indent="0">
+              <a:buNone/>
+            </a:pPr>
+            <a:r>
+              <a:rPr lang="en-GB" sz="2000" dirty="0" err="1">
+                <a:latin typeface="Consolas" panose="020B0609020204030204" pitchFamily="49" charset="0"/>
+              </a:rPr>
+              <a:t>writetable</a:t>
+            </a:r>
+            <a:r>
+              <a:rPr lang="en-GB" sz="2000" dirty="0">
+                <a:latin typeface="Consolas" panose="020B0609020204030204" pitchFamily="49" charset="0"/>
+              </a:rPr>
+              <a:t>(</a:t>
+            </a:r>
+            <a:r>
+              <a:rPr lang="en-GB" sz="2000" dirty="0" err="1">
+                <a:latin typeface="Consolas" panose="020B0609020204030204" pitchFamily="49" charset="0"/>
+              </a:rPr>
+              <a:t>Trip,fullfile</a:t>
+            </a:r>
+            <a:r>
+              <a:rPr lang="en-GB" sz="2000" dirty="0">
+                <a:latin typeface="Consolas" panose="020B0609020204030204" pitchFamily="49" charset="0"/>
+              </a:rPr>
+              <a:t>(resultsfolder,"20231212/BA.xlsx"),"</a:t>
+            </a:r>
+            <a:r>
+              <a:rPr lang="en-GB" sz="2000" dirty="0" err="1">
+                <a:latin typeface="Consolas" panose="020B0609020204030204" pitchFamily="49" charset="0"/>
+              </a:rPr>
+              <a:t>Sheet","Rips</a:t>
+            </a:r>
+            <a:r>
+              <a:rPr lang="en-GB" sz="2000" dirty="0">
+                <a:latin typeface="Consolas" panose="020B0609020204030204" pitchFamily="49" charset="0"/>
+              </a:rPr>
+              <a:t>");</a:t>
+            </a:r>
+          </a:p>
+          <a:p>
+            <a:pPr marL="0" indent="0">
+              <a:buNone/>
+            </a:pPr>
+            <a:r>
+              <a:rPr lang="en-GB" sz="2000" dirty="0" err="1">
+                <a:latin typeface="Consolas" panose="020B0609020204030204" pitchFamily="49" charset="0"/>
+              </a:rPr>
+              <a:t>writetable</a:t>
+            </a:r>
+            <a:r>
+              <a:rPr lang="en-GB" sz="2000" dirty="0">
+                <a:latin typeface="Consolas" panose="020B0609020204030204" pitchFamily="49" charset="0"/>
+              </a:rPr>
+              <a:t>(</a:t>
+            </a:r>
+            <a:r>
+              <a:rPr lang="en-GB" sz="2000" dirty="0" err="1">
+                <a:latin typeface="Consolas" panose="020B0609020204030204" pitchFamily="49" charset="0"/>
+              </a:rPr>
+              <a:t>Tzip,fullfile</a:t>
+            </a:r>
+            <a:r>
+              <a:rPr lang="en-GB" sz="2000" dirty="0">
+                <a:latin typeface="Consolas" panose="020B0609020204030204" pitchFamily="49" charset="0"/>
+              </a:rPr>
+              <a:t>(resultsfolder,"20231212/BA.xlsx"),"</a:t>
+            </a:r>
+            <a:r>
+              <a:rPr lang="en-GB" sz="2000" dirty="0" err="1">
+                <a:latin typeface="Consolas" panose="020B0609020204030204" pitchFamily="49" charset="0"/>
+              </a:rPr>
+              <a:t>Sheet",“Zips</a:t>
+            </a:r>
+            <a:r>
+              <a:rPr lang="en-GB" sz="2000" dirty="0">
+                <a:latin typeface="Consolas" panose="020B0609020204030204" pitchFamily="49" charset="0"/>
+              </a:rPr>
+              <a:t>");</a:t>
+            </a:r>
+          </a:p>
+          <a:p>
+            <a:pPr marL="457200" lvl="1" indent="0">
+              <a:buNone/>
+            </a:pPr>
+            <a:endParaRPr lang="en-GB" sz="2000" dirty="0">
+              <a:latin typeface="Consolas" panose="020B0609020204030204" pitchFamily="49" charset="0"/>
+            </a:endParaRPr>
+          </a:p>
+        </p:txBody>
+      </p:sp>
+    </p:spTree>
+    <p:extLst>
+      <p:ext uri="{BB962C8B-B14F-4D97-AF65-F5344CB8AC3E}">
+        <p14:creationId xmlns:p14="http://schemas.microsoft.com/office/powerpoint/2010/main" val="4127174572"/>
+      </p:ext>
+    </p:extLst>
+  </p:cSld>
+  <p:clrMapOvr>
+    <a:masterClrMapping/>
+  </p:clrMapOvr>
+</p:sld>
+</file>
+
 <file path=ppt/slides/slide29.xml><?xml version="1.0" encoding="utf-8"?>
 <p:sld xmlns:a="http://schemas.openxmlformats.org/drawingml/2006/main" xmlns:r="http://schemas.openxmlformats.org/officeDocument/2006/relationships" xmlns:p="http://schemas.openxmlformats.org/presentationml/2006/main">
   <p:cSld>
@@ -11595,7 +10455,7 @@
           <p:cNvPr id="2" name="Title 1">
             <a:extLst>
               <a:ext uri="{FF2B5EF4-FFF2-40B4-BE49-F238E27FC236}">
-                <a16:creationId xmlns:a16="http://schemas.microsoft.com/office/drawing/2014/main" id="{C285FB98-B897-4574-450D-72DEB85EE57E}"/>
+                <a16:creationId xmlns:a16="http://schemas.microsoft.com/office/drawing/2014/main" id="{624CB892-5379-B693-0976-3ADA88506E05}"/>
               </a:ext>
             </a:extLst>
           </p:cNvPr>
@@ -11612,34 +10472,17 @@
           <a:lstStyle/>
           <a:p>
             <a:r>
+              <a:rPr lang="en-GB" dirty="0"/>
+              <a:t>The </a:t>
+            </a:r>
+            <a:r>
               <a:rPr lang="en-GB" dirty="0" err="1"/>
-              <a:t>Exporting</a:t>
-            </a:r>
-            <a:r>
-              <a:rPr lang="en-GB" dirty="0"/>
-              <a:t> </a:t>
-            </a:r>
-            <a:r>
-              <a:rPr lang="en-GB" dirty="0" err="1"/>
-              <a:t>results</a:t>
-            </a:r>
-            <a:r>
-              <a:rPr lang="en-GB" dirty="0"/>
-              <a:t> </a:t>
-            </a:r>
-            <a:r>
-              <a:rPr lang="en-GB" dirty="0" err="1"/>
-              <a:t>tables</a:t>
-            </a:r>
-            <a:r>
-              <a:rPr lang="en-GB" dirty="0"/>
-              <a:t> Trip and </a:t>
-            </a:r>
-            <a:r>
-              <a:rPr lang="en-GB" dirty="0" err="1"/>
-              <a:t>Tzip</a:t>
-            </a:r>
-            <a:endParaRPr lang="en-GB" dirty="0"/>
+              <a:t>RipAnalysis</a:t>
+            </a:r>
+            <a:r>
+              <a:rPr lang="en-GB" dirty="0"/>
+              <a:t> Matlab App</a:t>
+            </a:r>
           </a:p>
         </p:txBody>
       </p:sp>
@@ -11648,7 +10491,7 @@
           <p:cNvPr id="3" name="Content Placeholder 2">
             <a:extLst>
               <a:ext uri="{FF2B5EF4-FFF2-40B4-BE49-F238E27FC236}">
-                <a16:creationId xmlns:a16="http://schemas.microsoft.com/office/drawing/2014/main" id="{F0A4A313-7E15-500B-ED77-95FD44C0C03E}"/>
+                <a16:creationId xmlns:a16="http://schemas.microsoft.com/office/drawing/2014/main" id="{26D403B4-3D4C-2078-2A01-4ACE7A34BB43}"/>
               </a:ext>
             </a:extLst>
           </p:cNvPr>
@@ -11659,12 +10502,7 @@
             <p:ph idx="1"/>
           </p:nvPr>
         </p:nvSpPr>
-        <p:spPr>
-          <a:xfrm>
-            <a:off x="838200" y="1825625"/>
-            <a:ext cx="10813026" cy="4351338"/>
-          </a:xfrm>
-        </p:spPr>
+        <p:spPr/>
         <p:txBody>
           <a:bodyPr>
             <a:normAutofit/>
@@ -11672,291 +10510,61 @@
           <a:lstStyle/>
           <a:p>
             <a:r>
-              <a:rPr lang="en-GB" dirty="0" err="1"/>
-              <a:t>Tables</a:t>
-            </a:r>
-            <a:r>
-              <a:rPr lang="en-GB" dirty="0"/>
-              <a:t> </a:t>
-            </a:r>
-            <a:r>
-              <a:rPr lang="en-GB" dirty="0" err="1"/>
-              <a:t>may</a:t>
-            </a:r>
-            <a:r>
-              <a:rPr lang="en-GB" dirty="0"/>
-              <a:t> be </a:t>
-            </a:r>
-            <a:r>
-              <a:rPr lang="en-GB" dirty="0" err="1"/>
-              <a:t>exported</a:t>
-            </a:r>
-            <a:r>
-              <a:rPr lang="en-GB" dirty="0"/>
-              <a:t> to Excel:</a:t>
-            </a:r>
-          </a:p>
-          <a:p>
-            <a:pPr lvl="1"/>
-            <a:r>
-              <a:rPr lang="en-GB" dirty="0" err="1"/>
-              <a:t>Create</a:t>
-            </a:r>
-            <a:r>
-              <a:rPr lang="en-GB" dirty="0"/>
-              <a:t> a </a:t>
-            </a:r>
-            <a:r>
-              <a:rPr lang="en-GB" dirty="0" err="1"/>
-              <a:t>results</a:t>
-            </a:r>
-            <a:r>
-              <a:rPr lang="en-GB" dirty="0"/>
-              <a:t> folder:</a:t>
-            </a:r>
-          </a:p>
-          <a:p>
-            <a:pPr marL="914400" lvl="2" indent="0">
-              <a:buNone/>
-            </a:pPr>
-            <a:r>
-              <a:rPr lang="en-GB" dirty="0" err="1">
-                <a:latin typeface="Consolas" panose="020B0609020204030204" pitchFamily="49" charset="0"/>
-              </a:rPr>
-              <a:t>resultsfolder</a:t>
-            </a:r>
-            <a:r>
-              <a:rPr lang="en-GB" dirty="0">
-                <a:latin typeface="Consolas" panose="020B0609020204030204" pitchFamily="49" charset="0"/>
-              </a:rPr>
-              <a:t> = 'C:\Users\are\</a:t>
-            </a:r>
-            <a:r>
-              <a:rPr lang="en-GB" dirty="0" err="1">
-                <a:latin typeface="Consolas" panose="020B0609020204030204" pitchFamily="49" charset="0"/>
-              </a:rPr>
-              <a:t>myresults</a:t>
-            </a:r>
-            <a:r>
-              <a:rPr lang="en-GB" dirty="0">
-                <a:latin typeface="Consolas" panose="020B0609020204030204" pitchFamily="49" charset="0"/>
-              </a:rPr>
-              <a:t>\';</a:t>
-            </a:r>
-          </a:p>
-          <a:p>
-            <a:pPr marL="914400" lvl="2" indent="0">
-              <a:buNone/>
-            </a:pPr>
-            <a:r>
-              <a:rPr lang="en-GB" dirty="0" err="1">
-                <a:latin typeface="Consolas" panose="020B0609020204030204" pitchFamily="49" charset="0"/>
-              </a:rPr>
-              <a:t>mkdir</a:t>
-            </a:r>
-            <a:r>
-              <a:rPr lang="en-GB" dirty="0">
-                <a:latin typeface="Consolas" panose="020B0609020204030204" pitchFamily="49" charset="0"/>
-              </a:rPr>
-              <a:t>(</a:t>
-            </a:r>
-            <a:r>
-              <a:rPr lang="en-GB" dirty="0" err="1">
-                <a:latin typeface="Consolas" panose="020B0609020204030204" pitchFamily="49" charset="0"/>
-              </a:rPr>
-              <a:t>resultsfolder</a:t>
-            </a:r>
-            <a:r>
-              <a:rPr lang="en-GB" dirty="0">
-                <a:latin typeface="Consolas" panose="020B0609020204030204" pitchFamily="49" charset="0"/>
-              </a:rPr>
-              <a:t>)</a:t>
-            </a:r>
-          </a:p>
-          <a:p>
-            <a:pPr lvl="1"/>
-            <a:r>
-              <a:rPr lang="en-GB" dirty="0" err="1"/>
-              <a:t>Create</a:t>
-            </a:r>
-            <a:r>
-              <a:rPr lang="en-GB" dirty="0"/>
-              <a:t> subfolder</a:t>
-            </a:r>
-          </a:p>
-          <a:p>
-            <a:pPr marL="457200" lvl="1" indent="0">
-              <a:buNone/>
-            </a:pPr>
-            <a:r>
-              <a:rPr lang="en-GB" dirty="0"/>
-              <a:t>	</a:t>
-            </a:r>
-            <a:r>
-              <a:rPr lang="en-GB" sz="2000" dirty="0" err="1">
-                <a:latin typeface="Consolas" panose="020B0609020204030204" pitchFamily="49" charset="0"/>
-              </a:rPr>
-              <a:t>mkdir</a:t>
-            </a:r>
-            <a:r>
-              <a:rPr lang="en-GB" sz="2000" dirty="0">
-                <a:latin typeface="Consolas" panose="020B0609020204030204" pitchFamily="49" charset="0"/>
-              </a:rPr>
-              <a:t>(resultsfolder,"20231212")</a:t>
-            </a:r>
-            <a:r>
-              <a:rPr lang="en-GB" dirty="0"/>
-              <a:t>	</a:t>
-            </a:r>
-          </a:p>
-          <a:p>
-            <a:pPr lvl="1"/>
-            <a:r>
-              <a:rPr lang="en-GB" dirty="0"/>
-              <a:t>Save tables</a:t>
-            </a:r>
-            <a:br>
-              <a:rPr lang="en-GB" dirty="0"/>
-            </a:br>
-            <a:r>
-              <a:rPr lang="en-GB" dirty="0"/>
-              <a:t>	</a:t>
-            </a:r>
-            <a:r>
-              <a:rPr lang="en-GB" sz="2000" dirty="0">
-                <a:latin typeface="Consolas" panose="020B0609020204030204" pitchFamily="49" charset="0"/>
-              </a:rPr>
-              <a:t>save 20231212/</a:t>
-            </a:r>
-            <a:r>
-              <a:rPr lang="en-GB" sz="2000" dirty="0" err="1">
-                <a:latin typeface="Consolas" panose="020B0609020204030204" pitchFamily="49" charset="0"/>
-              </a:rPr>
-              <a:t>BA.mat</a:t>
-            </a:r>
-            <a:r>
-              <a:rPr lang="en-GB" sz="2000" dirty="0">
-                <a:latin typeface="Consolas" panose="020B0609020204030204" pitchFamily="49" charset="0"/>
-              </a:rPr>
-              <a:t> Trip </a:t>
-            </a:r>
-            <a:r>
-              <a:rPr lang="en-GB" sz="2000" dirty="0" err="1">
-                <a:latin typeface="Consolas" panose="020B0609020204030204" pitchFamily="49" charset="0"/>
-              </a:rPr>
-              <a:t>Tzip</a:t>
-            </a:r>
-            <a:endParaRPr lang="en-GB" sz="2000" dirty="0">
-              <a:latin typeface="Consolas" panose="020B0609020204030204" pitchFamily="49" charset="0"/>
-            </a:endParaRPr>
-          </a:p>
-          <a:p>
-            <a:pPr lvl="1"/>
-            <a:r>
-              <a:rPr lang="en-GB" dirty="0" err="1"/>
-              <a:t>Create</a:t>
-            </a:r>
-            <a:r>
-              <a:rPr lang="en-GB" dirty="0"/>
-              <a:t> Excel file</a:t>
-            </a:r>
-          </a:p>
-          <a:p>
-            <a:pPr marL="0" indent="0">
-              <a:buNone/>
-            </a:pPr>
-            <a:r>
-              <a:rPr lang="en-GB" sz="2000" dirty="0" err="1">
-                <a:latin typeface="Consolas" panose="020B0609020204030204" pitchFamily="49" charset="0"/>
-              </a:rPr>
-              <a:t>writetable</a:t>
-            </a:r>
-            <a:r>
-              <a:rPr lang="en-GB" sz="2000" dirty="0">
-                <a:latin typeface="Consolas" panose="020B0609020204030204" pitchFamily="49" charset="0"/>
-              </a:rPr>
-              <a:t>(</a:t>
-            </a:r>
-            <a:r>
-              <a:rPr lang="en-GB" sz="2000" dirty="0" err="1">
-                <a:latin typeface="Consolas" panose="020B0609020204030204" pitchFamily="49" charset="0"/>
-              </a:rPr>
-              <a:t>Trip,fullfile</a:t>
-            </a:r>
-            <a:r>
-              <a:rPr lang="en-GB" sz="2000" dirty="0">
-                <a:latin typeface="Consolas" panose="020B0609020204030204" pitchFamily="49" charset="0"/>
-              </a:rPr>
-              <a:t>(resultsfolder,"20231212/BA.xlsx"),"</a:t>
-            </a:r>
-            <a:r>
-              <a:rPr lang="en-GB" sz="2000" dirty="0" err="1">
-                <a:latin typeface="Consolas" panose="020B0609020204030204" pitchFamily="49" charset="0"/>
-              </a:rPr>
-              <a:t>Sheet","Rips</a:t>
-            </a:r>
-            <a:r>
-              <a:rPr lang="en-GB" sz="2000" dirty="0">
-                <a:latin typeface="Consolas" panose="020B0609020204030204" pitchFamily="49" charset="0"/>
-              </a:rPr>
-              <a:t>");</a:t>
-            </a:r>
-          </a:p>
-          <a:p>
-            <a:pPr marL="0" indent="0">
-              <a:buNone/>
-            </a:pPr>
-            <a:r>
-              <a:rPr lang="en-GB" sz="2000" dirty="0" err="1">
-                <a:latin typeface="Consolas" panose="020B0609020204030204" pitchFamily="49" charset="0"/>
-              </a:rPr>
-              <a:t>writetable</a:t>
-            </a:r>
-            <a:r>
-              <a:rPr lang="en-GB" sz="2000" dirty="0">
-                <a:latin typeface="Consolas" panose="020B0609020204030204" pitchFamily="49" charset="0"/>
-              </a:rPr>
-              <a:t>(</a:t>
-            </a:r>
-            <a:r>
-              <a:rPr lang="en-GB" sz="2000" dirty="0" err="1">
-                <a:latin typeface="Consolas" panose="020B0609020204030204" pitchFamily="49" charset="0"/>
-              </a:rPr>
-              <a:t>Tzip,fullfile</a:t>
-            </a:r>
-            <a:r>
-              <a:rPr lang="en-GB" sz="2000" dirty="0">
-                <a:latin typeface="Consolas" panose="020B0609020204030204" pitchFamily="49" charset="0"/>
-              </a:rPr>
-              <a:t>(resultsfolder,"20231212/BA.xlsx"),"</a:t>
-            </a:r>
-            <a:r>
-              <a:rPr lang="en-GB" sz="2000" dirty="0" err="1">
-                <a:latin typeface="Consolas" panose="020B0609020204030204" pitchFamily="49" charset="0"/>
-              </a:rPr>
-              <a:t>Sheet",“Zips</a:t>
-            </a:r>
-            <a:r>
-              <a:rPr lang="en-GB" sz="2000" dirty="0">
-                <a:latin typeface="Consolas" panose="020B0609020204030204" pitchFamily="49" charset="0"/>
-              </a:rPr>
-              <a:t>");</a:t>
-            </a:r>
-          </a:p>
-          <a:p>
-            <a:pPr marL="457200" lvl="1" indent="0">
-              <a:buNone/>
-            </a:pPr>
-            <a:endParaRPr lang="en-GB" sz="2000" dirty="0">
-              <a:latin typeface="Consolas" panose="020B0609020204030204" pitchFamily="49" charset="0"/>
-            </a:endParaRPr>
+              <a:rPr lang="en-GB" dirty="0"/>
+              <a:t>Interactive inspection and modification of results</a:t>
+            </a:r>
+          </a:p>
+          <a:p>
+            <a:r>
+              <a:rPr lang="en-GB" dirty="0"/>
+              <a:t>Removal of incorrect rips or zips</a:t>
+            </a:r>
+          </a:p>
+          <a:p>
+            <a:r>
+              <a:rPr lang="en-GB" dirty="0"/>
+              <a:t>Adding missed rips/zips</a:t>
+            </a:r>
+          </a:p>
+          <a:p>
+            <a:r>
+              <a:rPr lang="en-GB" dirty="0"/>
+              <a:t>Plots of f(x) for trace pairs</a:t>
+            </a:r>
+          </a:p>
+          <a:p>
+            <a:r>
+              <a:rPr lang="en-GB" dirty="0"/>
+              <a:t>Removal of irrelevant data at experiment start  or end</a:t>
+            </a:r>
+          </a:p>
+          <a:p>
+            <a:r>
+              <a:rPr lang="en-GB" dirty="0"/>
+              <a:t>Storing corrected results tables</a:t>
+            </a:r>
+          </a:p>
+          <a:p>
+            <a:r>
+              <a:rPr lang="en-GB" dirty="0"/>
+              <a:t>Experiment files are not changed</a:t>
+            </a:r>
+          </a:p>
+          <a:p>
+            <a:r>
+              <a:rPr lang="en-GB" dirty="0"/>
+              <a:t>Recreate plots from stored results tables and original file</a:t>
+            </a:r>
+          </a:p>
+          <a:p>
+            <a:endParaRPr lang="en-GB" dirty="0"/>
           </a:p>
         </p:txBody>
       </p:sp>
     </p:spTree>
     <p:extLst>
       <p:ext uri="{BB962C8B-B14F-4D97-AF65-F5344CB8AC3E}">
-        <p14:creationId xmlns:p14="http://schemas.microsoft.com/office/powerpoint/2010/main" val="4127174572"/>
+        <p14:creationId xmlns:p14="http://schemas.microsoft.com/office/powerpoint/2010/main" val="951015916"/>
       </p:ext>
     </p:extLst>
   </p:cSld>
@@ -12136,147 +10744,6 @@
           <a:chExt cx="0" cy="0"/>
         </a:xfrm>
       </p:grpSpPr>
-      <p:sp>
-        <p:nvSpPr>
-          <p:cNvPr id="2" name="Title 1">
-            <a:extLst>
-              <a:ext uri="{FF2B5EF4-FFF2-40B4-BE49-F238E27FC236}">
-                <a16:creationId xmlns:a16="http://schemas.microsoft.com/office/drawing/2014/main" id="{624CB892-5379-B693-0976-3ADA88506E05}"/>
-              </a:ext>
-            </a:extLst>
-          </p:cNvPr>
-          <p:cNvSpPr>
-            <a:spLocks noGrp="1"/>
-          </p:cNvSpPr>
-          <p:nvPr>
-            <p:ph type="title"/>
-          </p:nvPr>
-        </p:nvSpPr>
-        <p:spPr/>
-        <p:txBody>
-          <a:bodyPr/>
-          <a:lstStyle/>
-          <a:p>
-            <a:r>
-              <a:rPr lang="en-GB" dirty="0"/>
-              <a:t>The </a:t>
-            </a:r>
-            <a:r>
-              <a:rPr lang="en-GB" dirty="0" err="1"/>
-              <a:t>RipAnalysis</a:t>
-            </a:r>
-            <a:r>
-              <a:rPr lang="en-GB" dirty="0"/>
-              <a:t> Matlab App</a:t>
-            </a:r>
-          </a:p>
-        </p:txBody>
-      </p:sp>
-      <p:sp>
-        <p:nvSpPr>
-          <p:cNvPr id="3" name="Content Placeholder 2">
-            <a:extLst>
-              <a:ext uri="{FF2B5EF4-FFF2-40B4-BE49-F238E27FC236}">
-                <a16:creationId xmlns:a16="http://schemas.microsoft.com/office/drawing/2014/main" id="{26D403B4-3D4C-2078-2A01-4ACE7A34BB43}"/>
-              </a:ext>
-            </a:extLst>
-          </p:cNvPr>
-          <p:cNvSpPr>
-            <a:spLocks noGrp="1"/>
-          </p:cNvSpPr>
-          <p:nvPr>
-            <p:ph idx="1"/>
-          </p:nvPr>
-        </p:nvSpPr>
-        <p:spPr/>
-        <p:txBody>
-          <a:bodyPr>
-            <a:normAutofit/>
-          </a:bodyPr>
-          <a:lstStyle/>
-          <a:p>
-            <a:r>
-              <a:rPr lang="en-GB" dirty="0"/>
-              <a:t>Interactive inspection and modification of results</a:t>
-            </a:r>
-          </a:p>
-          <a:p>
-            <a:r>
-              <a:rPr lang="en-GB" dirty="0"/>
-              <a:t>Removal of incorrect rips or zips</a:t>
-            </a:r>
-          </a:p>
-          <a:p>
-            <a:r>
-              <a:rPr lang="en-GB" dirty="0"/>
-              <a:t>Adding missed rips/zips</a:t>
-            </a:r>
-          </a:p>
-          <a:p>
-            <a:r>
-              <a:rPr lang="en-GB" dirty="0"/>
-              <a:t>Plots of f(x) for trace pairs</a:t>
-            </a:r>
-          </a:p>
-          <a:p>
-            <a:r>
-              <a:rPr lang="en-GB" dirty="0"/>
-              <a:t>Removal of irrelevant data at experiment start  or end</a:t>
-            </a:r>
-          </a:p>
-          <a:p>
-            <a:r>
-              <a:rPr lang="en-GB" dirty="0"/>
-              <a:t>Storing corrected results tables</a:t>
-            </a:r>
-          </a:p>
-          <a:p>
-            <a:r>
-              <a:rPr lang="en-GB" dirty="0"/>
-              <a:t>Experiment files are not changed</a:t>
-            </a:r>
-          </a:p>
-          <a:p>
-            <a:r>
-              <a:rPr lang="en-GB" dirty="0"/>
-              <a:t>Recreate plots from stored results tables and original file</a:t>
-            </a:r>
-          </a:p>
-          <a:p>
-            <a:endParaRPr lang="en-GB" dirty="0"/>
-          </a:p>
-        </p:txBody>
-      </p:sp>
-    </p:spTree>
-    <p:extLst>
-      <p:ext uri="{BB962C8B-B14F-4D97-AF65-F5344CB8AC3E}">
-        <p14:creationId xmlns:p14="http://schemas.microsoft.com/office/powerpoint/2010/main" val="951015916"/>
-      </p:ext>
-    </p:extLst>
-  </p:cSld>
-  <p:clrMapOvr>
-    <a:masterClrMapping/>
-  </p:clrMapOvr>
-</p:sld>
-</file>
-
-<file path=ppt/slides/slide31.xml><?xml version="1.0" encoding="utf-8"?>
-<p:sld xmlns:a="http://schemas.openxmlformats.org/drawingml/2006/main" xmlns:r="http://schemas.openxmlformats.org/officeDocument/2006/relationships" xmlns:p="http://schemas.openxmlformats.org/presentationml/2006/main">
-  <p:cSld>
-    <p:spTree>
-      <p:nvGrpSpPr>
-        <p:cNvPr id="1" name=""/>
-        <p:cNvGrpSpPr/>
-        <p:nvPr/>
-      </p:nvGrpSpPr>
-      <p:grpSpPr>
-        <a:xfrm>
-          <a:off x="0" y="0"/>
-          <a:ext cx="0" cy="0"/>
-          <a:chOff x="0" y="0"/>
-          <a:chExt cx="0" cy="0"/>
-        </a:xfrm>
-      </p:grpSpPr>
       <p:pic>
         <p:nvPicPr>
           <p:cNvPr id="3" name="Picture 2">
@@ -12319,7 +10786,7 @@
 </p:sld>
 </file>
 
-<file path=ppt/slides/slide32.xml><?xml version="1.0" encoding="utf-8"?>
+<file path=ppt/slides/slide31.xml><?xml version="1.0" encoding="utf-8"?>
 <p:sld xmlns:a="http://schemas.openxmlformats.org/drawingml/2006/main" xmlns:r="http://schemas.openxmlformats.org/officeDocument/2006/relationships" xmlns:p="http://schemas.openxmlformats.org/presentationml/2006/main">
   <p:cSld>
     <p:spTree>
@@ -12714,7 +11181,7 @@
 </p:sld>
 </file>
 
-<file path=ppt/slides/slide33.xml><?xml version="1.0" encoding="utf-8"?>
+<file path=ppt/slides/slide32.xml><?xml version="1.0" encoding="utf-8"?>
 <p:sld xmlns:a="http://schemas.openxmlformats.org/drawingml/2006/main" xmlns:r="http://schemas.openxmlformats.org/officeDocument/2006/relationships" xmlns:p="http://schemas.openxmlformats.org/presentationml/2006/main">
   <p:cSld>
     <p:spTree>
@@ -12818,7 +11285,7 @@
 </p:sld>
 </file>
 
-<file path=ppt/slides/slide34.xml><?xml version="1.0" encoding="utf-8"?>
+<file path=ppt/slides/slide33.xml><?xml version="1.0" encoding="utf-8"?>
 <p:sld xmlns:a="http://schemas.openxmlformats.org/drawingml/2006/main" xmlns:r="http://schemas.openxmlformats.org/officeDocument/2006/relationships" xmlns:p="http://schemas.openxmlformats.org/presentationml/2006/main">
   <p:cSld>
     <p:spTree>
@@ -12943,7 +11410,7 @@
 </p:sld>
 </file>
 
-<file path=ppt/slides/slide35.xml><?xml version="1.0" encoding="utf-8"?>
+<file path=ppt/slides/slide34.xml><?xml version="1.0" encoding="utf-8"?>
 <p:sld xmlns:a="http://schemas.openxmlformats.org/drawingml/2006/main" xmlns:r="http://schemas.openxmlformats.org/officeDocument/2006/relationships" xmlns:p="http://schemas.openxmlformats.org/presentationml/2006/main">
   <p:cSld>
     <p:spTree>
@@ -14008,6 +12475,178 @@
 </p:sld>
 </file>
 
+<file path=ppt/slides/slide35.xml><?xml version="1.0" encoding="utf-8"?>
+<p:sld xmlns:a="http://schemas.openxmlformats.org/drawingml/2006/main" xmlns:r="http://schemas.openxmlformats.org/officeDocument/2006/relationships" xmlns:p="http://schemas.openxmlformats.org/presentationml/2006/main">
+  <p:cSld>
+    <p:spTree>
+      <p:nvGrpSpPr>
+        <p:cNvPr id="1" name=""/>
+        <p:cNvGrpSpPr/>
+        <p:nvPr/>
+      </p:nvGrpSpPr>
+      <p:grpSpPr>
+        <a:xfrm>
+          <a:off x="0" y="0"/>
+          <a:ext cx="0" cy="0"/>
+          <a:chOff x="0" y="0"/>
+          <a:chExt cx="0" cy="0"/>
+        </a:xfrm>
+      </p:grpSpPr>
+      <p:sp>
+        <p:nvSpPr>
+          <p:cNvPr id="2" name="Title 1">
+            <a:extLst>
+              <a:ext uri="{FF2B5EF4-FFF2-40B4-BE49-F238E27FC236}">
+                <a16:creationId xmlns:a16="http://schemas.microsoft.com/office/drawing/2014/main" id="{78D0C970-EEBF-05B1-FF2C-E7E978A7A8DA}"/>
+              </a:ext>
+            </a:extLst>
+          </p:cNvPr>
+          <p:cNvSpPr>
+            <a:spLocks noGrp="1"/>
+          </p:cNvSpPr>
+          <p:nvPr>
+            <p:ph type="title"/>
+          </p:nvPr>
+        </p:nvSpPr>
+        <p:spPr/>
+        <p:txBody>
+          <a:bodyPr/>
+          <a:lstStyle/>
+          <a:p>
+            <a:r>
+              <a:rPr lang="en-GB" dirty="0"/>
+              <a:t>Technical details: Naming conventions</a:t>
+            </a:r>
+          </a:p>
+        </p:txBody>
+      </p:sp>
+      <p:sp>
+        <p:nvSpPr>
+          <p:cNvPr id="3" name="Content Placeholder 2">
+            <a:extLst>
+              <a:ext uri="{FF2B5EF4-FFF2-40B4-BE49-F238E27FC236}">
+                <a16:creationId xmlns:a16="http://schemas.microsoft.com/office/drawing/2014/main" id="{5450935E-3A40-D7CF-8176-D0364C5C9505}"/>
+              </a:ext>
+            </a:extLst>
+          </p:cNvPr>
+          <p:cNvSpPr>
+            <a:spLocks noGrp="1"/>
+          </p:cNvSpPr>
+          <p:nvPr>
+            <p:ph idx="1"/>
+          </p:nvPr>
+        </p:nvSpPr>
+        <p:spPr/>
+        <p:txBody>
+          <a:bodyPr>
+            <a:normAutofit/>
+          </a:bodyPr>
+          <a:lstStyle/>
+          <a:p>
+            <a:r>
+              <a:rPr lang="en-GB" dirty="0"/>
+              <a:t>Experiment file naming conventions</a:t>
+            </a:r>
+          </a:p>
+          <a:p>
+            <a:pPr lvl="1"/>
+            <a:r>
+              <a:rPr lang="en-GB" dirty="0"/>
+              <a:t>Fiber (individual protein molecule) named by one or two lowercase letters</a:t>
+            </a:r>
+          </a:p>
+          <a:p>
+            <a:pPr lvl="1"/>
+            <a:r>
+              <a:rPr lang="en-GB" dirty="0"/>
+              <a:t>Data from a long experiment may be split over several files. Marked by uppercase letters</a:t>
+            </a:r>
+          </a:p>
+          <a:p>
+            <a:r>
+              <a:rPr lang="en-GB" dirty="0"/>
+              <a:t>Bath Temperature</a:t>
+            </a:r>
+          </a:p>
+          <a:p>
+            <a:pPr lvl="1"/>
+            <a:r>
+              <a:rPr lang="en-GB" dirty="0"/>
+              <a:t>Bath temperature is reported in the COM file as Temperature B.</a:t>
+            </a:r>
+          </a:p>
+          <a:p>
+            <a:pPr lvl="1"/>
+            <a:r>
+              <a:rPr lang="en-GB" dirty="0"/>
+              <a:t>COM file name is given by the </a:t>
+            </a:r>
+            <a:r>
+              <a:rPr lang="en-GB" dirty="0" err="1"/>
+              <a:t>fiber</a:t>
+            </a:r>
+            <a:r>
+              <a:rPr lang="en-GB" dirty="0"/>
+              <a:t> name</a:t>
+            </a:r>
+          </a:p>
+          <a:p>
+            <a:pPr lvl="1"/>
+            <a:endParaRPr lang="en-GB" dirty="0"/>
+          </a:p>
+          <a:p>
+            <a:pPr lvl="1"/>
+            <a:r>
+              <a:rPr lang="en-GB" dirty="0"/>
+              <a:t>aA.txt aB.txt: Data from long experiment using </a:t>
+            </a:r>
+            <a:r>
+              <a:rPr lang="en-GB" dirty="0" err="1"/>
+              <a:t>fiber</a:t>
+            </a:r>
+            <a:r>
+              <a:rPr lang="en-GB" dirty="0"/>
+              <a:t> a. COM file:  aCOM.txt</a:t>
+            </a:r>
+          </a:p>
+          <a:p>
+            <a:pPr lvl="1"/>
+            <a:r>
+              <a:rPr lang="en-GB" dirty="0"/>
+              <a:t>abA.txt:   Experiment using </a:t>
+            </a:r>
+            <a:r>
+              <a:rPr lang="en-GB" dirty="0" err="1"/>
+              <a:t>fiber</a:t>
+            </a:r>
+            <a:r>
+              <a:rPr lang="en-GB" dirty="0"/>
+              <a:t> ab. COM file: abCOM.txt</a:t>
+            </a:r>
+          </a:p>
+          <a:p>
+            <a:pPr lvl="1"/>
+            <a:endParaRPr lang="en-GB" dirty="0"/>
+          </a:p>
+          <a:p>
+            <a:pPr lvl="1"/>
+            <a:endParaRPr lang="en-GB" dirty="0"/>
+          </a:p>
+        </p:txBody>
+      </p:sp>
+    </p:spTree>
+    <p:extLst>
+      <p:ext uri="{BB962C8B-B14F-4D97-AF65-F5344CB8AC3E}">
+        <p14:creationId xmlns:p14="http://schemas.microsoft.com/office/powerpoint/2010/main" val="2086630511"/>
+      </p:ext>
+    </p:extLst>
+  </p:cSld>
+  <p:clrMapOvr>
+    <a:masterClrMapping/>
+  </p:clrMapOvr>
+</p:sld>
+</file>
+
 <file path=ppt/slides/slide36.xml><?xml version="1.0" encoding="utf-8"?>
 <p:sld xmlns:a="http://schemas.openxmlformats.org/drawingml/2006/main" xmlns:r="http://schemas.openxmlformats.org/officeDocument/2006/relationships" xmlns:p="http://schemas.openxmlformats.org/presentationml/2006/main">
   <p:cSld>
@@ -14030,178 +12669,6 @@
           <p:cNvPr id="2" name="Title 1">
             <a:extLst>
               <a:ext uri="{FF2B5EF4-FFF2-40B4-BE49-F238E27FC236}">
-                <a16:creationId xmlns:a16="http://schemas.microsoft.com/office/drawing/2014/main" id="{78D0C970-EEBF-05B1-FF2C-E7E978A7A8DA}"/>
-              </a:ext>
-            </a:extLst>
-          </p:cNvPr>
-          <p:cNvSpPr>
-            <a:spLocks noGrp="1"/>
-          </p:cNvSpPr>
-          <p:nvPr>
-            <p:ph type="title"/>
-          </p:nvPr>
-        </p:nvSpPr>
-        <p:spPr/>
-        <p:txBody>
-          <a:bodyPr/>
-          <a:lstStyle/>
-          <a:p>
-            <a:r>
-              <a:rPr lang="en-GB" dirty="0"/>
-              <a:t>Technical details: Naming conventions</a:t>
-            </a:r>
-          </a:p>
-        </p:txBody>
-      </p:sp>
-      <p:sp>
-        <p:nvSpPr>
-          <p:cNvPr id="3" name="Content Placeholder 2">
-            <a:extLst>
-              <a:ext uri="{FF2B5EF4-FFF2-40B4-BE49-F238E27FC236}">
-                <a16:creationId xmlns:a16="http://schemas.microsoft.com/office/drawing/2014/main" id="{5450935E-3A40-D7CF-8176-D0364C5C9505}"/>
-              </a:ext>
-            </a:extLst>
-          </p:cNvPr>
-          <p:cNvSpPr>
-            <a:spLocks noGrp="1"/>
-          </p:cNvSpPr>
-          <p:nvPr>
-            <p:ph idx="1"/>
-          </p:nvPr>
-        </p:nvSpPr>
-        <p:spPr/>
-        <p:txBody>
-          <a:bodyPr>
-            <a:normAutofit/>
-          </a:bodyPr>
-          <a:lstStyle/>
-          <a:p>
-            <a:r>
-              <a:rPr lang="en-GB" dirty="0"/>
-              <a:t>Experiment file naming conventions</a:t>
-            </a:r>
-          </a:p>
-          <a:p>
-            <a:pPr lvl="1"/>
-            <a:r>
-              <a:rPr lang="en-GB" dirty="0"/>
-              <a:t>Fiber (individual protein molecule) named by one or two lowercase letters</a:t>
-            </a:r>
-          </a:p>
-          <a:p>
-            <a:pPr lvl="1"/>
-            <a:r>
-              <a:rPr lang="en-GB" dirty="0"/>
-              <a:t>Data from a long experiment may be split over several files. Marked by uppercase letters</a:t>
-            </a:r>
-          </a:p>
-          <a:p>
-            <a:r>
-              <a:rPr lang="en-GB" dirty="0"/>
-              <a:t>Bath Temperature</a:t>
-            </a:r>
-          </a:p>
-          <a:p>
-            <a:pPr lvl="1"/>
-            <a:r>
-              <a:rPr lang="en-GB" dirty="0"/>
-              <a:t>Bath temperature is reported in the COM file as Temperature B.</a:t>
-            </a:r>
-          </a:p>
-          <a:p>
-            <a:pPr lvl="1"/>
-            <a:r>
-              <a:rPr lang="en-GB" dirty="0"/>
-              <a:t>COM file name is given by the </a:t>
-            </a:r>
-            <a:r>
-              <a:rPr lang="en-GB" dirty="0" err="1"/>
-              <a:t>fiber</a:t>
-            </a:r>
-            <a:r>
-              <a:rPr lang="en-GB" dirty="0"/>
-              <a:t> name</a:t>
-            </a:r>
-          </a:p>
-          <a:p>
-            <a:pPr lvl="1"/>
-            <a:endParaRPr lang="en-GB" dirty="0"/>
-          </a:p>
-          <a:p>
-            <a:pPr lvl="1"/>
-            <a:r>
-              <a:rPr lang="en-GB" dirty="0"/>
-              <a:t>aA.txt aB.txt: Data from long experiment using </a:t>
-            </a:r>
-            <a:r>
-              <a:rPr lang="en-GB" dirty="0" err="1"/>
-              <a:t>fiber</a:t>
-            </a:r>
-            <a:r>
-              <a:rPr lang="en-GB" dirty="0"/>
-              <a:t> a. COM file:  aCOM.txt</a:t>
-            </a:r>
-          </a:p>
-          <a:p>
-            <a:pPr lvl="1"/>
-            <a:r>
-              <a:rPr lang="en-GB" dirty="0"/>
-              <a:t>abA.txt:   Experiment using </a:t>
-            </a:r>
-            <a:r>
-              <a:rPr lang="en-GB" dirty="0" err="1"/>
-              <a:t>fiber</a:t>
-            </a:r>
-            <a:r>
-              <a:rPr lang="en-GB" dirty="0"/>
-              <a:t> ab. COM file: abCOM.txt</a:t>
-            </a:r>
-          </a:p>
-          <a:p>
-            <a:pPr lvl="1"/>
-            <a:endParaRPr lang="en-GB" dirty="0"/>
-          </a:p>
-          <a:p>
-            <a:pPr lvl="1"/>
-            <a:endParaRPr lang="en-GB" dirty="0"/>
-          </a:p>
-        </p:txBody>
-      </p:sp>
-    </p:spTree>
-    <p:extLst>
-      <p:ext uri="{BB962C8B-B14F-4D97-AF65-F5344CB8AC3E}">
-        <p14:creationId xmlns:p14="http://schemas.microsoft.com/office/powerpoint/2010/main" val="2086630511"/>
-      </p:ext>
-    </p:extLst>
-  </p:cSld>
-  <p:clrMapOvr>
-    <a:masterClrMapping/>
-  </p:clrMapOvr>
-</p:sld>
-</file>
-
-<file path=ppt/slides/slide37.xml><?xml version="1.0" encoding="utf-8"?>
-<p:sld xmlns:a="http://schemas.openxmlformats.org/drawingml/2006/main" xmlns:r="http://schemas.openxmlformats.org/officeDocument/2006/relationships" xmlns:p="http://schemas.openxmlformats.org/presentationml/2006/main">
-  <p:cSld>
-    <p:spTree>
-      <p:nvGrpSpPr>
-        <p:cNvPr id="1" name=""/>
-        <p:cNvGrpSpPr/>
-        <p:nvPr/>
-      </p:nvGrpSpPr>
-      <p:grpSpPr>
-        <a:xfrm>
-          <a:off x="0" y="0"/>
-          <a:ext cx="0" cy="0"/>
-          <a:chOff x="0" y="0"/>
-          <a:chExt cx="0" cy="0"/>
-        </a:xfrm>
-      </p:grpSpPr>
-      <p:sp>
-        <p:nvSpPr>
-          <p:cNvPr id="2" name="Title 1">
-            <a:extLst>
-              <a:ext uri="{FF2B5EF4-FFF2-40B4-BE49-F238E27FC236}">
                 <a16:creationId xmlns:a16="http://schemas.microsoft.com/office/drawing/2014/main" id="{46C48805-6E71-9540-F0AA-92613C975FBF}"/>
               </a:ext>
             </a:extLst>
@@ -14405,7 +12872,7 @@
 </p:sld>
 </file>
 
-<file path=ppt/slides/slide38.xml><?xml version="1.0" encoding="utf-8"?>
+<file path=ppt/slides/slide37.xml><?xml version="1.0" encoding="utf-8"?>
 <p:sld xmlns:a="http://schemas.openxmlformats.org/drawingml/2006/main" xmlns:r="http://schemas.openxmlformats.org/officeDocument/2006/relationships" xmlns:p="http://schemas.openxmlformats.org/presentationml/2006/main">
   <p:cSld>
     <p:spTree>
@@ -15095,7 +13562,7 @@
 </p:sld>
 </file>
 
-<file path=ppt/slides/slide39.xml><?xml version="1.0" encoding="utf-8"?>
+<file path=ppt/slides/slide38.xml><?xml version="1.0" encoding="utf-8"?>
 <p:sld xmlns:a="http://schemas.openxmlformats.org/drawingml/2006/main" xmlns:r="http://schemas.openxmlformats.org/officeDocument/2006/relationships" xmlns:p="http://schemas.openxmlformats.org/presentationml/2006/main">
   <p:cSld>
     <p:spTree>
@@ -16216,7 +14683,7 @@
           <a:p>
             <a:r>
               <a:rPr lang="en-GB" dirty="0"/>
-              <a:t>Other formats may require changes this function</a:t>
+              <a:t>Other formats may require changes to this function</a:t>
             </a:r>
           </a:p>
           <a:p>

</xml_diff>